<commit_message>
Añadido Aspectos a resaltar y demostración
</commit_message>
<xml_diff>
--- a/AIRDSS.pptx
+++ b/AIRDSS.pptx
@@ -4,6 +4,9 @@
   <p:sldMasterIdLst>
     <p:sldMasterId id="2147483648" r:id="rId1"/>
   </p:sldMasterIdLst>
+  <p:notesMasterIdLst>
+    <p:notesMasterId r:id="rId11"/>
+  </p:notesMasterIdLst>
   <p:sldIdLst>
     <p:sldId id="256" r:id="rId2"/>
     <p:sldId id="264" r:id="rId3"/>
@@ -11,8 +14,9 @@
     <p:sldId id="259" r:id="rId5"/>
     <p:sldId id="260" r:id="rId6"/>
     <p:sldId id="261" r:id="rId7"/>
-    <p:sldId id="262" r:id="rId8"/>
-    <p:sldId id="263" r:id="rId9"/>
+    <p:sldId id="265" r:id="rId8"/>
+    <p:sldId id="262" r:id="rId9"/>
+    <p:sldId id="263" r:id="rId10"/>
   </p:sldIdLst>
   <p:sldSz cx="12192000" cy="6858000"/>
   <p:notesSz cx="6858000" cy="9144000"/>
@@ -122,6 +126,7 @@
             <p14:sldId id="259"/>
             <p14:sldId id="260"/>
             <p14:sldId id="261"/>
+            <p14:sldId id="265"/>
             <p14:sldId id="262"/>
             <p14:sldId id="263"/>
           </p14:sldIdLst>
@@ -130,6 +135,355 @@
     </p:ext>
   </p:extLst>
 </p:presentation>
+</file>
+
+<file path=ppt/notesMasters/notesMaster1.xml><?xml version="1.0" encoding="utf-8"?>
+<p:notesMaster xmlns:a="http://schemas.openxmlformats.org/drawingml/2006/main" xmlns:r="http://schemas.openxmlformats.org/officeDocument/2006/relationships" xmlns:p="http://schemas.openxmlformats.org/presentationml/2006/main">
+  <p:cSld>
+    <p:bg>
+      <p:bgRef idx="1001">
+        <a:schemeClr val="bg1"/>
+      </p:bgRef>
+    </p:bg>
+    <p:spTree>
+      <p:nvGrpSpPr>
+        <p:cNvPr id="1" name=""/>
+        <p:cNvGrpSpPr/>
+        <p:nvPr/>
+      </p:nvGrpSpPr>
+      <p:grpSpPr>
+        <a:xfrm>
+          <a:off x="0" y="0"/>
+          <a:ext cx="0" cy="0"/>
+          <a:chOff x="0" y="0"/>
+          <a:chExt cx="0" cy="0"/>
+        </a:xfrm>
+      </p:grpSpPr>
+      <p:sp>
+        <p:nvSpPr>
+          <p:cNvPr id="2" name="Marcador de encabezado 1"/>
+          <p:cNvSpPr>
+            <a:spLocks noGrp="1"/>
+          </p:cNvSpPr>
+          <p:nvPr>
+            <p:ph type="hdr" sz="quarter"/>
+          </p:nvPr>
+        </p:nvSpPr>
+        <p:spPr>
+          <a:xfrm>
+            <a:off x="0" y="0"/>
+            <a:ext cx="2971800" cy="458788"/>
+          </a:xfrm>
+          <a:prstGeom prst="rect">
+            <a:avLst/>
+          </a:prstGeom>
+        </p:spPr>
+        <p:txBody>
+          <a:bodyPr vert="horz" lIns="91440" tIns="45720" rIns="91440" bIns="45720" rtlCol="0"/>
+          <a:lstStyle>
+            <a:lvl1pPr algn="l">
+              <a:defRPr sz="1200"/>
+            </a:lvl1pPr>
+          </a:lstStyle>
+          <a:p>
+            <a:endParaRPr lang="es-ES"/>
+          </a:p>
+        </p:txBody>
+      </p:sp>
+      <p:sp>
+        <p:nvSpPr>
+          <p:cNvPr id="3" name="Marcador de fecha 2"/>
+          <p:cNvSpPr>
+            <a:spLocks noGrp="1"/>
+          </p:cNvSpPr>
+          <p:nvPr>
+            <p:ph type="dt" idx="1"/>
+          </p:nvPr>
+        </p:nvSpPr>
+        <p:spPr>
+          <a:xfrm>
+            <a:off x="3884613" y="0"/>
+            <a:ext cx="2971800" cy="458788"/>
+          </a:xfrm>
+          <a:prstGeom prst="rect">
+            <a:avLst/>
+          </a:prstGeom>
+        </p:spPr>
+        <p:txBody>
+          <a:bodyPr vert="horz" lIns="91440" tIns="45720" rIns="91440" bIns="45720" rtlCol="0"/>
+          <a:lstStyle>
+            <a:lvl1pPr algn="r">
+              <a:defRPr sz="1200"/>
+            </a:lvl1pPr>
+          </a:lstStyle>
+          <a:p>
+            <a:fld id="{7CBE0798-1B1E-4591-B339-08EF5FF535C4}" type="datetimeFigureOut">
+              <a:rPr lang="es-ES" smtClean="0"/>
+              <a:t>05/04/2019</a:t>
+            </a:fld>
+            <a:endParaRPr lang="es-ES"/>
+          </a:p>
+        </p:txBody>
+      </p:sp>
+      <p:sp>
+        <p:nvSpPr>
+          <p:cNvPr id="4" name="Marcador de imagen de diapositiva 3"/>
+          <p:cNvSpPr>
+            <a:spLocks noGrp="1" noRot="1" noChangeAspect="1"/>
+          </p:cNvSpPr>
+          <p:nvPr>
+            <p:ph type="sldImg" idx="2"/>
+          </p:nvPr>
+        </p:nvSpPr>
+        <p:spPr>
+          <a:xfrm>
+            <a:off x="685800" y="1143000"/>
+            <a:ext cx="5486400" cy="3086100"/>
+          </a:xfrm>
+          <a:prstGeom prst="rect">
+            <a:avLst/>
+          </a:prstGeom>
+          <a:noFill/>
+          <a:ln w="12700">
+            <a:solidFill>
+              <a:prstClr val="black"/>
+            </a:solidFill>
+          </a:ln>
+        </p:spPr>
+        <p:txBody>
+          <a:bodyPr vert="horz" lIns="91440" tIns="45720" rIns="91440" bIns="45720" rtlCol="0" anchor="ctr"/>
+          <a:lstStyle/>
+          <a:p>
+            <a:endParaRPr lang="es-ES"/>
+          </a:p>
+        </p:txBody>
+      </p:sp>
+      <p:sp>
+        <p:nvSpPr>
+          <p:cNvPr id="5" name="Marcador de notas 4"/>
+          <p:cNvSpPr>
+            <a:spLocks noGrp="1"/>
+          </p:cNvSpPr>
+          <p:nvPr>
+            <p:ph type="body" sz="quarter" idx="3"/>
+          </p:nvPr>
+        </p:nvSpPr>
+        <p:spPr>
+          <a:xfrm>
+            <a:off x="685800" y="4400550"/>
+            <a:ext cx="5486400" cy="3600450"/>
+          </a:xfrm>
+          <a:prstGeom prst="rect">
+            <a:avLst/>
+          </a:prstGeom>
+        </p:spPr>
+        <p:txBody>
+          <a:bodyPr vert="horz" lIns="91440" tIns="45720" rIns="91440" bIns="45720" rtlCol="0"/>
+          <a:lstStyle/>
+          <a:p>
+            <a:pPr lvl="0"/>
+            <a:r>
+              <a:rPr lang="es-ES"/>
+              <a:t>Editar los estilos de texto del patrón</a:t>
+            </a:r>
+          </a:p>
+          <a:p>
+            <a:pPr lvl="1"/>
+            <a:r>
+              <a:rPr lang="es-ES"/>
+              <a:t>Segundo nivel</a:t>
+            </a:r>
+          </a:p>
+          <a:p>
+            <a:pPr lvl="2"/>
+            <a:r>
+              <a:rPr lang="es-ES"/>
+              <a:t>Tercer nivel</a:t>
+            </a:r>
+          </a:p>
+          <a:p>
+            <a:pPr lvl="3"/>
+            <a:r>
+              <a:rPr lang="es-ES"/>
+              <a:t>Cuarto nivel</a:t>
+            </a:r>
+          </a:p>
+          <a:p>
+            <a:pPr lvl="4"/>
+            <a:r>
+              <a:rPr lang="es-ES"/>
+              <a:t>Quinto nivel</a:t>
+            </a:r>
+          </a:p>
+        </p:txBody>
+      </p:sp>
+      <p:sp>
+        <p:nvSpPr>
+          <p:cNvPr id="6" name="Marcador de pie de página 5"/>
+          <p:cNvSpPr>
+            <a:spLocks noGrp="1"/>
+          </p:cNvSpPr>
+          <p:nvPr>
+            <p:ph type="ftr" sz="quarter" idx="4"/>
+          </p:nvPr>
+        </p:nvSpPr>
+        <p:spPr>
+          <a:xfrm>
+            <a:off x="0" y="8685213"/>
+            <a:ext cx="2971800" cy="458787"/>
+          </a:xfrm>
+          <a:prstGeom prst="rect">
+            <a:avLst/>
+          </a:prstGeom>
+        </p:spPr>
+        <p:txBody>
+          <a:bodyPr vert="horz" lIns="91440" tIns="45720" rIns="91440" bIns="45720" rtlCol="0" anchor="b"/>
+          <a:lstStyle>
+            <a:lvl1pPr algn="l">
+              <a:defRPr sz="1200"/>
+            </a:lvl1pPr>
+          </a:lstStyle>
+          <a:p>
+            <a:endParaRPr lang="es-ES"/>
+          </a:p>
+        </p:txBody>
+      </p:sp>
+      <p:sp>
+        <p:nvSpPr>
+          <p:cNvPr id="7" name="Marcador de número de diapositiva 6"/>
+          <p:cNvSpPr>
+            <a:spLocks noGrp="1"/>
+          </p:cNvSpPr>
+          <p:nvPr>
+            <p:ph type="sldNum" sz="quarter" idx="5"/>
+          </p:nvPr>
+        </p:nvSpPr>
+        <p:spPr>
+          <a:xfrm>
+            <a:off x="3884613" y="8685213"/>
+            <a:ext cx="2971800" cy="458787"/>
+          </a:xfrm>
+          <a:prstGeom prst="rect">
+            <a:avLst/>
+          </a:prstGeom>
+        </p:spPr>
+        <p:txBody>
+          <a:bodyPr vert="horz" lIns="91440" tIns="45720" rIns="91440" bIns="45720" rtlCol="0" anchor="b"/>
+          <a:lstStyle>
+            <a:lvl1pPr algn="r">
+              <a:defRPr sz="1200"/>
+            </a:lvl1pPr>
+          </a:lstStyle>
+          <a:p>
+            <a:fld id="{CBC75974-412D-4FEC-91ED-4725ED7C7218}" type="slidenum">
+              <a:rPr lang="es-ES" smtClean="0"/>
+              <a:t>‹Nº›</a:t>
+            </a:fld>
+            <a:endParaRPr lang="es-ES"/>
+          </a:p>
+        </p:txBody>
+      </p:sp>
+    </p:spTree>
+    <p:extLst>
+      <p:ext uri="{BB962C8B-B14F-4D97-AF65-F5344CB8AC3E}">
+        <p14:creationId xmlns:p14="http://schemas.microsoft.com/office/powerpoint/2010/main" val="2924161799"/>
+      </p:ext>
+    </p:extLst>
+  </p:cSld>
+  <p:clrMap bg1="lt1" tx1="dk1" bg2="lt2" tx2="dk2" accent1="accent1" accent2="accent2" accent3="accent3" accent4="accent4" accent5="accent5" accent6="accent6" hlink="hlink" folHlink="folHlink"/>
+  <p:notesStyle>
+    <a:lvl1pPr marL="0" algn="l" defTabSz="914400" rtl="0" eaLnBrk="1" latinLnBrk="0" hangingPunct="1">
+      <a:defRPr sz="1200" kern="1200">
+        <a:solidFill>
+          <a:schemeClr val="tx1"/>
+        </a:solidFill>
+        <a:latin typeface="+mn-lt"/>
+        <a:ea typeface="+mn-ea"/>
+        <a:cs typeface="+mn-cs"/>
+      </a:defRPr>
+    </a:lvl1pPr>
+    <a:lvl2pPr marL="457200" algn="l" defTabSz="914400" rtl="0" eaLnBrk="1" latinLnBrk="0" hangingPunct="1">
+      <a:defRPr sz="1200" kern="1200">
+        <a:solidFill>
+          <a:schemeClr val="tx1"/>
+        </a:solidFill>
+        <a:latin typeface="+mn-lt"/>
+        <a:ea typeface="+mn-ea"/>
+        <a:cs typeface="+mn-cs"/>
+      </a:defRPr>
+    </a:lvl2pPr>
+    <a:lvl3pPr marL="914400" algn="l" defTabSz="914400" rtl="0" eaLnBrk="1" latinLnBrk="0" hangingPunct="1">
+      <a:defRPr sz="1200" kern="1200">
+        <a:solidFill>
+          <a:schemeClr val="tx1"/>
+        </a:solidFill>
+        <a:latin typeface="+mn-lt"/>
+        <a:ea typeface="+mn-ea"/>
+        <a:cs typeface="+mn-cs"/>
+      </a:defRPr>
+    </a:lvl3pPr>
+    <a:lvl4pPr marL="1371600" algn="l" defTabSz="914400" rtl="0" eaLnBrk="1" latinLnBrk="0" hangingPunct="1">
+      <a:defRPr sz="1200" kern="1200">
+        <a:solidFill>
+          <a:schemeClr val="tx1"/>
+        </a:solidFill>
+        <a:latin typeface="+mn-lt"/>
+        <a:ea typeface="+mn-ea"/>
+        <a:cs typeface="+mn-cs"/>
+      </a:defRPr>
+    </a:lvl4pPr>
+    <a:lvl5pPr marL="1828800" algn="l" defTabSz="914400" rtl="0" eaLnBrk="1" latinLnBrk="0" hangingPunct="1">
+      <a:defRPr sz="1200" kern="1200">
+        <a:solidFill>
+          <a:schemeClr val="tx1"/>
+        </a:solidFill>
+        <a:latin typeface="+mn-lt"/>
+        <a:ea typeface="+mn-ea"/>
+        <a:cs typeface="+mn-cs"/>
+      </a:defRPr>
+    </a:lvl5pPr>
+    <a:lvl6pPr marL="2286000" algn="l" defTabSz="914400" rtl="0" eaLnBrk="1" latinLnBrk="0" hangingPunct="1">
+      <a:defRPr sz="1200" kern="1200">
+        <a:solidFill>
+          <a:schemeClr val="tx1"/>
+        </a:solidFill>
+        <a:latin typeface="+mn-lt"/>
+        <a:ea typeface="+mn-ea"/>
+        <a:cs typeface="+mn-cs"/>
+      </a:defRPr>
+    </a:lvl6pPr>
+    <a:lvl7pPr marL="2743200" algn="l" defTabSz="914400" rtl="0" eaLnBrk="1" latinLnBrk="0" hangingPunct="1">
+      <a:defRPr sz="1200" kern="1200">
+        <a:solidFill>
+          <a:schemeClr val="tx1"/>
+        </a:solidFill>
+        <a:latin typeface="+mn-lt"/>
+        <a:ea typeface="+mn-ea"/>
+        <a:cs typeface="+mn-cs"/>
+      </a:defRPr>
+    </a:lvl7pPr>
+    <a:lvl8pPr marL="3200400" algn="l" defTabSz="914400" rtl="0" eaLnBrk="1" latinLnBrk="0" hangingPunct="1">
+      <a:defRPr sz="1200" kern="1200">
+        <a:solidFill>
+          <a:schemeClr val="tx1"/>
+        </a:solidFill>
+        <a:latin typeface="+mn-lt"/>
+        <a:ea typeface="+mn-ea"/>
+        <a:cs typeface="+mn-cs"/>
+      </a:defRPr>
+    </a:lvl8pPr>
+    <a:lvl9pPr marL="3657600" algn="l" defTabSz="914400" rtl="0" eaLnBrk="1" latinLnBrk="0" hangingPunct="1">
+      <a:defRPr sz="1200" kern="1200">
+        <a:solidFill>
+          <a:schemeClr val="tx1"/>
+        </a:solidFill>
+        <a:latin typeface="+mn-lt"/>
+        <a:ea typeface="+mn-ea"/>
+        <a:cs typeface="+mn-cs"/>
+      </a:defRPr>
+    </a:lvl9pPr>
+  </p:notesStyle>
+</p:notesMaster>
 </file>
 
 <file path=ppt/slideLayouts/slideLayout1.xml><?xml version="1.0" encoding="utf-8"?>
@@ -6295,7 +6649,12 @@
             <p:ph idx="1"/>
           </p:nvPr>
         </p:nvSpPr>
-        <p:spPr/>
+        <p:spPr>
+          <a:xfrm>
+            <a:off x="2189991" y="2052919"/>
+            <a:ext cx="8946541" cy="4195481"/>
+          </a:xfrm>
+        </p:spPr>
         <p:txBody>
           <a:bodyPr/>
           <a:lstStyle/>
@@ -6355,6 +6714,98 @@
               <a:rPr lang="es-ES" dirty="0"/>
               <a:t> Finn</a:t>
             </a:r>
+          </a:p>
+        </p:txBody>
+      </p:sp>
+      <p:sp>
+        <p:nvSpPr>
+          <p:cNvPr id="6" name="CuadroTexto 5">
+            <a:extLst>
+              <a:ext uri="{FF2B5EF4-FFF2-40B4-BE49-F238E27FC236}">
+                <a16:creationId xmlns:a16="http://schemas.microsoft.com/office/drawing/2014/main" id="{930086F3-82F1-4652-8950-1177E83F3B1E}"/>
+              </a:ext>
+            </a:extLst>
+          </p:cNvPr>
+          <p:cNvSpPr txBox="1"/>
+          <p:nvPr/>
+        </p:nvSpPr>
+        <p:spPr>
+          <a:xfrm>
+            <a:off x="135904" y="1853248"/>
+            <a:ext cx="2054087" cy="4801314"/>
+          </a:xfrm>
+          <a:prstGeom prst="rect">
+            <a:avLst/>
+          </a:prstGeom>
+          <a:noFill/>
+        </p:spPr>
+        <p:txBody>
+          <a:bodyPr wrap="square" rtlCol="0">
+            <a:spAutoFit/>
+          </a:bodyPr>
+          <a:lstStyle/>
+          <a:p>
+            <a:pPr marL="285750" indent="-285750">
+              <a:buFont typeface="Wingdings" panose="05000000000000000000" pitchFamily="2" charset="2"/>
+              <a:buChar char="q"/>
+            </a:pPr>
+            <a:r>
+              <a:rPr lang="es-ES" b="1" dirty="0"/>
+              <a:t>Presentación del proyecto y de los miembros. </a:t>
+            </a:r>
+          </a:p>
+          <a:p>
+            <a:pPr marL="285750" indent="-285750">
+              <a:buFont typeface="Wingdings" panose="05000000000000000000" pitchFamily="2" charset="2"/>
+              <a:buChar char="q"/>
+            </a:pPr>
+            <a:r>
+              <a:rPr lang="es-ES" dirty="0"/>
+              <a:t>Objetivo del proyecto.</a:t>
+            </a:r>
+          </a:p>
+          <a:p>
+            <a:pPr marL="285750" indent="-285750">
+              <a:buFont typeface="Wingdings" panose="05000000000000000000" pitchFamily="2" charset="2"/>
+              <a:buChar char="q"/>
+            </a:pPr>
+            <a:r>
+              <a:rPr lang="es-ES" dirty="0"/>
+              <a:t>Funcionalidades que se van a presentar.</a:t>
+            </a:r>
+          </a:p>
+          <a:p>
+            <a:pPr marL="285750" indent="-285750">
+              <a:buFont typeface="Wingdings" panose="05000000000000000000" pitchFamily="2" charset="2"/>
+              <a:buChar char="q"/>
+            </a:pPr>
+            <a:r>
+              <a:rPr lang="es-ES" dirty="0"/>
+              <a:t>Demostración funcional del proyecto.</a:t>
+            </a:r>
+          </a:p>
+          <a:p>
+            <a:pPr marL="285750" indent="-285750">
+              <a:buFont typeface="Wingdings" panose="05000000000000000000" pitchFamily="2" charset="2"/>
+              <a:buChar char="q"/>
+            </a:pPr>
+            <a:r>
+              <a:rPr lang="es-ES" dirty="0"/>
+              <a:t>Aspectos a resaltar.</a:t>
+            </a:r>
+          </a:p>
+          <a:p>
+            <a:pPr marL="285750" indent="-285750">
+              <a:buFont typeface="Wingdings" panose="05000000000000000000" pitchFamily="2" charset="2"/>
+              <a:buChar char="q"/>
+            </a:pPr>
+            <a:r>
+              <a:rPr lang="es-ES" dirty="0"/>
+              <a:t>Conclusiones.</a:t>
+            </a:r>
+          </a:p>
+          <a:p>
+            <a:endParaRPr lang="es-ES" dirty="0"/>
           </a:p>
         </p:txBody>
       </p:sp>
@@ -6440,10 +6891,107 @@
             <p:ph idx="1"/>
           </p:nvPr>
         </p:nvSpPr>
-        <p:spPr/>
+        <p:spPr>
+          <a:xfrm>
+            <a:off x="2680321" y="2105926"/>
+            <a:ext cx="8946541" cy="4195481"/>
+          </a:xfrm>
+        </p:spPr>
         <p:txBody>
           <a:bodyPr/>
           <a:lstStyle/>
+          <a:p>
+            <a:endParaRPr lang="es-ES" dirty="0"/>
+          </a:p>
+        </p:txBody>
+      </p:sp>
+      <p:sp>
+        <p:nvSpPr>
+          <p:cNvPr id="5" name="CuadroTexto 4">
+            <a:extLst>
+              <a:ext uri="{FF2B5EF4-FFF2-40B4-BE49-F238E27FC236}">
+                <a16:creationId xmlns:a16="http://schemas.microsoft.com/office/drawing/2014/main" id="{E1101932-E247-4D17-B230-70D16DCEAD01}"/>
+              </a:ext>
+            </a:extLst>
+          </p:cNvPr>
+          <p:cNvSpPr txBox="1"/>
+          <p:nvPr/>
+        </p:nvSpPr>
+        <p:spPr>
+          <a:xfrm>
+            <a:off x="135904" y="1853248"/>
+            <a:ext cx="2054087" cy="4801314"/>
+          </a:xfrm>
+          <a:prstGeom prst="rect">
+            <a:avLst/>
+          </a:prstGeom>
+          <a:noFill/>
+        </p:spPr>
+        <p:txBody>
+          <a:bodyPr wrap="square" rtlCol="0">
+            <a:spAutoFit/>
+          </a:bodyPr>
+          <a:lstStyle/>
+          <a:p>
+            <a:pPr marL="285750" indent="-285750">
+              <a:buFont typeface="Wingdings" panose="05000000000000000000" pitchFamily="2" charset="2"/>
+              <a:buChar char="q"/>
+            </a:pPr>
+            <a:r>
+              <a:rPr lang="es-ES" dirty="0"/>
+              <a:t>Presentación del proyecto y de los miembros. </a:t>
+            </a:r>
+          </a:p>
+          <a:p>
+            <a:pPr marL="285750" indent="-285750">
+              <a:buFont typeface="Wingdings" panose="05000000000000000000" pitchFamily="2" charset="2"/>
+              <a:buChar char="q"/>
+            </a:pPr>
+            <a:r>
+              <a:rPr lang="es-ES" b="1" dirty="0"/>
+              <a:t>Objetivo del proyecto.</a:t>
+            </a:r>
+          </a:p>
+          <a:p>
+            <a:pPr marL="285750" indent="-285750">
+              <a:buFont typeface="Wingdings" panose="05000000000000000000" pitchFamily="2" charset="2"/>
+              <a:buChar char="q"/>
+            </a:pPr>
+            <a:r>
+              <a:rPr lang="es-ES" dirty="0"/>
+              <a:t>Funcionalidades que se van a presentar.</a:t>
+            </a:r>
+          </a:p>
+          <a:p>
+            <a:pPr marL="285750" indent="-285750">
+              <a:buFont typeface="Wingdings" panose="05000000000000000000" pitchFamily="2" charset="2"/>
+              <a:buChar char="q"/>
+            </a:pPr>
+            <a:r>
+              <a:rPr lang="es-ES" dirty="0"/>
+              <a:t>Demostración funcional del proyecto.</a:t>
+            </a:r>
+          </a:p>
+          <a:p>
+            <a:pPr marL="285750" indent="-285750">
+              <a:buFont typeface="Wingdings" panose="05000000000000000000" pitchFamily="2" charset="2"/>
+              <a:buChar char="q"/>
+            </a:pPr>
+            <a:r>
+              <a:rPr lang="es-ES" dirty="0"/>
+              <a:t>Aspectos a resaltar.</a:t>
+            </a:r>
+          </a:p>
+          <a:p>
+            <a:pPr marL="285750" indent="-285750">
+              <a:buFont typeface="Wingdings" panose="05000000000000000000" pitchFamily="2" charset="2"/>
+              <a:buChar char="q"/>
+            </a:pPr>
+            <a:r>
+              <a:rPr lang="es-ES" dirty="0"/>
+              <a:t>Conclusiones.</a:t>
+            </a:r>
+          </a:p>
           <a:p>
             <a:endParaRPr lang="es-ES" dirty="0"/>
           </a:p>
@@ -6536,7 +7084,99 @@
           <a:bodyPr/>
           <a:lstStyle/>
           <a:p>
-            <a:endParaRPr lang="es-ES"/>
+            <a:endParaRPr lang="es-ES" dirty="0"/>
+          </a:p>
+        </p:txBody>
+      </p:sp>
+      <p:sp>
+        <p:nvSpPr>
+          <p:cNvPr id="4" name="CuadroTexto 3">
+            <a:extLst>
+              <a:ext uri="{FF2B5EF4-FFF2-40B4-BE49-F238E27FC236}">
+                <a16:creationId xmlns:a16="http://schemas.microsoft.com/office/drawing/2014/main" id="{6E2C0E17-9FDE-4ACB-8171-6E51186BAD6A}"/>
+              </a:ext>
+            </a:extLst>
+          </p:cNvPr>
+          <p:cNvSpPr txBox="1"/>
+          <p:nvPr/>
+        </p:nvSpPr>
+        <p:spPr>
+          <a:xfrm>
+            <a:off x="135904" y="1853248"/>
+            <a:ext cx="2054087" cy="4524315"/>
+          </a:xfrm>
+          <a:prstGeom prst="rect">
+            <a:avLst/>
+          </a:prstGeom>
+          <a:noFill/>
+        </p:spPr>
+        <p:txBody>
+          <a:bodyPr wrap="square" rtlCol="0">
+            <a:spAutoFit/>
+          </a:bodyPr>
+          <a:lstStyle/>
+          <a:p>
+            <a:pPr marL="285750" indent="-285750">
+              <a:buFont typeface="Wingdings" panose="05000000000000000000" pitchFamily="2" charset="2"/>
+              <a:buChar char="q"/>
+            </a:pPr>
+            <a:r>
+              <a:rPr lang="es-ES" dirty="0"/>
+              <a:t>Presentación del proyecto y de los miembros. </a:t>
+            </a:r>
+          </a:p>
+          <a:p>
+            <a:pPr marL="285750" indent="-285750">
+              <a:buFont typeface="Wingdings" panose="05000000000000000000" pitchFamily="2" charset="2"/>
+              <a:buChar char="q"/>
+            </a:pPr>
+            <a:r>
+              <a:rPr lang="es-ES" dirty="0"/>
+              <a:t>Objetivo del proyecto.</a:t>
+            </a:r>
+          </a:p>
+          <a:p>
+            <a:pPr marL="285750" indent="-285750">
+              <a:buFont typeface="Wingdings" panose="05000000000000000000" pitchFamily="2" charset="2"/>
+              <a:buChar char="q"/>
+            </a:pPr>
+            <a:r>
+              <a:rPr lang="es-ES" b="1" dirty="0"/>
+              <a:t>Funcionalidades que se van a presentar.</a:t>
+            </a:r>
+          </a:p>
+          <a:p>
+            <a:pPr marL="285750" indent="-285750">
+              <a:buFont typeface="Wingdings" panose="05000000000000000000" pitchFamily="2" charset="2"/>
+              <a:buChar char="q"/>
+            </a:pPr>
+            <a:r>
+              <a:rPr lang="es-ES" dirty="0"/>
+              <a:t>Demostración funcional del proyecto.</a:t>
+            </a:r>
+          </a:p>
+          <a:p>
+            <a:pPr marL="285750" indent="-285750">
+              <a:buFont typeface="Wingdings" panose="05000000000000000000" pitchFamily="2" charset="2"/>
+              <a:buChar char="q"/>
+            </a:pPr>
+            <a:r>
+              <a:rPr lang="es-ES" dirty="0"/>
+              <a:t>Aspectos a resaltar.</a:t>
+            </a:r>
+          </a:p>
+          <a:p>
+            <a:pPr marL="285750" indent="-285750">
+              <a:buFont typeface="Wingdings" panose="05000000000000000000" pitchFamily="2" charset="2"/>
+              <a:buChar char="q"/>
+            </a:pPr>
+            <a:r>
+              <a:rPr lang="es-ES" dirty="0"/>
+              <a:t>Conclusiones.</a:t>
+            </a:r>
+          </a:p>
+          <a:p>
+            <a:endParaRPr lang="es-ES" dirty="0"/>
           </a:p>
         </p:txBody>
       </p:sp>
@@ -6622,12 +7262,184 @@
             <p:ph idx="1"/>
           </p:nvPr>
         </p:nvSpPr>
-        <p:spPr/>
+        <p:spPr>
+          <a:xfrm>
+            <a:off x="2322512" y="1973405"/>
+            <a:ext cx="8946541" cy="4195481"/>
+          </a:xfrm>
+        </p:spPr>
         <p:txBody>
           <a:bodyPr/>
           <a:lstStyle/>
           <a:p>
-            <a:endParaRPr lang="es-ES"/>
+            <a:r>
+              <a:rPr lang="es-ES" dirty="0"/>
+              <a:t>Captura normal</a:t>
+            </a:r>
+          </a:p>
+          <a:p>
+            <a:r>
+              <a:rPr lang="es-ES" dirty="0"/>
+              <a:t>Capturas buscando por nombre y luego por </a:t>
+            </a:r>
+            <a:r>
+              <a:rPr lang="es-ES" dirty="0" err="1"/>
+              <a:t>dni</a:t>
+            </a:r>
+            <a:r>
+              <a:rPr lang="es-ES" dirty="0"/>
+              <a:t>. También ordenando</a:t>
+            </a:r>
+          </a:p>
+          <a:p>
+            <a:r>
+              <a:rPr lang="es-ES" dirty="0"/>
+              <a:t>Capturas ordenando por distintos filtros</a:t>
+            </a:r>
+          </a:p>
+          <a:p>
+            <a:r>
+              <a:rPr lang="es-ES" dirty="0"/>
+              <a:t>Captura de eliminar un cliente (No sé si debería ponerla)</a:t>
+            </a:r>
+          </a:p>
+          <a:p>
+            <a:pPr marL="0" indent="0">
+              <a:buNone/>
+            </a:pPr>
+            <a:endParaRPr lang="es-ES" dirty="0"/>
+          </a:p>
+          <a:p>
+            <a:endParaRPr lang="es-ES" dirty="0"/>
+          </a:p>
+        </p:txBody>
+      </p:sp>
+      <p:sp>
+        <p:nvSpPr>
+          <p:cNvPr id="4" name="CuadroTexto 3">
+            <a:extLst>
+              <a:ext uri="{FF2B5EF4-FFF2-40B4-BE49-F238E27FC236}">
+                <a16:creationId xmlns:a16="http://schemas.microsoft.com/office/drawing/2014/main" id="{922F94FA-5EDC-42AD-A29A-E7B1882F0CD2}"/>
+              </a:ext>
+            </a:extLst>
+          </p:cNvPr>
+          <p:cNvSpPr txBox="1"/>
+          <p:nvPr/>
+        </p:nvSpPr>
+        <p:spPr>
+          <a:xfrm>
+            <a:off x="135904" y="1853248"/>
+            <a:ext cx="2054087" cy="4801314"/>
+          </a:xfrm>
+          <a:prstGeom prst="rect">
+            <a:avLst/>
+          </a:prstGeom>
+          <a:noFill/>
+        </p:spPr>
+        <p:txBody>
+          <a:bodyPr wrap="square" rtlCol="0">
+            <a:spAutoFit/>
+          </a:bodyPr>
+          <a:lstStyle/>
+          <a:p>
+            <a:pPr marL="285750" indent="-285750">
+              <a:buFont typeface="Wingdings" panose="05000000000000000000" pitchFamily="2" charset="2"/>
+              <a:buChar char="q"/>
+            </a:pPr>
+            <a:r>
+              <a:rPr lang="es-ES" dirty="0"/>
+              <a:t>Presentación del proyecto y de los miembros. </a:t>
+            </a:r>
+          </a:p>
+          <a:p>
+            <a:pPr marL="285750" indent="-285750">
+              <a:buFont typeface="Wingdings" panose="05000000000000000000" pitchFamily="2" charset="2"/>
+              <a:buChar char="q"/>
+            </a:pPr>
+            <a:r>
+              <a:rPr lang="es-ES" dirty="0"/>
+              <a:t>Objetivo del proyecto.</a:t>
+            </a:r>
+          </a:p>
+          <a:p>
+            <a:pPr marL="285750" indent="-285750">
+              <a:buFont typeface="Wingdings" panose="05000000000000000000" pitchFamily="2" charset="2"/>
+              <a:buChar char="q"/>
+            </a:pPr>
+            <a:r>
+              <a:rPr lang="es-ES" dirty="0"/>
+              <a:t>Funcionalidades que se van a presentar.</a:t>
+            </a:r>
+          </a:p>
+          <a:p>
+            <a:pPr marL="285750" indent="-285750">
+              <a:buFont typeface="Wingdings" panose="05000000000000000000" pitchFamily="2" charset="2"/>
+              <a:buChar char="q"/>
+            </a:pPr>
+            <a:r>
+              <a:rPr lang="es-ES" b="1" dirty="0"/>
+              <a:t>Demostración funcional del proyecto.</a:t>
+            </a:r>
+          </a:p>
+          <a:p>
+            <a:pPr marL="285750" indent="-285750">
+              <a:buFont typeface="Wingdings" panose="05000000000000000000" pitchFamily="2" charset="2"/>
+              <a:buChar char="q"/>
+            </a:pPr>
+            <a:r>
+              <a:rPr lang="es-ES" dirty="0"/>
+              <a:t>Aspectos a resaltar.</a:t>
+            </a:r>
+          </a:p>
+          <a:p>
+            <a:pPr marL="285750" indent="-285750">
+              <a:buFont typeface="Wingdings" panose="05000000000000000000" pitchFamily="2" charset="2"/>
+              <a:buChar char="q"/>
+            </a:pPr>
+            <a:r>
+              <a:rPr lang="es-ES" dirty="0"/>
+              <a:t>Conclusiones.</a:t>
+            </a:r>
+          </a:p>
+          <a:p>
+            <a:endParaRPr lang="es-ES" dirty="0"/>
+          </a:p>
+        </p:txBody>
+      </p:sp>
+      <p:sp>
+        <p:nvSpPr>
+          <p:cNvPr id="5" name="Rectángulo 4">
+            <a:extLst>
+              <a:ext uri="{FF2B5EF4-FFF2-40B4-BE49-F238E27FC236}">
+                <a16:creationId xmlns:a16="http://schemas.microsoft.com/office/drawing/2014/main" id="{312FA200-B6E2-4364-88F2-EB6C379D3D77}"/>
+              </a:ext>
+            </a:extLst>
+          </p:cNvPr>
+          <p:cNvSpPr/>
+          <p:nvPr/>
+        </p:nvSpPr>
+        <p:spPr>
+          <a:xfrm>
+            <a:off x="5564666" y="1483916"/>
+            <a:ext cx="1531188" cy="369332"/>
+          </a:xfrm>
+          <a:prstGeom prst="rect">
+            <a:avLst/>
+          </a:prstGeom>
+        </p:spPr>
+        <p:txBody>
+          <a:bodyPr wrap="none">
+            <a:spAutoFit/>
+          </a:bodyPr>
+          <a:lstStyle/>
+          <a:p>
+            <a:r>
+              <a:rPr lang="es-ES" altLang="es-ES" dirty="0">
+                <a:latin typeface="Arial" panose="020B0604020202020204" pitchFamily="34" charset="0"/>
+              </a:rPr>
+              <a:t>Listar Cliente</a:t>
+            </a:r>
+            <a:endParaRPr lang="es-ES" dirty="0"/>
           </a:p>
         </p:txBody>
       </p:sp>
@@ -6666,7 +7478,7 @@
           <p:cNvPr id="2" name="Título 1">
             <a:extLst>
               <a:ext uri="{FF2B5EF4-FFF2-40B4-BE49-F238E27FC236}">
-                <a16:creationId xmlns:a16="http://schemas.microsoft.com/office/drawing/2014/main" id="{AC7DBC01-8ECE-41C5-8E3F-384133D4DA41}"/>
+                <a16:creationId xmlns:a16="http://schemas.microsoft.com/office/drawing/2014/main" id="{8FF62F15-7BD9-422B-A2EC-E3956A7F47B1}"/>
               </a:ext>
             </a:extLst>
           </p:cNvPr>
@@ -6683,9 +7495,16 @@
           <a:lstStyle/>
           <a:p>
             <a:r>
-              <a:rPr lang="es-ES" sz="4400" dirty="0"/>
-              <a:t>Aspectos a resaltar:</a:t>
-            </a:r>
+              <a:rPr lang="es-ES" altLang="es-ES" sz="4400" dirty="0">
+                <a:latin typeface="Arial" panose="020B0604020202020204" pitchFamily="34" charset="0"/>
+              </a:rPr>
+              <a:t>Demostración funcional del proyecto.</a:t>
+            </a:r>
+            <a:br>
+              <a:rPr lang="es-ES" altLang="es-ES" sz="4400" dirty="0">
+                <a:latin typeface="Arial" panose="020B0604020202020204" pitchFamily="34" charset="0"/>
+              </a:rPr>
+            </a:br>
             <a:endParaRPr lang="es-ES" dirty="0"/>
           </a:p>
         </p:txBody>
@@ -6695,7 +7514,7 @@
           <p:cNvPr id="3" name="Marcador de contenido 2">
             <a:extLst>
               <a:ext uri="{FF2B5EF4-FFF2-40B4-BE49-F238E27FC236}">
-                <a16:creationId xmlns:a16="http://schemas.microsoft.com/office/drawing/2014/main" id="{4385F995-2760-4091-A3CB-24ACD965BE59}"/>
+                <a16:creationId xmlns:a16="http://schemas.microsoft.com/office/drawing/2014/main" id="{64789340-1343-4D96-9437-593F1DB9B603}"/>
               </a:ext>
             </a:extLst>
           </p:cNvPr>
@@ -6706,19 +7525,171 @@
             <p:ph idx="1"/>
           </p:nvPr>
         </p:nvSpPr>
-        <p:spPr/>
+        <p:spPr>
+          <a:xfrm>
+            <a:off x="2322512" y="1973405"/>
+            <a:ext cx="8946541" cy="4195481"/>
+          </a:xfrm>
+        </p:spPr>
         <p:txBody>
           <a:bodyPr/>
           <a:lstStyle/>
           <a:p>
-            <a:endParaRPr lang="es-ES"/>
+            <a:r>
+              <a:rPr lang="es-ES" dirty="0"/>
+              <a:t>Captura Normal</a:t>
+            </a:r>
+          </a:p>
+          <a:p>
+            <a:r>
+              <a:rPr lang="es-ES" dirty="0"/>
+              <a:t>Captura de Modificar Cliente</a:t>
+            </a:r>
+          </a:p>
+          <a:p>
+            <a:r>
+              <a:rPr lang="es-ES" dirty="0"/>
+              <a:t>Captura de Validación de los datos del Cliente</a:t>
+            </a:r>
+          </a:p>
+          <a:p>
+            <a:endParaRPr lang="es-ES" dirty="0"/>
+          </a:p>
+        </p:txBody>
+      </p:sp>
+      <p:sp>
+        <p:nvSpPr>
+          <p:cNvPr id="4" name="CuadroTexto 3">
+            <a:extLst>
+              <a:ext uri="{FF2B5EF4-FFF2-40B4-BE49-F238E27FC236}">
+                <a16:creationId xmlns:a16="http://schemas.microsoft.com/office/drawing/2014/main" id="{922F94FA-5EDC-42AD-A29A-E7B1882F0CD2}"/>
+              </a:ext>
+            </a:extLst>
+          </p:cNvPr>
+          <p:cNvSpPr txBox="1"/>
+          <p:nvPr/>
+        </p:nvSpPr>
+        <p:spPr>
+          <a:xfrm>
+            <a:off x="135904" y="1853248"/>
+            <a:ext cx="2054087" cy="4801314"/>
+          </a:xfrm>
+          <a:prstGeom prst="rect">
+            <a:avLst/>
+          </a:prstGeom>
+          <a:noFill/>
+        </p:spPr>
+        <p:txBody>
+          <a:bodyPr wrap="square" rtlCol="0">
+            <a:spAutoFit/>
+          </a:bodyPr>
+          <a:lstStyle/>
+          <a:p>
+            <a:pPr marL="285750" indent="-285750">
+              <a:buFont typeface="Wingdings" panose="05000000000000000000" pitchFamily="2" charset="2"/>
+              <a:buChar char="q"/>
+            </a:pPr>
+            <a:r>
+              <a:rPr lang="es-ES" dirty="0"/>
+              <a:t>Presentación del proyecto y de los miembros. </a:t>
+            </a:r>
+          </a:p>
+          <a:p>
+            <a:pPr marL="285750" indent="-285750">
+              <a:buFont typeface="Wingdings" panose="05000000000000000000" pitchFamily="2" charset="2"/>
+              <a:buChar char="q"/>
+            </a:pPr>
+            <a:r>
+              <a:rPr lang="es-ES" dirty="0"/>
+              <a:t>Objetivo del proyecto.</a:t>
+            </a:r>
+          </a:p>
+          <a:p>
+            <a:pPr marL="285750" indent="-285750">
+              <a:buFont typeface="Wingdings" panose="05000000000000000000" pitchFamily="2" charset="2"/>
+              <a:buChar char="q"/>
+            </a:pPr>
+            <a:r>
+              <a:rPr lang="es-ES" dirty="0"/>
+              <a:t>Funcionalidades que se van a presentar.</a:t>
+            </a:r>
+          </a:p>
+          <a:p>
+            <a:pPr marL="285750" indent="-285750">
+              <a:buFont typeface="Wingdings" panose="05000000000000000000" pitchFamily="2" charset="2"/>
+              <a:buChar char="q"/>
+            </a:pPr>
+            <a:r>
+              <a:rPr lang="es-ES" b="1" dirty="0"/>
+              <a:t>Demostración funcional del proyecto.</a:t>
+            </a:r>
+          </a:p>
+          <a:p>
+            <a:pPr marL="285750" indent="-285750">
+              <a:buFont typeface="Wingdings" panose="05000000000000000000" pitchFamily="2" charset="2"/>
+              <a:buChar char="q"/>
+            </a:pPr>
+            <a:r>
+              <a:rPr lang="es-ES" dirty="0"/>
+              <a:t>Aspectos a resaltar.</a:t>
+            </a:r>
+          </a:p>
+          <a:p>
+            <a:pPr marL="285750" indent="-285750">
+              <a:buFont typeface="Wingdings" panose="05000000000000000000" pitchFamily="2" charset="2"/>
+              <a:buChar char="q"/>
+            </a:pPr>
+            <a:r>
+              <a:rPr lang="es-ES" dirty="0"/>
+              <a:t>Conclusiones.</a:t>
+            </a:r>
+          </a:p>
+          <a:p>
+            <a:endParaRPr lang="es-ES" dirty="0"/>
+          </a:p>
+        </p:txBody>
+      </p:sp>
+      <p:sp>
+        <p:nvSpPr>
+          <p:cNvPr id="5" name="Rectángulo 4">
+            <a:extLst>
+              <a:ext uri="{FF2B5EF4-FFF2-40B4-BE49-F238E27FC236}">
+                <a16:creationId xmlns:a16="http://schemas.microsoft.com/office/drawing/2014/main" id="{312FA200-B6E2-4364-88F2-EB6C379D3D77}"/>
+              </a:ext>
+            </a:extLst>
+          </p:cNvPr>
+          <p:cNvSpPr/>
+          <p:nvPr/>
+        </p:nvSpPr>
+        <p:spPr>
+          <a:xfrm>
+            <a:off x="5564666" y="1483916"/>
+            <a:ext cx="2723823" cy="369332"/>
+          </a:xfrm>
+          <a:prstGeom prst="rect">
+            <a:avLst/>
+          </a:prstGeom>
+        </p:spPr>
+        <p:txBody>
+          <a:bodyPr wrap="none">
+            <a:spAutoFit/>
+          </a:bodyPr>
+          <a:lstStyle/>
+          <a:p>
+            <a:r>
+              <a:rPr lang="es-ES" altLang="es-ES" dirty="0">
+                <a:latin typeface="Arial" panose="020B0604020202020204" pitchFamily="34" charset="0"/>
+              </a:rPr>
+              <a:t>Crear y Modificar Cliente</a:t>
+            </a:r>
+            <a:endParaRPr lang="es-ES" dirty="0"/>
           </a:p>
         </p:txBody>
       </p:sp>
     </p:spTree>
     <p:extLst>
       <p:ext uri="{BB962C8B-B14F-4D97-AF65-F5344CB8AC3E}">
-        <p14:creationId xmlns:p14="http://schemas.microsoft.com/office/powerpoint/2010/main" val="1696344510"/>
+        <p14:creationId xmlns:p14="http://schemas.microsoft.com/office/powerpoint/2010/main" val="154651855"/>
       </p:ext>
     </p:extLst>
   </p:cSld>
@@ -6750,6 +7721,258 @@
           <p:cNvPr id="2" name="Título 1">
             <a:extLst>
               <a:ext uri="{FF2B5EF4-FFF2-40B4-BE49-F238E27FC236}">
+                <a16:creationId xmlns:a16="http://schemas.microsoft.com/office/drawing/2014/main" id="{AC7DBC01-8ECE-41C5-8E3F-384133D4DA41}"/>
+              </a:ext>
+            </a:extLst>
+          </p:cNvPr>
+          <p:cNvSpPr>
+            <a:spLocks noGrp="1"/>
+          </p:cNvSpPr>
+          <p:nvPr>
+            <p:ph type="title"/>
+          </p:nvPr>
+        </p:nvSpPr>
+        <p:spPr/>
+        <p:txBody>
+          <a:bodyPr/>
+          <a:lstStyle/>
+          <a:p>
+            <a:r>
+              <a:rPr lang="es-ES" sz="4400" dirty="0"/>
+              <a:t>Aspectos a resaltar:</a:t>
+            </a:r>
+            <a:endParaRPr lang="es-ES" dirty="0"/>
+          </a:p>
+        </p:txBody>
+      </p:sp>
+      <p:sp>
+        <p:nvSpPr>
+          <p:cNvPr id="3" name="Marcador de contenido 2">
+            <a:extLst>
+              <a:ext uri="{FF2B5EF4-FFF2-40B4-BE49-F238E27FC236}">
+                <a16:creationId xmlns:a16="http://schemas.microsoft.com/office/drawing/2014/main" id="{4385F995-2760-4091-A3CB-24ACD965BE59}"/>
+              </a:ext>
+            </a:extLst>
+          </p:cNvPr>
+          <p:cNvSpPr>
+            <a:spLocks noGrp="1"/>
+          </p:cNvSpPr>
+          <p:nvPr>
+            <p:ph idx="1"/>
+          </p:nvPr>
+        </p:nvSpPr>
+        <p:spPr>
+          <a:xfrm>
+            <a:off x="2189991" y="1853248"/>
+            <a:ext cx="8946541" cy="4195481"/>
+          </a:xfrm>
+        </p:spPr>
+        <p:txBody>
+          <a:bodyPr/>
+          <a:lstStyle/>
+          <a:p>
+            <a:r>
+              <a:rPr lang="es-ES" dirty="0"/>
+              <a:t>Uso de </a:t>
+            </a:r>
+            <a:r>
+              <a:rPr lang="es-ES" dirty="0" err="1"/>
+              <a:t>session</a:t>
+            </a:r>
+            <a:r>
+              <a:rPr lang="es-ES" dirty="0"/>
+              <a:t>.</a:t>
+            </a:r>
+          </a:p>
+          <a:p>
+            <a:pPr marL="0" indent="0">
+              <a:buNone/>
+            </a:pPr>
+            <a:endParaRPr lang="es-ES" dirty="0"/>
+          </a:p>
+          <a:p>
+            <a:r>
+              <a:rPr lang="es-ES" dirty="0"/>
+              <a:t>Uso de </a:t>
+            </a:r>
+            <a:r>
+              <a:rPr lang="es-ES" dirty="0" err="1"/>
+              <a:t>trello</a:t>
+            </a:r>
+            <a:r>
+              <a:rPr lang="es-ES" dirty="0"/>
+              <a:t>.</a:t>
+            </a:r>
+          </a:p>
+          <a:p>
+            <a:endParaRPr lang="es-ES" dirty="0"/>
+          </a:p>
+          <a:p>
+            <a:r>
+              <a:rPr lang="es-ES" dirty="0"/>
+              <a:t>Control de versiones:</a:t>
+            </a:r>
+          </a:p>
+          <a:p>
+            <a:pPr lvl="1"/>
+            <a:r>
+              <a:rPr lang="es-ES" dirty="0"/>
+              <a:t>La tradicional: por comandos.</a:t>
+            </a:r>
+          </a:p>
+          <a:p>
+            <a:pPr lvl="1"/>
+            <a:r>
+              <a:rPr lang="es-ES" dirty="0"/>
+              <a:t>La que nos ofrece VSC(Visual Studio </a:t>
+            </a:r>
+            <a:r>
+              <a:rPr lang="es-ES" dirty="0" err="1"/>
+              <a:t>Code</a:t>
+            </a:r>
+            <a:r>
+              <a:rPr lang="es-ES" dirty="0"/>
+              <a:t>).//Poner foto</a:t>
+            </a:r>
+          </a:p>
+          <a:p>
+            <a:endParaRPr lang="es-ES" dirty="0"/>
+          </a:p>
+          <a:p>
+            <a:r>
+              <a:rPr lang="es-ES" dirty="0"/>
+              <a:t>Metodologías de organización.</a:t>
+            </a:r>
+          </a:p>
+        </p:txBody>
+      </p:sp>
+      <p:sp>
+        <p:nvSpPr>
+          <p:cNvPr id="4" name="CuadroTexto 3">
+            <a:extLst>
+              <a:ext uri="{FF2B5EF4-FFF2-40B4-BE49-F238E27FC236}">
+                <a16:creationId xmlns:a16="http://schemas.microsoft.com/office/drawing/2014/main" id="{02F70E22-2195-424C-914B-EF6F3720683E}"/>
+              </a:ext>
+            </a:extLst>
+          </p:cNvPr>
+          <p:cNvSpPr txBox="1"/>
+          <p:nvPr/>
+        </p:nvSpPr>
+        <p:spPr>
+          <a:xfrm>
+            <a:off x="135904" y="1853248"/>
+            <a:ext cx="2054087" cy="4801314"/>
+          </a:xfrm>
+          <a:prstGeom prst="rect">
+            <a:avLst/>
+          </a:prstGeom>
+          <a:noFill/>
+        </p:spPr>
+        <p:txBody>
+          <a:bodyPr wrap="square" rtlCol="0">
+            <a:spAutoFit/>
+          </a:bodyPr>
+          <a:lstStyle/>
+          <a:p>
+            <a:pPr marL="285750" indent="-285750">
+              <a:buFont typeface="Wingdings" panose="05000000000000000000" pitchFamily="2" charset="2"/>
+              <a:buChar char="q"/>
+            </a:pPr>
+            <a:r>
+              <a:rPr lang="es-ES" dirty="0"/>
+              <a:t>Presentación del proyecto y de los miembros. </a:t>
+            </a:r>
+          </a:p>
+          <a:p>
+            <a:pPr marL="285750" indent="-285750">
+              <a:buFont typeface="Wingdings" panose="05000000000000000000" pitchFamily="2" charset="2"/>
+              <a:buChar char="q"/>
+            </a:pPr>
+            <a:r>
+              <a:rPr lang="es-ES" dirty="0"/>
+              <a:t>Objetivo del proyecto.</a:t>
+            </a:r>
+          </a:p>
+          <a:p>
+            <a:pPr marL="285750" indent="-285750">
+              <a:buFont typeface="Wingdings" panose="05000000000000000000" pitchFamily="2" charset="2"/>
+              <a:buChar char="q"/>
+            </a:pPr>
+            <a:r>
+              <a:rPr lang="es-ES" dirty="0"/>
+              <a:t>Funcionalidades que se van a presentar.</a:t>
+            </a:r>
+          </a:p>
+          <a:p>
+            <a:pPr marL="285750" indent="-285750">
+              <a:buFont typeface="Wingdings" panose="05000000000000000000" pitchFamily="2" charset="2"/>
+              <a:buChar char="q"/>
+            </a:pPr>
+            <a:r>
+              <a:rPr lang="es-ES" dirty="0"/>
+              <a:t>Demostración funcional del proyecto.</a:t>
+            </a:r>
+          </a:p>
+          <a:p>
+            <a:pPr marL="285750" indent="-285750">
+              <a:buFont typeface="Wingdings" panose="05000000000000000000" pitchFamily="2" charset="2"/>
+              <a:buChar char="q"/>
+            </a:pPr>
+            <a:r>
+              <a:rPr lang="es-ES" b="1" dirty="0"/>
+              <a:t>Aspectos a resaltar.</a:t>
+            </a:r>
+          </a:p>
+          <a:p>
+            <a:pPr marL="285750" indent="-285750">
+              <a:buFont typeface="Wingdings" panose="05000000000000000000" pitchFamily="2" charset="2"/>
+              <a:buChar char="q"/>
+            </a:pPr>
+            <a:r>
+              <a:rPr lang="es-ES" dirty="0"/>
+              <a:t>Conclusiones.</a:t>
+            </a:r>
+          </a:p>
+          <a:p>
+            <a:endParaRPr lang="es-ES" dirty="0"/>
+          </a:p>
+        </p:txBody>
+      </p:sp>
+    </p:spTree>
+    <p:extLst>
+      <p:ext uri="{BB962C8B-B14F-4D97-AF65-F5344CB8AC3E}">
+        <p14:creationId xmlns:p14="http://schemas.microsoft.com/office/powerpoint/2010/main" val="1696344510"/>
+      </p:ext>
+    </p:extLst>
+  </p:cSld>
+  <p:clrMapOvr>
+    <a:masterClrMapping/>
+  </p:clrMapOvr>
+</p:sld>
+</file>
+
+<file path=ppt/slides/slide9.xml><?xml version="1.0" encoding="utf-8"?>
+<p:sld xmlns:a="http://schemas.openxmlformats.org/drawingml/2006/main" xmlns:r="http://schemas.openxmlformats.org/officeDocument/2006/relationships" xmlns:p="http://schemas.openxmlformats.org/presentationml/2006/main">
+  <p:cSld>
+    <p:spTree>
+      <p:nvGrpSpPr>
+        <p:cNvPr id="1" name=""/>
+        <p:cNvGrpSpPr/>
+        <p:nvPr/>
+      </p:nvGrpSpPr>
+      <p:grpSpPr>
+        <a:xfrm>
+          <a:off x="0" y="0"/>
+          <a:ext cx="0" cy="0"/>
+          <a:chOff x="0" y="0"/>
+          <a:chExt cx="0" cy="0"/>
+        </a:xfrm>
+      </p:grpSpPr>
+      <p:sp>
+        <p:nvSpPr>
+          <p:cNvPr id="2" name="Título 1">
+            <a:extLst>
+              <a:ext uri="{FF2B5EF4-FFF2-40B4-BE49-F238E27FC236}">
                 <a16:creationId xmlns:a16="http://schemas.microsoft.com/office/drawing/2014/main" id="{47AA8914-7CCD-46D9-9D2F-91F987620326}"/>
               </a:ext>
             </a:extLst>
@@ -6772,14 +7995,6 @@
               </a:rPr>
               <a:t>Conclusiones.</a:t>
             </a:r>
-            <a:br>
-              <a:rPr lang="es-ES" altLang="es-ES" sz="4400" dirty="0">
-                <a:solidFill>
-                  <a:schemeClr val="tx1"/>
-                </a:solidFill>
-                <a:latin typeface="Arial" panose="020B0604020202020204" pitchFamily="34" charset="0"/>
-              </a:rPr>
-            </a:br>
             <a:endParaRPr lang="es-ES" dirty="0"/>
           </a:p>
         </p:txBody>
@@ -6805,7 +8020,99 @@
           <a:bodyPr/>
           <a:lstStyle/>
           <a:p>
-            <a:endParaRPr lang="es-ES"/>
+            <a:endParaRPr lang="es-ES" dirty="0"/>
+          </a:p>
+        </p:txBody>
+      </p:sp>
+      <p:sp>
+        <p:nvSpPr>
+          <p:cNvPr id="4" name="CuadroTexto 3">
+            <a:extLst>
+              <a:ext uri="{FF2B5EF4-FFF2-40B4-BE49-F238E27FC236}">
+                <a16:creationId xmlns:a16="http://schemas.microsoft.com/office/drawing/2014/main" id="{50A67839-77B2-4E2F-B756-15412690FB9E}"/>
+              </a:ext>
+            </a:extLst>
+          </p:cNvPr>
+          <p:cNvSpPr txBox="1"/>
+          <p:nvPr/>
+        </p:nvSpPr>
+        <p:spPr>
+          <a:xfrm>
+            <a:off x="135904" y="1853248"/>
+            <a:ext cx="2054087" cy="4801314"/>
+          </a:xfrm>
+          <a:prstGeom prst="rect">
+            <a:avLst/>
+          </a:prstGeom>
+          <a:noFill/>
+        </p:spPr>
+        <p:txBody>
+          <a:bodyPr wrap="square" rtlCol="0">
+            <a:spAutoFit/>
+          </a:bodyPr>
+          <a:lstStyle/>
+          <a:p>
+            <a:pPr marL="285750" indent="-285750">
+              <a:buFont typeface="Wingdings" panose="05000000000000000000" pitchFamily="2" charset="2"/>
+              <a:buChar char="q"/>
+            </a:pPr>
+            <a:r>
+              <a:rPr lang="es-ES" dirty="0"/>
+              <a:t>Presentación del proyecto y de los miembros. </a:t>
+            </a:r>
+          </a:p>
+          <a:p>
+            <a:pPr marL="285750" indent="-285750">
+              <a:buFont typeface="Wingdings" panose="05000000000000000000" pitchFamily="2" charset="2"/>
+              <a:buChar char="q"/>
+            </a:pPr>
+            <a:r>
+              <a:rPr lang="es-ES" dirty="0"/>
+              <a:t>Objetivo del proyecto.</a:t>
+            </a:r>
+          </a:p>
+          <a:p>
+            <a:pPr marL="285750" indent="-285750">
+              <a:buFont typeface="Wingdings" panose="05000000000000000000" pitchFamily="2" charset="2"/>
+              <a:buChar char="q"/>
+            </a:pPr>
+            <a:r>
+              <a:rPr lang="es-ES" dirty="0"/>
+              <a:t>Funcionalidades que se van a presentar.</a:t>
+            </a:r>
+          </a:p>
+          <a:p>
+            <a:pPr marL="285750" indent="-285750">
+              <a:buFont typeface="Wingdings" panose="05000000000000000000" pitchFamily="2" charset="2"/>
+              <a:buChar char="q"/>
+            </a:pPr>
+            <a:r>
+              <a:rPr lang="es-ES" dirty="0"/>
+              <a:t>Demostración funcional del proyecto.</a:t>
+            </a:r>
+          </a:p>
+          <a:p>
+            <a:pPr marL="285750" indent="-285750">
+              <a:buFont typeface="Wingdings" panose="05000000000000000000" pitchFamily="2" charset="2"/>
+              <a:buChar char="q"/>
+            </a:pPr>
+            <a:r>
+              <a:rPr lang="es-ES" dirty="0"/>
+              <a:t>Aspectos a resaltar.</a:t>
+            </a:r>
+          </a:p>
+          <a:p>
+            <a:pPr marL="285750" indent="-285750">
+              <a:buFont typeface="Wingdings" panose="05000000000000000000" pitchFamily="2" charset="2"/>
+              <a:buChar char="q"/>
+            </a:pPr>
+            <a:r>
+              <a:rPr lang="es-ES" b="1" dirty="0"/>
+              <a:t>Conclusiones.</a:t>
+            </a:r>
+          </a:p>
+          <a:p>
+            <a:endParaRPr lang="es-ES" dirty="0"/>
           </a:p>
         </p:txBody>
       </p:sp>
@@ -7086,4 +8393,299 @@
     </a:ext>
   </a:extLst>
 </a:theme>
+</file>
+
+<file path=ppt/theme/theme2.xml><?xml version="1.0" encoding="utf-8"?>
+<a:theme xmlns:a="http://schemas.openxmlformats.org/drawingml/2006/main" name="Tema de Office">
+  <a:themeElements>
+    <a:clrScheme name="Office">
+      <a:dk1>
+        <a:sysClr val="windowText" lastClr="000000"/>
+      </a:dk1>
+      <a:lt1>
+        <a:sysClr val="window" lastClr="FFFFFF"/>
+      </a:lt1>
+      <a:dk2>
+        <a:srgbClr val="44546A"/>
+      </a:dk2>
+      <a:lt2>
+        <a:srgbClr val="E7E6E6"/>
+      </a:lt2>
+      <a:accent1>
+        <a:srgbClr val="4472C4"/>
+      </a:accent1>
+      <a:accent2>
+        <a:srgbClr val="ED7D31"/>
+      </a:accent2>
+      <a:accent3>
+        <a:srgbClr val="A5A5A5"/>
+      </a:accent3>
+      <a:accent4>
+        <a:srgbClr val="FFC000"/>
+      </a:accent4>
+      <a:accent5>
+        <a:srgbClr val="5B9BD5"/>
+      </a:accent5>
+      <a:accent6>
+        <a:srgbClr val="70AD47"/>
+      </a:accent6>
+      <a:hlink>
+        <a:srgbClr val="0563C1"/>
+      </a:hlink>
+      <a:folHlink>
+        <a:srgbClr val="954F72"/>
+      </a:folHlink>
+    </a:clrScheme>
+    <a:fontScheme name="Office">
+      <a:majorFont>
+        <a:latin typeface="Calibri Light" panose="020F0302020204030204"/>
+        <a:ea typeface=""/>
+        <a:cs typeface=""/>
+        <a:font script="Jpan" typeface="游ゴシック Light"/>
+        <a:font script="Hang" typeface="맑은 고딕"/>
+        <a:font script="Hans" typeface="等线 Light"/>
+        <a:font script="Hant" typeface="新細明體"/>
+        <a:font script="Arab" typeface="Times New Roman"/>
+        <a:font script="Hebr" typeface="Times New Roman"/>
+        <a:font script="Thai" typeface="Angsana New"/>
+        <a:font script="Ethi" typeface="Nyala"/>
+        <a:font script="Beng" typeface="Vrinda"/>
+        <a:font script="Gujr" typeface="Shruti"/>
+        <a:font script="Khmr" typeface="MoolBoran"/>
+        <a:font script="Knda" typeface="Tunga"/>
+        <a:font script="Guru" typeface="Raavi"/>
+        <a:font script="Cans" typeface="Euphemia"/>
+        <a:font script="Cher" typeface="Plantagenet Cherokee"/>
+        <a:font script="Yiii" typeface="Microsoft Yi Baiti"/>
+        <a:font script="Tibt" typeface="Microsoft Himalaya"/>
+        <a:font script="Thaa" typeface="MV Boli"/>
+        <a:font script="Deva" typeface="Mangal"/>
+        <a:font script="Telu" typeface="Gautami"/>
+        <a:font script="Taml" typeface="Latha"/>
+        <a:font script="Syrc" typeface="Estrangelo Edessa"/>
+        <a:font script="Orya" typeface="Kalinga"/>
+        <a:font script="Mlym" typeface="Kartika"/>
+        <a:font script="Laoo" typeface="DokChampa"/>
+        <a:font script="Sinh" typeface="Iskoola Pota"/>
+        <a:font script="Mong" typeface="Mongolian Baiti"/>
+        <a:font script="Viet" typeface="Times New Roman"/>
+        <a:font script="Uigh" typeface="Microsoft Uighur"/>
+        <a:font script="Geor" typeface="Sylfaen"/>
+        <a:font script="Armn" typeface="Arial"/>
+        <a:font script="Bugi" typeface="Leelawadee UI"/>
+        <a:font script="Bopo" typeface="Microsoft JhengHei"/>
+        <a:font script="Java" typeface="Javanese Text"/>
+        <a:font script="Lisu" typeface="Segoe UI"/>
+        <a:font script="Mymr" typeface="Myanmar Text"/>
+        <a:font script="Nkoo" typeface="Ebrima"/>
+        <a:font script="Olck" typeface="Nirmala UI"/>
+        <a:font script="Osma" typeface="Ebrima"/>
+        <a:font script="Phag" typeface="Phagspa"/>
+        <a:font script="Syrn" typeface="Estrangelo Edessa"/>
+        <a:font script="Syrj" typeface="Estrangelo Edessa"/>
+        <a:font script="Syre" typeface="Estrangelo Edessa"/>
+        <a:font script="Sora" typeface="Nirmala UI"/>
+        <a:font script="Tale" typeface="Microsoft Tai Le"/>
+        <a:font script="Talu" typeface="Microsoft New Tai Lue"/>
+        <a:font script="Tfng" typeface="Ebrima"/>
+      </a:majorFont>
+      <a:minorFont>
+        <a:latin typeface="Calibri" panose="020F0502020204030204"/>
+        <a:ea typeface=""/>
+        <a:cs typeface=""/>
+        <a:font script="Jpan" typeface="游ゴシック"/>
+        <a:font script="Hang" typeface="맑은 고딕"/>
+        <a:font script="Hans" typeface="等线"/>
+        <a:font script="Hant" typeface="新細明體"/>
+        <a:font script="Arab" typeface="Arial"/>
+        <a:font script="Hebr" typeface="Arial"/>
+        <a:font script="Thai" typeface="Cordia New"/>
+        <a:font script="Ethi" typeface="Nyala"/>
+        <a:font script="Beng" typeface="Vrinda"/>
+        <a:font script="Gujr" typeface="Shruti"/>
+        <a:font script="Khmr" typeface="DaunPenh"/>
+        <a:font script="Knda" typeface="Tunga"/>
+        <a:font script="Guru" typeface="Raavi"/>
+        <a:font script="Cans" typeface="Euphemia"/>
+        <a:font script="Cher" typeface="Plantagenet Cherokee"/>
+        <a:font script="Yiii" typeface="Microsoft Yi Baiti"/>
+        <a:font script="Tibt" typeface="Microsoft Himalaya"/>
+        <a:font script="Thaa" typeface="MV Boli"/>
+        <a:font script="Deva" typeface="Mangal"/>
+        <a:font script="Telu" typeface="Gautami"/>
+        <a:font script="Taml" typeface="Latha"/>
+        <a:font script="Syrc" typeface="Estrangelo Edessa"/>
+        <a:font script="Orya" typeface="Kalinga"/>
+        <a:font script="Mlym" typeface="Kartika"/>
+        <a:font script="Laoo" typeface="DokChampa"/>
+        <a:font script="Sinh" typeface="Iskoola Pota"/>
+        <a:font script="Mong" typeface="Mongolian Baiti"/>
+        <a:font script="Viet" typeface="Arial"/>
+        <a:font script="Uigh" typeface="Microsoft Uighur"/>
+        <a:font script="Geor" typeface="Sylfaen"/>
+        <a:font script="Armn" typeface="Arial"/>
+        <a:font script="Bugi" typeface="Leelawadee UI"/>
+        <a:font script="Bopo" typeface="Microsoft JhengHei"/>
+        <a:font script="Java" typeface="Javanese Text"/>
+        <a:font script="Lisu" typeface="Segoe UI"/>
+        <a:font script="Mymr" typeface="Myanmar Text"/>
+        <a:font script="Nkoo" typeface="Ebrima"/>
+        <a:font script="Olck" typeface="Nirmala UI"/>
+        <a:font script="Osma" typeface="Ebrima"/>
+        <a:font script="Phag" typeface="Phagspa"/>
+        <a:font script="Syrn" typeface="Estrangelo Edessa"/>
+        <a:font script="Syrj" typeface="Estrangelo Edessa"/>
+        <a:font script="Syre" typeface="Estrangelo Edessa"/>
+        <a:font script="Sora" typeface="Nirmala UI"/>
+        <a:font script="Tale" typeface="Microsoft Tai Le"/>
+        <a:font script="Talu" typeface="Microsoft New Tai Lue"/>
+        <a:font script="Tfng" typeface="Ebrima"/>
+      </a:minorFont>
+    </a:fontScheme>
+    <a:fmtScheme name="Office">
+      <a:fillStyleLst>
+        <a:solidFill>
+          <a:schemeClr val="phClr"/>
+        </a:solidFill>
+        <a:gradFill rotWithShape="1">
+          <a:gsLst>
+            <a:gs pos="0">
+              <a:schemeClr val="phClr">
+                <a:lumMod val="110000"/>
+                <a:satMod val="105000"/>
+                <a:tint val="67000"/>
+              </a:schemeClr>
+            </a:gs>
+            <a:gs pos="50000">
+              <a:schemeClr val="phClr">
+                <a:lumMod val="105000"/>
+                <a:satMod val="103000"/>
+                <a:tint val="73000"/>
+              </a:schemeClr>
+            </a:gs>
+            <a:gs pos="100000">
+              <a:schemeClr val="phClr">
+                <a:lumMod val="105000"/>
+                <a:satMod val="109000"/>
+                <a:tint val="81000"/>
+              </a:schemeClr>
+            </a:gs>
+          </a:gsLst>
+          <a:lin ang="5400000" scaled="0"/>
+        </a:gradFill>
+        <a:gradFill rotWithShape="1">
+          <a:gsLst>
+            <a:gs pos="0">
+              <a:schemeClr val="phClr">
+                <a:satMod val="103000"/>
+                <a:lumMod val="102000"/>
+                <a:tint val="94000"/>
+              </a:schemeClr>
+            </a:gs>
+            <a:gs pos="50000">
+              <a:schemeClr val="phClr">
+                <a:satMod val="110000"/>
+                <a:lumMod val="100000"/>
+                <a:shade val="100000"/>
+              </a:schemeClr>
+            </a:gs>
+            <a:gs pos="100000">
+              <a:schemeClr val="phClr">
+                <a:lumMod val="99000"/>
+                <a:satMod val="120000"/>
+                <a:shade val="78000"/>
+              </a:schemeClr>
+            </a:gs>
+          </a:gsLst>
+          <a:lin ang="5400000" scaled="0"/>
+        </a:gradFill>
+      </a:fillStyleLst>
+      <a:lnStyleLst>
+        <a:ln w="6350" cap="flat" cmpd="sng" algn="ctr">
+          <a:solidFill>
+            <a:schemeClr val="phClr"/>
+          </a:solidFill>
+          <a:prstDash val="solid"/>
+          <a:miter lim="800000"/>
+        </a:ln>
+        <a:ln w="12700" cap="flat" cmpd="sng" algn="ctr">
+          <a:solidFill>
+            <a:schemeClr val="phClr"/>
+          </a:solidFill>
+          <a:prstDash val="solid"/>
+          <a:miter lim="800000"/>
+        </a:ln>
+        <a:ln w="19050" cap="flat" cmpd="sng" algn="ctr">
+          <a:solidFill>
+            <a:schemeClr val="phClr"/>
+          </a:solidFill>
+          <a:prstDash val="solid"/>
+          <a:miter lim="800000"/>
+        </a:ln>
+      </a:lnStyleLst>
+      <a:effectStyleLst>
+        <a:effectStyle>
+          <a:effectLst/>
+        </a:effectStyle>
+        <a:effectStyle>
+          <a:effectLst/>
+        </a:effectStyle>
+        <a:effectStyle>
+          <a:effectLst>
+            <a:outerShdw blurRad="57150" dist="19050" dir="5400000" algn="ctr" rotWithShape="0">
+              <a:srgbClr val="000000">
+                <a:alpha val="63000"/>
+              </a:srgbClr>
+            </a:outerShdw>
+          </a:effectLst>
+        </a:effectStyle>
+      </a:effectStyleLst>
+      <a:bgFillStyleLst>
+        <a:solidFill>
+          <a:schemeClr val="phClr"/>
+        </a:solidFill>
+        <a:solidFill>
+          <a:schemeClr val="phClr">
+            <a:tint val="95000"/>
+            <a:satMod val="170000"/>
+          </a:schemeClr>
+        </a:solidFill>
+        <a:gradFill rotWithShape="1">
+          <a:gsLst>
+            <a:gs pos="0">
+              <a:schemeClr val="phClr">
+                <a:tint val="93000"/>
+                <a:satMod val="150000"/>
+                <a:shade val="98000"/>
+                <a:lumMod val="102000"/>
+              </a:schemeClr>
+            </a:gs>
+            <a:gs pos="50000">
+              <a:schemeClr val="phClr">
+                <a:tint val="98000"/>
+                <a:satMod val="130000"/>
+                <a:shade val="90000"/>
+                <a:lumMod val="103000"/>
+              </a:schemeClr>
+            </a:gs>
+            <a:gs pos="100000">
+              <a:schemeClr val="phClr">
+                <a:shade val="63000"/>
+                <a:satMod val="120000"/>
+              </a:schemeClr>
+            </a:gs>
+          </a:gsLst>
+          <a:lin ang="5400000" scaled="0"/>
+        </a:gradFill>
+      </a:bgFillStyleLst>
+    </a:fmtScheme>
+  </a:themeElements>
+  <a:objectDefaults/>
+  <a:extraClrSchemeLst/>
+  <a:extLst>
+    <a:ext uri="{05A4C25C-085E-4340-85A3-A5531E510DB2}">
+      <thm15:themeFamily xmlns:thm15="http://schemas.microsoft.com/office/thememl/2012/main" name="Office Theme" id="{62F939B6-93AF-4DB8-9C6B-D6C7DFDC589F}" vid="{4A3C46E8-61CC-4603-A589-7422A47A8E4A}"/>
+    </a:ext>
+  </a:extLst>
+</a:theme>
 </file>
</xml_diff>

<commit_message>
Presentación modificada, parte berta
</commit_message>
<xml_diff>
--- a/AIRDSS.pptx
+++ b/AIRDSS.pptx
@@ -5,7 +5,7 @@
     <p:sldMasterId id="2147483719" r:id="rId1"/>
   </p:sldMasterIdLst>
   <p:notesMasterIdLst>
-    <p:notesMasterId r:id="rId14"/>
+    <p:notesMasterId r:id="rId20"/>
   </p:notesMasterIdLst>
   <p:sldIdLst>
     <p:sldId id="256" r:id="rId2"/>
@@ -18,8 +18,14 @@
     <p:sldId id="266" r:id="rId9"/>
     <p:sldId id="267" r:id="rId10"/>
     <p:sldId id="268" r:id="rId11"/>
-    <p:sldId id="262" r:id="rId12"/>
-    <p:sldId id="263" r:id="rId13"/>
+    <p:sldId id="269" r:id="rId12"/>
+    <p:sldId id="270" r:id="rId13"/>
+    <p:sldId id="271" r:id="rId14"/>
+    <p:sldId id="272" r:id="rId15"/>
+    <p:sldId id="273" r:id="rId16"/>
+    <p:sldId id="274" r:id="rId17"/>
+    <p:sldId id="262" r:id="rId18"/>
+    <p:sldId id="263" r:id="rId19"/>
   </p:sldIdLst>
   <p:sldSz cx="12192000" cy="6858000"/>
   <p:notesSz cx="6858000" cy="9144000"/>
@@ -133,6 +139,12 @@
             <p14:sldId id="266"/>
             <p14:sldId id="267"/>
             <p14:sldId id="268"/>
+            <p14:sldId id="269"/>
+            <p14:sldId id="270"/>
+            <p14:sldId id="271"/>
+            <p14:sldId id="272"/>
+            <p14:sldId id="273"/>
+            <p14:sldId id="274"/>
             <p14:sldId id="262"/>
             <p14:sldId id="263"/>
           </p14:sldIdLst>
@@ -4143,142 +4155,10 @@
       </p:grpSpPr>
       <p:sp>
         <p:nvSpPr>
-          <p:cNvPr id="2" name="Título 1">
+          <p:cNvPr id="7" name="CuadroTexto 6">
             <a:extLst>
               <a:ext uri="{FF2B5EF4-FFF2-40B4-BE49-F238E27FC236}">
-                <a16:creationId xmlns:a16="http://schemas.microsoft.com/office/drawing/2014/main" id="{AC7DBC01-8ECE-41C5-8E3F-384133D4DA41}"/>
-              </a:ext>
-            </a:extLst>
-          </p:cNvPr>
-          <p:cNvSpPr>
-            <a:spLocks noGrp="1"/>
-          </p:cNvSpPr>
-          <p:nvPr>
-            <p:ph type="title"/>
-          </p:nvPr>
-        </p:nvSpPr>
-        <p:spPr/>
-        <p:txBody>
-          <a:bodyPr/>
-          <a:lstStyle/>
-          <a:p>
-            <a:r>
-              <a:rPr lang="es-ES" sz="4400" dirty="0"/>
-              <a:t>Aspectos a resaltar:</a:t>
-            </a:r>
-            <a:endParaRPr lang="es-ES" dirty="0"/>
-          </a:p>
-        </p:txBody>
-      </p:sp>
-      <p:sp>
-        <p:nvSpPr>
-          <p:cNvPr id="3" name="Marcador de contenido 2">
-            <a:extLst>
-              <a:ext uri="{FF2B5EF4-FFF2-40B4-BE49-F238E27FC236}">
-                <a16:creationId xmlns:a16="http://schemas.microsoft.com/office/drawing/2014/main" id="{4385F995-2760-4091-A3CB-24ACD965BE59}"/>
-              </a:ext>
-            </a:extLst>
-          </p:cNvPr>
-          <p:cNvSpPr>
-            <a:spLocks noGrp="1"/>
-          </p:cNvSpPr>
-          <p:nvPr>
-            <p:ph idx="1"/>
-          </p:nvPr>
-        </p:nvSpPr>
-        <p:spPr>
-          <a:xfrm>
-            <a:off x="2189991" y="1853248"/>
-            <a:ext cx="8946541" cy="4195481"/>
-          </a:xfrm>
-        </p:spPr>
-        <p:txBody>
-          <a:bodyPr>
-            <a:normAutofit/>
-          </a:bodyPr>
-          <a:lstStyle/>
-          <a:p>
-            <a:r>
-              <a:rPr lang="es-ES" dirty="0"/>
-              <a:t>Uso de </a:t>
-            </a:r>
-            <a:r>
-              <a:rPr lang="es-ES" dirty="0" err="1"/>
-              <a:t>session</a:t>
-            </a:r>
-            <a:r>
-              <a:rPr lang="es-ES" dirty="0"/>
-              <a:t>.</a:t>
-            </a:r>
-          </a:p>
-          <a:p>
-            <a:pPr marL="0" indent="0">
-              <a:buNone/>
-            </a:pPr>
-            <a:endParaRPr lang="es-ES" dirty="0"/>
-          </a:p>
-          <a:p>
-            <a:r>
-              <a:rPr lang="es-ES" dirty="0"/>
-              <a:t>Uso de </a:t>
-            </a:r>
-            <a:r>
-              <a:rPr lang="es-ES" dirty="0" err="1"/>
-              <a:t>trello</a:t>
-            </a:r>
-            <a:r>
-              <a:rPr lang="es-ES" dirty="0"/>
-              <a:t>.</a:t>
-            </a:r>
-          </a:p>
-          <a:p>
-            <a:endParaRPr lang="es-ES" dirty="0"/>
-          </a:p>
-          <a:p>
-            <a:r>
-              <a:rPr lang="es-ES" dirty="0"/>
-              <a:t>Control de versiones:</a:t>
-            </a:r>
-          </a:p>
-          <a:p>
-            <a:pPr lvl="1"/>
-            <a:r>
-              <a:rPr lang="es-ES" dirty="0"/>
-              <a:t>La tradicional: por comandos.</a:t>
-            </a:r>
-          </a:p>
-          <a:p>
-            <a:pPr lvl="1"/>
-            <a:r>
-              <a:rPr lang="es-ES" dirty="0"/>
-              <a:t>La que nos ofrece VSC(Visual Studio </a:t>
-            </a:r>
-            <a:r>
-              <a:rPr lang="es-ES" dirty="0" err="1"/>
-              <a:t>Code</a:t>
-            </a:r>
-            <a:r>
-              <a:rPr lang="es-ES" dirty="0"/>
-              <a:t>).//Poner foto</a:t>
-            </a:r>
-          </a:p>
-          <a:p>
-            <a:endParaRPr lang="es-ES" dirty="0"/>
-          </a:p>
-          <a:p>
-            <a:r>
-              <a:rPr lang="es-ES" dirty="0"/>
-              <a:t>Metodologías de organización.</a:t>
-            </a:r>
-          </a:p>
-        </p:txBody>
-      </p:sp>
-      <p:sp>
-        <p:nvSpPr>
-          <p:cNvPr id="5" name="CuadroTexto 4">
-            <a:extLst>
-              <a:ext uri="{FF2B5EF4-FFF2-40B4-BE49-F238E27FC236}">
-                <a16:creationId xmlns:a16="http://schemas.microsoft.com/office/drawing/2014/main" id="{C68EC0AD-0AEE-4F4E-AEE1-28A128CF2A1A}"/>
+                <a16:creationId xmlns:a16="http://schemas.microsoft.com/office/drawing/2014/main" id="{67A20B4B-ADE6-40C7-B898-40DAA802D524}"/>
               </a:ext>
             </a:extLst>
           </p:cNvPr>
@@ -4311,6 +4191,1275 @@
               <a:buChar char="q"/>
             </a:pPr>
             <a:r>
+              <a:rPr lang="es-ES"/>
+              <a:t>Presentación</a:t>
+            </a:r>
+          </a:p>
+          <a:p>
+            <a:pPr marL="285750" indent="-285750">
+              <a:buFont typeface="Wingdings" panose="05000000000000000000" pitchFamily="2" charset="2"/>
+              <a:buChar char="q"/>
+            </a:pPr>
+            <a:r>
+              <a:rPr lang="es-ES"/>
+              <a:t>Objetivos</a:t>
+            </a:r>
+          </a:p>
+          <a:p>
+            <a:pPr marL="285750" indent="-285750">
+              <a:buFont typeface="Wingdings" panose="05000000000000000000" pitchFamily="2" charset="2"/>
+              <a:buChar char="q"/>
+            </a:pPr>
+            <a:r>
+              <a:rPr lang="es-ES"/>
+              <a:t>Funcionalidades</a:t>
+            </a:r>
+          </a:p>
+          <a:p>
+            <a:pPr marL="285750" indent="-285750">
+              <a:buFont typeface="Wingdings" panose="05000000000000000000" pitchFamily="2" charset="2"/>
+              <a:buChar char="q"/>
+            </a:pPr>
+            <a:r>
+              <a:rPr lang="es-ES" b="1"/>
+              <a:t>Demostración</a:t>
+            </a:r>
+            <a:endParaRPr lang="es-ES"/>
+          </a:p>
+          <a:p>
+            <a:pPr marL="285750" indent="-285750">
+              <a:buFont typeface="Wingdings" panose="05000000000000000000" pitchFamily="2" charset="2"/>
+              <a:buChar char="q"/>
+            </a:pPr>
+            <a:r>
+              <a:rPr lang="es-ES"/>
+              <a:t>Aspectos</a:t>
+            </a:r>
+          </a:p>
+          <a:p>
+            <a:pPr marL="285750" indent="-285750">
+              <a:buFont typeface="Wingdings" panose="05000000000000000000" pitchFamily="2" charset="2"/>
+              <a:buChar char="q"/>
+            </a:pPr>
+            <a:r>
+              <a:rPr lang="es-ES"/>
+              <a:t>Conclusiones</a:t>
+            </a:r>
+          </a:p>
+          <a:p>
+            <a:endParaRPr lang="es-ES" dirty="0"/>
+          </a:p>
+        </p:txBody>
+      </p:sp>
+      <p:pic>
+        <p:nvPicPr>
+          <p:cNvPr id="23" name="Marcador de contenido 3" descr="Imagen que contiene captura de pantalla&#10;&#10;Descripción generada automáticamente">
+            <a:extLst>
+              <a:ext uri="{FF2B5EF4-FFF2-40B4-BE49-F238E27FC236}">
+                <a16:creationId xmlns:a16="http://schemas.microsoft.com/office/drawing/2014/main" id="{51034500-B65B-412F-9C41-A741BE194C40}"/>
+              </a:ext>
+            </a:extLst>
+          </p:cNvPr>
+          <p:cNvPicPr>
+            <a:picLocks noGrp="1" noChangeAspect="1"/>
+          </p:cNvPicPr>
+          <p:nvPr>
+            <p:ph idx="1"/>
+          </p:nvPr>
+        </p:nvPicPr>
+        <p:blipFill>
+          <a:blip r:embed="rId2"/>
+          <a:stretch>
+            <a:fillRect/>
+          </a:stretch>
+        </p:blipFill>
+        <p:spPr>
+          <a:xfrm>
+            <a:off x="2952925" y="539018"/>
+            <a:ext cx="8618290" cy="5941477"/>
+          </a:xfrm>
+          <a:prstGeom prst="rect">
+            <a:avLst/>
+          </a:prstGeom>
+        </p:spPr>
+      </p:pic>
+      <p:sp>
+        <p:nvSpPr>
+          <p:cNvPr id="25" name="Título 1">
+            <a:extLst>
+              <a:ext uri="{FF2B5EF4-FFF2-40B4-BE49-F238E27FC236}">
+                <a16:creationId xmlns:a16="http://schemas.microsoft.com/office/drawing/2014/main" id="{B3638FC4-25EB-4D4D-AAC4-0F8822FA1BA6}"/>
+              </a:ext>
+            </a:extLst>
+          </p:cNvPr>
+          <p:cNvSpPr>
+            <a:spLocks noGrp="1"/>
+          </p:cNvSpPr>
+          <p:nvPr>
+            <p:ph type="title"/>
+          </p:nvPr>
+        </p:nvSpPr>
+        <p:spPr>
+          <a:xfrm>
+            <a:off x="830510" y="913721"/>
+            <a:ext cx="9821411" cy="1499616"/>
+          </a:xfrm>
+        </p:spPr>
+        <p:txBody>
+          <a:bodyPr>
+            <a:normAutofit/>
+          </a:bodyPr>
+          <a:lstStyle/>
+          <a:p>
+            <a:r>
+              <a:rPr lang="es-ES" altLang="es-ES" sz="4400" dirty="0">
+                <a:latin typeface="Arial" panose="020B0604020202020204" pitchFamily="34" charset="0"/>
+              </a:rPr>
+              <a:t>Avión</a:t>
+            </a:r>
+            <a:br>
+              <a:rPr lang="es-ES" altLang="es-ES" sz="4400" dirty="0">
+                <a:latin typeface="Arial" panose="020B0604020202020204" pitchFamily="34" charset="0"/>
+              </a:rPr>
+            </a:br>
+            <a:endParaRPr lang="es-ES" dirty="0"/>
+          </a:p>
+        </p:txBody>
+      </p:sp>
+    </p:spTree>
+    <p:extLst>
+      <p:ext uri="{BB962C8B-B14F-4D97-AF65-F5344CB8AC3E}">
+        <p14:creationId xmlns:p14="http://schemas.microsoft.com/office/powerpoint/2010/main" val="3835220388"/>
+      </p:ext>
+    </p:extLst>
+  </p:cSld>
+  <p:clrMapOvr>
+    <a:masterClrMapping/>
+  </p:clrMapOvr>
+</p:sld>
+</file>
+
+<file path=ppt/slides/slide12.xml><?xml version="1.0" encoding="utf-8"?>
+<p:sld xmlns:a="http://schemas.openxmlformats.org/drawingml/2006/main" xmlns:r="http://schemas.openxmlformats.org/officeDocument/2006/relationships" xmlns:p="http://schemas.openxmlformats.org/presentationml/2006/main">
+  <p:cSld>
+    <p:spTree>
+      <p:nvGrpSpPr>
+        <p:cNvPr id="1" name=""/>
+        <p:cNvGrpSpPr/>
+        <p:nvPr/>
+      </p:nvGrpSpPr>
+      <p:grpSpPr>
+        <a:xfrm>
+          <a:off x="0" y="0"/>
+          <a:ext cx="0" cy="0"/>
+          <a:chOff x="0" y="0"/>
+          <a:chExt cx="0" cy="0"/>
+        </a:xfrm>
+      </p:grpSpPr>
+      <p:sp>
+        <p:nvSpPr>
+          <p:cNvPr id="7" name="CuadroTexto 6">
+            <a:extLst>
+              <a:ext uri="{FF2B5EF4-FFF2-40B4-BE49-F238E27FC236}">
+                <a16:creationId xmlns:a16="http://schemas.microsoft.com/office/drawing/2014/main" id="{67A20B4B-ADE6-40C7-B898-40DAA802D524}"/>
+              </a:ext>
+            </a:extLst>
+          </p:cNvPr>
+          <p:cNvSpPr txBox="1"/>
+          <p:nvPr/>
+        </p:nvSpPr>
+        <p:spPr>
+          <a:xfrm>
+            <a:off x="135904" y="2413337"/>
+            <a:ext cx="2054087" cy="2031325"/>
+          </a:xfrm>
+          <a:prstGeom prst="rect">
+            <a:avLst/>
+          </a:prstGeom>
+          <a:noFill/>
+          <a:ln>
+            <a:solidFill>
+              <a:schemeClr val="tx1"/>
+            </a:solidFill>
+          </a:ln>
+        </p:spPr>
+        <p:txBody>
+          <a:bodyPr wrap="square" rtlCol="0">
+            <a:spAutoFit/>
+          </a:bodyPr>
+          <a:lstStyle/>
+          <a:p>
+            <a:pPr marL="285750" indent="-285750">
+              <a:buFont typeface="Wingdings" panose="05000000000000000000" pitchFamily="2" charset="2"/>
+              <a:buChar char="q"/>
+            </a:pPr>
+            <a:r>
+              <a:rPr lang="es-ES"/>
+              <a:t>Presentación</a:t>
+            </a:r>
+          </a:p>
+          <a:p>
+            <a:pPr marL="285750" indent="-285750">
+              <a:buFont typeface="Wingdings" panose="05000000000000000000" pitchFamily="2" charset="2"/>
+              <a:buChar char="q"/>
+            </a:pPr>
+            <a:r>
+              <a:rPr lang="es-ES"/>
+              <a:t>Objetivos</a:t>
+            </a:r>
+          </a:p>
+          <a:p>
+            <a:pPr marL="285750" indent="-285750">
+              <a:buFont typeface="Wingdings" panose="05000000000000000000" pitchFamily="2" charset="2"/>
+              <a:buChar char="q"/>
+            </a:pPr>
+            <a:r>
+              <a:rPr lang="es-ES"/>
+              <a:t>Funcionalidades</a:t>
+            </a:r>
+          </a:p>
+          <a:p>
+            <a:pPr marL="285750" indent="-285750">
+              <a:buFont typeface="Wingdings" panose="05000000000000000000" pitchFamily="2" charset="2"/>
+              <a:buChar char="q"/>
+            </a:pPr>
+            <a:r>
+              <a:rPr lang="es-ES" b="1"/>
+              <a:t>Demostración</a:t>
+            </a:r>
+            <a:endParaRPr lang="es-ES"/>
+          </a:p>
+          <a:p>
+            <a:pPr marL="285750" indent="-285750">
+              <a:buFont typeface="Wingdings" panose="05000000000000000000" pitchFamily="2" charset="2"/>
+              <a:buChar char="q"/>
+            </a:pPr>
+            <a:r>
+              <a:rPr lang="es-ES"/>
+              <a:t>Aspectos</a:t>
+            </a:r>
+          </a:p>
+          <a:p>
+            <a:pPr marL="285750" indent="-285750">
+              <a:buFont typeface="Wingdings" panose="05000000000000000000" pitchFamily="2" charset="2"/>
+              <a:buChar char="q"/>
+            </a:pPr>
+            <a:r>
+              <a:rPr lang="es-ES"/>
+              <a:t>Conclusiones</a:t>
+            </a:r>
+          </a:p>
+          <a:p>
+            <a:endParaRPr lang="es-ES" dirty="0"/>
+          </a:p>
+        </p:txBody>
+      </p:sp>
+      <p:pic>
+        <p:nvPicPr>
+          <p:cNvPr id="6" name="Marcador de contenido 5" descr="Imagen que contiene captura de pantalla&#10;&#10;Descripción generada automáticamente">
+            <a:extLst>
+              <a:ext uri="{FF2B5EF4-FFF2-40B4-BE49-F238E27FC236}">
+                <a16:creationId xmlns:a16="http://schemas.microsoft.com/office/drawing/2014/main" id="{92CAE9D1-16CA-4BA7-AD1D-319BE04D34FD}"/>
+              </a:ext>
+            </a:extLst>
+          </p:cNvPr>
+          <p:cNvPicPr>
+            <a:picLocks noGrp="1" noChangeAspect="1"/>
+          </p:cNvPicPr>
+          <p:nvPr>
+            <p:ph idx="1"/>
+          </p:nvPr>
+        </p:nvPicPr>
+        <p:blipFill>
+          <a:blip r:embed="rId2"/>
+          <a:stretch>
+            <a:fillRect/>
+          </a:stretch>
+        </p:blipFill>
+        <p:spPr>
+          <a:xfrm>
+            <a:off x="2613900" y="145493"/>
+            <a:ext cx="8417623" cy="3771664"/>
+          </a:xfrm>
+          <a:prstGeom prst="rect">
+            <a:avLst/>
+          </a:prstGeom>
+          <a:effectLst/>
+        </p:spPr>
+      </p:pic>
+      <p:pic>
+        <p:nvPicPr>
+          <p:cNvPr id="8" name="Marcador de contenido 3" descr="Imagen que contiene captura de pantalla&#10;&#10;Descripción generada automáticamente">
+            <a:extLst>
+              <a:ext uri="{FF2B5EF4-FFF2-40B4-BE49-F238E27FC236}">
+                <a16:creationId xmlns:a16="http://schemas.microsoft.com/office/drawing/2014/main" id="{D3A7FC9D-AC14-4FA4-827D-E8720D6BF355}"/>
+              </a:ext>
+            </a:extLst>
+          </p:cNvPr>
+          <p:cNvPicPr>
+            <a:picLocks noChangeAspect="1"/>
+          </p:cNvPicPr>
+          <p:nvPr/>
+        </p:nvPicPr>
+        <p:blipFill>
+          <a:blip r:embed="rId3"/>
+          <a:stretch>
+            <a:fillRect/>
+          </a:stretch>
+        </p:blipFill>
+        <p:spPr>
+          <a:xfrm>
+            <a:off x="3993160" y="4146880"/>
+            <a:ext cx="7038363" cy="1995529"/>
+          </a:xfrm>
+          <a:prstGeom prst="rect">
+            <a:avLst/>
+          </a:prstGeom>
+          <a:effectLst/>
+        </p:spPr>
+      </p:pic>
+    </p:spTree>
+    <p:extLst>
+      <p:ext uri="{BB962C8B-B14F-4D97-AF65-F5344CB8AC3E}">
+        <p14:creationId xmlns:p14="http://schemas.microsoft.com/office/powerpoint/2010/main" val="3121423524"/>
+      </p:ext>
+    </p:extLst>
+  </p:cSld>
+  <p:clrMapOvr>
+    <a:masterClrMapping/>
+  </p:clrMapOvr>
+</p:sld>
+</file>
+
+<file path=ppt/slides/slide13.xml><?xml version="1.0" encoding="utf-8"?>
+<p:sld xmlns:a="http://schemas.openxmlformats.org/drawingml/2006/main" xmlns:r="http://schemas.openxmlformats.org/officeDocument/2006/relationships" xmlns:p="http://schemas.openxmlformats.org/presentationml/2006/main">
+  <p:cSld>
+    <p:spTree>
+      <p:nvGrpSpPr>
+        <p:cNvPr id="1" name=""/>
+        <p:cNvGrpSpPr/>
+        <p:nvPr/>
+      </p:nvGrpSpPr>
+      <p:grpSpPr>
+        <a:xfrm>
+          <a:off x="0" y="0"/>
+          <a:ext cx="0" cy="0"/>
+          <a:chOff x="0" y="0"/>
+          <a:chExt cx="0" cy="0"/>
+        </a:xfrm>
+      </p:grpSpPr>
+      <p:sp>
+        <p:nvSpPr>
+          <p:cNvPr id="7" name="CuadroTexto 6">
+            <a:extLst>
+              <a:ext uri="{FF2B5EF4-FFF2-40B4-BE49-F238E27FC236}">
+                <a16:creationId xmlns:a16="http://schemas.microsoft.com/office/drawing/2014/main" id="{67A20B4B-ADE6-40C7-B898-40DAA802D524}"/>
+              </a:ext>
+            </a:extLst>
+          </p:cNvPr>
+          <p:cNvSpPr txBox="1"/>
+          <p:nvPr/>
+        </p:nvSpPr>
+        <p:spPr>
+          <a:xfrm>
+            <a:off x="135904" y="2413337"/>
+            <a:ext cx="2054087" cy="2031325"/>
+          </a:xfrm>
+          <a:prstGeom prst="rect">
+            <a:avLst/>
+          </a:prstGeom>
+          <a:noFill/>
+          <a:ln>
+            <a:solidFill>
+              <a:schemeClr val="tx1"/>
+            </a:solidFill>
+          </a:ln>
+        </p:spPr>
+        <p:txBody>
+          <a:bodyPr wrap="square" rtlCol="0">
+            <a:spAutoFit/>
+          </a:bodyPr>
+          <a:lstStyle/>
+          <a:p>
+            <a:pPr marL="285750" indent="-285750">
+              <a:buFont typeface="Wingdings" panose="05000000000000000000" pitchFamily="2" charset="2"/>
+              <a:buChar char="q"/>
+            </a:pPr>
+            <a:r>
+              <a:rPr lang="es-ES"/>
+              <a:t>Presentación</a:t>
+            </a:r>
+          </a:p>
+          <a:p>
+            <a:pPr marL="285750" indent="-285750">
+              <a:buFont typeface="Wingdings" panose="05000000000000000000" pitchFamily="2" charset="2"/>
+              <a:buChar char="q"/>
+            </a:pPr>
+            <a:r>
+              <a:rPr lang="es-ES"/>
+              <a:t>Objetivos</a:t>
+            </a:r>
+          </a:p>
+          <a:p>
+            <a:pPr marL="285750" indent="-285750">
+              <a:buFont typeface="Wingdings" panose="05000000000000000000" pitchFamily="2" charset="2"/>
+              <a:buChar char="q"/>
+            </a:pPr>
+            <a:r>
+              <a:rPr lang="es-ES"/>
+              <a:t>Funcionalidades</a:t>
+            </a:r>
+          </a:p>
+          <a:p>
+            <a:pPr marL="285750" indent="-285750">
+              <a:buFont typeface="Wingdings" panose="05000000000000000000" pitchFamily="2" charset="2"/>
+              <a:buChar char="q"/>
+            </a:pPr>
+            <a:r>
+              <a:rPr lang="es-ES" b="1"/>
+              <a:t>Demostración</a:t>
+            </a:r>
+            <a:endParaRPr lang="es-ES"/>
+          </a:p>
+          <a:p>
+            <a:pPr marL="285750" indent="-285750">
+              <a:buFont typeface="Wingdings" panose="05000000000000000000" pitchFamily="2" charset="2"/>
+              <a:buChar char="q"/>
+            </a:pPr>
+            <a:r>
+              <a:rPr lang="es-ES"/>
+              <a:t>Aspectos</a:t>
+            </a:r>
+          </a:p>
+          <a:p>
+            <a:pPr marL="285750" indent="-285750">
+              <a:buFont typeface="Wingdings" panose="05000000000000000000" pitchFamily="2" charset="2"/>
+              <a:buChar char="q"/>
+            </a:pPr>
+            <a:r>
+              <a:rPr lang="es-ES"/>
+              <a:t>Conclusiones</a:t>
+            </a:r>
+          </a:p>
+          <a:p>
+            <a:endParaRPr lang="es-ES" dirty="0"/>
+          </a:p>
+        </p:txBody>
+      </p:sp>
+      <p:pic>
+        <p:nvPicPr>
+          <p:cNvPr id="9" name="Marcador de contenido 3" descr="Imagen que contiene captura de pantalla&#10;&#10;Descripción generada automáticamente">
+            <a:extLst>
+              <a:ext uri="{FF2B5EF4-FFF2-40B4-BE49-F238E27FC236}">
+                <a16:creationId xmlns:a16="http://schemas.microsoft.com/office/drawing/2014/main" id="{50D6E0F9-B539-453C-A39B-51576BC1DEC5}"/>
+              </a:ext>
+            </a:extLst>
+          </p:cNvPr>
+          <p:cNvPicPr>
+            <a:picLocks noGrp="1" noChangeAspect="1"/>
+          </p:cNvPicPr>
+          <p:nvPr>
+            <p:ph idx="1"/>
+          </p:nvPr>
+        </p:nvPicPr>
+        <p:blipFill>
+          <a:blip r:embed="rId2"/>
+          <a:stretch>
+            <a:fillRect/>
+          </a:stretch>
+        </p:blipFill>
+        <p:spPr>
+          <a:xfrm>
+            <a:off x="2391327" y="687199"/>
+            <a:ext cx="8694559" cy="5168316"/>
+          </a:xfrm>
+          <a:prstGeom prst="rect">
+            <a:avLst/>
+          </a:prstGeom>
+        </p:spPr>
+      </p:pic>
+    </p:spTree>
+    <p:extLst>
+      <p:ext uri="{BB962C8B-B14F-4D97-AF65-F5344CB8AC3E}">
+        <p14:creationId xmlns:p14="http://schemas.microsoft.com/office/powerpoint/2010/main" val="4120472613"/>
+      </p:ext>
+    </p:extLst>
+  </p:cSld>
+  <p:clrMapOvr>
+    <a:masterClrMapping/>
+  </p:clrMapOvr>
+</p:sld>
+</file>
+
+<file path=ppt/slides/slide14.xml><?xml version="1.0" encoding="utf-8"?>
+<p:sld xmlns:a="http://schemas.openxmlformats.org/drawingml/2006/main" xmlns:r="http://schemas.openxmlformats.org/officeDocument/2006/relationships" xmlns:p="http://schemas.openxmlformats.org/presentationml/2006/main">
+  <p:cSld>
+    <p:spTree>
+      <p:nvGrpSpPr>
+        <p:cNvPr id="1" name=""/>
+        <p:cNvGrpSpPr/>
+        <p:nvPr/>
+      </p:nvGrpSpPr>
+      <p:grpSpPr>
+        <a:xfrm>
+          <a:off x="0" y="0"/>
+          <a:ext cx="0" cy="0"/>
+          <a:chOff x="0" y="0"/>
+          <a:chExt cx="0" cy="0"/>
+        </a:xfrm>
+      </p:grpSpPr>
+      <p:sp>
+        <p:nvSpPr>
+          <p:cNvPr id="7" name="CuadroTexto 6">
+            <a:extLst>
+              <a:ext uri="{FF2B5EF4-FFF2-40B4-BE49-F238E27FC236}">
+                <a16:creationId xmlns:a16="http://schemas.microsoft.com/office/drawing/2014/main" id="{67A20B4B-ADE6-40C7-B898-40DAA802D524}"/>
+              </a:ext>
+            </a:extLst>
+          </p:cNvPr>
+          <p:cNvSpPr txBox="1"/>
+          <p:nvPr/>
+        </p:nvSpPr>
+        <p:spPr>
+          <a:xfrm>
+            <a:off x="135904" y="2413337"/>
+            <a:ext cx="2054087" cy="2031325"/>
+          </a:xfrm>
+          <a:prstGeom prst="rect">
+            <a:avLst/>
+          </a:prstGeom>
+          <a:noFill/>
+          <a:ln>
+            <a:solidFill>
+              <a:schemeClr val="tx1"/>
+            </a:solidFill>
+          </a:ln>
+        </p:spPr>
+        <p:txBody>
+          <a:bodyPr wrap="square" rtlCol="0">
+            <a:spAutoFit/>
+          </a:bodyPr>
+          <a:lstStyle/>
+          <a:p>
+            <a:pPr marL="285750" indent="-285750">
+              <a:buFont typeface="Wingdings" panose="05000000000000000000" pitchFamily="2" charset="2"/>
+              <a:buChar char="q"/>
+            </a:pPr>
+            <a:r>
+              <a:rPr lang="es-ES"/>
+              <a:t>Presentación</a:t>
+            </a:r>
+          </a:p>
+          <a:p>
+            <a:pPr marL="285750" indent="-285750">
+              <a:buFont typeface="Wingdings" panose="05000000000000000000" pitchFamily="2" charset="2"/>
+              <a:buChar char="q"/>
+            </a:pPr>
+            <a:r>
+              <a:rPr lang="es-ES"/>
+              <a:t>Objetivos</a:t>
+            </a:r>
+          </a:p>
+          <a:p>
+            <a:pPr marL="285750" indent="-285750">
+              <a:buFont typeface="Wingdings" panose="05000000000000000000" pitchFamily="2" charset="2"/>
+              <a:buChar char="q"/>
+            </a:pPr>
+            <a:r>
+              <a:rPr lang="es-ES"/>
+              <a:t>Funcionalidades</a:t>
+            </a:r>
+          </a:p>
+          <a:p>
+            <a:pPr marL="285750" indent="-285750">
+              <a:buFont typeface="Wingdings" panose="05000000000000000000" pitchFamily="2" charset="2"/>
+              <a:buChar char="q"/>
+            </a:pPr>
+            <a:r>
+              <a:rPr lang="es-ES" b="1"/>
+              <a:t>Demostración</a:t>
+            </a:r>
+            <a:endParaRPr lang="es-ES"/>
+          </a:p>
+          <a:p>
+            <a:pPr marL="285750" indent="-285750">
+              <a:buFont typeface="Wingdings" panose="05000000000000000000" pitchFamily="2" charset="2"/>
+              <a:buChar char="q"/>
+            </a:pPr>
+            <a:r>
+              <a:rPr lang="es-ES"/>
+              <a:t>Aspectos</a:t>
+            </a:r>
+          </a:p>
+          <a:p>
+            <a:pPr marL="285750" indent="-285750">
+              <a:buFont typeface="Wingdings" panose="05000000000000000000" pitchFamily="2" charset="2"/>
+              <a:buChar char="q"/>
+            </a:pPr>
+            <a:r>
+              <a:rPr lang="es-ES"/>
+              <a:t>Conclusiones</a:t>
+            </a:r>
+          </a:p>
+          <a:p>
+            <a:endParaRPr lang="es-ES" dirty="0"/>
+          </a:p>
+        </p:txBody>
+      </p:sp>
+      <p:pic>
+        <p:nvPicPr>
+          <p:cNvPr id="6" name="Marcador de contenido 5">
+            <a:extLst>
+              <a:ext uri="{FF2B5EF4-FFF2-40B4-BE49-F238E27FC236}">
+                <a16:creationId xmlns:a16="http://schemas.microsoft.com/office/drawing/2014/main" id="{39C9F34C-C44C-407B-B205-37C58873C01D}"/>
+              </a:ext>
+            </a:extLst>
+          </p:cNvPr>
+          <p:cNvPicPr>
+            <a:picLocks noGrp="1" noChangeAspect="1"/>
+          </p:cNvPicPr>
+          <p:nvPr>
+            <p:ph idx="1"/>
+          </p:nvPr>
+        </p:nvPicPr>
+        <p:blipFill>
+          <a:blip r:embed="rId2"/>
+          <a:stretch>
+            <a:fillRect/>
+          </a:stretch>
+        </p:blipFill>
+        <p:spPr>
+          <a:xfrm>
+            <a:off x="3192104" y="536704"/>
+            <a:ext cx="7444746" cy="3871710"/>
+          </a:xfrm>
+          <a:prstGeom prst="rect">
+            <a:avLst/>
+          </a:prstGeom>
+        </p:spPr>
+      </p:pic>
+      <p:pic>
+        <p:nvPicPr>
+          <p:cNvPr id="8" name="Marcador de contenido 3">
+            <a:extLst>
+              <a:ext uri="{FF2B5EF4-FFF2-40B4-BE49-F238E27FC236}">
+                <a16:creationId xmlns:a16="http://schemas.microsoft.com/office/drawing/2014/main" id="{E744FC30-8AAD-4040-B01E-FFFBFF817D71}"/>
+              </a:ext>
+            </a:extLst>
+          </p:cNvPr>
+          <p:cNvPicPr>
+            <a:picLocks noChangeAspect="1"/>
+          </p:cNvPicPr>
+          <p:nvPr/>
+        </p:nvPicPr>
+        <p:blipFill rotWithShape="1">
+          <a:blip r:embed="rId3"/>
+          <a:srcRect b="54918"/>
+          <a:stretch/>
+        </p:blipFill>
+        <p:spPr>
+          <a:xfrm>
+            <a:off x="3768978" y="4661507"/>
+            <a:ext cx="6290997" cy="1362966"/>
+          </a:xfrm>
+          <a:prstGeom prst="rect">
+            <a:avLst/>
+          </a:prstGeom>
+        </p:spPr>
+      </p:pic>
+    </p:spTree>
+    <p:extLst>
+      <p:ext uri="{BB962C8B-B14F-4D97-AF65-F5344CB8AC3E}">
+        <p14:creationId xmlns:p14="http://schemas.microsoft.com/office/powerpoint/2010/main" val="3470985900"/>
+      </p:ext>
+    </p:extLst>
+  </p:cSld>
+  <p:clrMapOvr>
+    <a:masterClrMapping/>
+  </p:clrMapOvr>
+</p:sld>
+</file>
+
+<file path=ppt/slides/slide15.xml><?xml version="1.0" encoding="utf-8"?>
+<p:sld xmlns:a="http://schemas.openxmlformats.org/drawingml/2006/main" xmlns:r="http://schemas.openxmlformats.org/officeDocument/2006/relationships" xmlns:p="http://schemas.openxmlformats.org/presentationml/2006/main">
+  <p:cSld>
+    <p:spTree>
+      <p:nvGrpSpPr>
+        <p:cNvPr id="1" name=""/>
+        <p:cNvGrpSpPr/>
+        <p:nvPr/>
+      </p:nvGrpSpPr>
+      <p:grpSpPr>
+        <a:xfrm>
+          <a:off x="0" y="0"/>
+          <a:ext cx="0" cy="0"/>
+          <a:chOff x="0" y="0"/>
+          <a:chExt cx="0" cy="0"/>
+        </a:xfrm>
+      </p:grpSpPr>
+      <p:sp>
+        <p:nvSpPr>
+          <p:cNvPr id="7" name="CuadroTexto 6">
+            <a:extLst>
+              <a:ext uri="{FF2B5EF4-FFF2-40B4-BE49-F238E27FC236}">
+                <a16:creationId xmlns:a16="http://schemas.microsoft.com/office/drawing/2014/main" id="{67A20B4B-ADE6-40C7-B898-40DAA802D524}"/>
+              </a:ext>
+            </a:extLst>
+          </p:cNvPr>
+          <p:cNvSpPr txBox="1"/>
+          <p:nvPr/>
+        </p:nvSpPr>
+        <p:spPr>
+          <a:xfrm>
+            <a:off x="135904" y="2413337"/>
+            <a:ext cx="2054087" cy="2031325"/>
+          </a:xfrm>
+          <a:prstGeom prst="rect">
+            <a:avLst/>
+          </a:prstGeom>
+          <a:noFill/>
+          <a:ln>
+            <a:solidFill>
+              <a:schemeClr val="tx1"/>
+            </a:solidFill>
+          </a:ln>
+        </p:spPr>
+        <p:txBody>
+          <a:bodyPr wrap="square" rtlCol="0">
+            <a:spAutoFit/>
+          </a:bodyPr>
+          <a:lstStyle/>
+          <a:p>
+            <a:pPr marL="285750" indent="-285750">
+              <a:buFont typeface="Wingdings" panose="05000000000000000000" pitchFamily="2" charset="2"/>
+              <a:buChar char="q"/>
+            </a:pPr>
+            <a:r>
+              <a:rPr lang="es-ES"/>
+              <a:t>Presentación</a:t>
+            </a:r>
+          </a:p>
+          <a:p>
+            <a:pPr marL="285750" indent="-285750">
+              <a:buFont typeface="Wingdings" panose="05000000000000000000" pitchFamily="2" charset="2"/>
+              <a:buChar char="q"/>
+            </a:pPr>
+            <a:r>
+              <a:rPr lang="es-ES"/>
+              <a:t>Objetivos</a:t>
+            </a:r>
+          </a:p>
+          <a:p>
+            <a:pPr marL="285750" indent="-285750">
+              <a:buFont typeface="Wingdings" panose="05000000000000000000" pitchFamily="2" charset="2"/>
+              <a:buChar char="q"/>
+            </a:pPr>
+            <a:r>
+              <a:rPr lang="es-ES"/>
+              <a:t>Funcionalidades</a:t>
+            </a:r>
+          </a:p>
+          <a:p>
+            <a:pPr marL="285750" indent="-285750">
+              <a:buFont typeface="Wingdings" panose="05000000000000000000" pitchFamily="2" charset="2"/>
+              <a:buChar char="q"/>
+            </a:pPr>
+            <a:r>
+              <a:rPr lang="es-ES" b="1"/>
+              <a:t>Demostración</a:t>
+            </a:r>
+            <a:endParaRPr lang="es-ES"/>
+          </a:p>
+          <a:p>
+            <a:pPr marL="285750" indent="-285750">
+              <a:buFont typeface="Wingdings" panose="05000000000000000000" pitchFamily="2" charset="2"/>
+              <a:buChar char="q"/>
+            </a:pPr>
+            <a:r>
+              <a:rPr lang="es-ES"/>
+              <a:t>Aspectos</a:t>
+            </a:r>
+          </a:p>
+          <a:p>
+            <a:pPr marL="285750" indent="-285750">
+              <a:buFont typeface="Wingdings" panose="05000000000000000000" pitchFamily="2" charset="2"/>
+              <a:buChar char="q"/>
+            </a:pPr>
+            <a:r>
+              <a:rPr lang="es-ES"/>
+              <a:t>Conclusiones</a:t>
+            </a:r>
+          </a:p>
+          <a:p>
+            <a:endParaRPr lang="es-ES" dirty="0"/>
+          </a:p>
+        </p:txBody>
+      </p:sp>
+      <p:pic>
+        <p:nvPicPr>
+          <p:cNvPr id="9" name="Marcador de contenido 8">
+            <a:extLst>
+              <a:ext uri="{FF2B5EF4-FFF2-40B4-BE49-F238E27FC236}">
+                <a16:creationId xmlns:a16="http://schemas.microsoft.com/office/drawing/2014/main" id="{21DA43AF-F472-46FF-8DF6-DB7FF12B2481}"/>
+              </a:ext>
+            </a:extLst>
+          </p:cNvPr>
+          <p:cNvPicPr>
+            <a:picLocks noGrp="1" noChangeAspect="1"/>
+          </p:cNvPicPr>
+          <p:nvPr>
+            <p:ph idx="1"/>
+          </p:nvPr>
+        </p:nvPicPr>
+        <p:blipFill>
+          <a:blip r:embed="rId2"/>
+          <a:stretch>
+            <a:fillRect/>
+          </a:stretch>
+        </p:blipFill>
+        <p:spPr>
+          <a:xfrm>
+            <a:off x="2213039" y="-19964"/>
+            <a:ext cx="7779846" cy="4464625"/>
+          </a:xfrm>
+          <a:prstGeom prst="rect">
+            <a:avLst/>
+          </a:prstGeom>
+        </p:spPr>
+      </p:pic>
+      <p:pic>
+        <p:nvPicPr>
+          <p:cNvPr id="10" name="Marcador de contenido 7">
+            <a:extLst>
+              <a:ext uri="{FF2B5EF4-FFF2-40B4-BE49-F238E27FC236}">
+                <a16:creationId xmlns:a16="http://schemas.microsoft.com/office/drawing/2014/main" id="{3D6A3C02-325D-4950-919B-894B41AC881F}"/>
+              </a:ext>
+            </a:extLst>
+          </p:cNvPr>
+          <p:cNvPicPr>
+            <a:picLocks noChangeAspect="1"/>
+          </p:cNvPicPr>
+          <p:nvPr/>
+        </p:nvPicPr>
+        <p:blipFill>
+          <a:blip r:embed="rId3"/>
+          <a:stretch>
+            <a:fillRect/>
+          </a:stretch>
+        </p:blipFill>
+        <p:spPr>
+          <a:xfrm>
+            <a:off x="5348311" y="3655439"/>
+            <a:ext cx="6843689" cy="3202561"/>
+          </a:xfrm>
+          <a:prstGeom prst="rect">
+            <a:avLst/>
+          </a:prstGeom>
+        </p:spPr>
+      </p:pic>
+    </p:spTree>
+    <p:extLst>
+      <p:ext uri="{BB962C8B-B14F-4D97-AF65-F5344CB8AC3E}">
+        <p14:creationId xmlns:p14="http://schemas.microsoft.com/office/powerpoint/2010/main" val="4018788393"/>
+      </p:ext>
+    </p:extLst>
+  </p:cSld>
+  <p:clrMapOvr>
+    <a:masterClrMapping/>
+  </p:clrMapOvr>
+</p:sld>
+</file>
+
+<file path=ppt/slides/slide16.xml><?xml version="1.0" encoding="utf-8"?>
+<p:sld xmlns:a="http://schemas.openxmlformats.org/drawingml/2006/main" xmlns:r="http://schemas.openxmlformats.org/officeDocument/2006/relationships" xmlns:p="http://schemas.openxmlformats.org/presentationml/2006/main">
+  <p:cSld>
+    <p:spTree>
+      <p:nvGrpSpPr>
+        <p:cNvPr id="1" name=""/>
+        <p:cNvGrpSpPr/>
+        <p:nvPr/>
+      </p:nvGrpSpPr>
+      <p:grpSpPr>
+        <a:xfrm>
+          <a:off x="0" y="0"/>
+          <a:ext cx="0" cy="0"/>
+          <a:chOff x="0" y="0"/>
+          <a:chExt cx="0" cy="0"/>
+        </a:xfrm>
+      </p:grpSpPr>
+      <p:sp>
+        <p:nvSpPr>
+          <p:cNvPr id="7" name="CuadroTexto 6">
+            <a:extLst>
+              <a:ext uri="{FF2B5EF4-FFF2-40B4-BE49-F238E27FC236}">
+                <a16:creationId xmlns:a16="http://schemas.microsoft.com/office/drawing/2014/main" id="{67A20B4B-ADE6-40C7-B898-40DAA802D524}"/>
+              </a:ext>
+            </a:extLst>
+          </p:cNvPr>
+          <p:cNvSpPr txBox="1"/>
+          <p:nvPr/>
+        </p:nvSpPr>
+        <p:spPr>
+          <a:xfrm>
+            <a:off x="135904" y="2413337"/>
+            <a:ext cx="2054087" cy="2031325"/>
+          </a:xfrm>
+          <a:prstGeom prst="rect">
+            <a:avLst/>
+          </a:prstGeom>
+          <a:noFill/>
+          <a:ln>
+            <a:solidFill>
+              <a:schemeClr val="tx1"/>
+            </a:solidFill>
+          </a:ln>
+        </p:spPr>
+        <p:txBody>
+          <a:bodyPr wrap="square" rtlCol="0">
+            <a:spAutoFit/>
+          </a:bodyPr>
+          <a:lstStyle/>
+          <a:p>
+            <a:pPr marL="285750" indent="-285750">
+              <a:buFont typeface="Wingdings" panose="05000000000000000000" pitchFamily="2" charset="2"/>
+              <a:buChar char="q"/>
+            </a:pPr>
+            <a:r>
+              <a:rPr lang="es-ES"/>
+              <a:t>Presentación</a:t>
+            </a:r>
+          </a:p>
+          <a:p>
+            <a:pPr marL="285750" indent="-285750">
+              <a:buFont typeface="Wingdings" panose="05000000000000000000" pitchFamily="2" charset="2"/>
+              <a:buChar char="q"/>
+            </a:pPr>
+            <a:r>
+              <a:rPr lang="es-ES"/>
+              <a:t>Objetivos</a:t>
+            </a:r>
+          </a:p>
+          <a:p>
+            <a:pPr marL="285750" indent="-285750">
+              <a:buFont typeface="Wingdings" panose="05000000000000000000" pitchFamily="2" charset="2"/>
+              <a:buChar char="q"/>
+            </a:pPr>
+            <a:r>
+              <a:rPr lang="es-ES"/>
+              <a:t>Funcionalidades</a:t>
+            </a:r>
+          </a:p>
+          <a:p>
+            <a:pPr marL="285750" indent="-285750">
+              <a:buFont typeface="Wingdings" panose="05000000000000000000" pitchFamily="2" charset="2"/>
+              <a:buChar char="q"/>
+            </a:pPr>
+            <a:r>
+              <a:rPr lang="es-ES" b="1"/>
+              <a:t>Demostración</a:t>
+            </a:r>
+            <a:endParaRPr lang="es-ES"/>
+          </a:p>
+          <a:p>
+            <a:pPr marL="285750" indent="-285750">
+              <a:buFont typeface="Wingdings" panose="05000000000000000000" pitchFamily="2" charset="2"/>
+              <a:buChar char="q"/>
+            </a:pPr>
+            <a:r>
+              <a:rPr lang="es-ES"/>
+              <a:t>Aspectos</a:t>
+            </a:r>
+          </a:p>
+          <a:p>
+            <a:pPr marL="285750" indent="-285750">
+              <a:buFont typeface="Wingdings" panose="05000000000000000000" pitchFamily="2" charset="2"/>
+              <a:buChar char="q"/>
+            </a:pPr>
+            <a:r>
+              <a:rPr lang="es-ES"/>
+              <a:t>Conclusiones</a:t>
+            </a:r>
+          </a:p>
+          <a:p>
+            <a:endParaRPr lang="es-ES" dirty="0"/>
+          </a:p>
+        </p:txBody>
+      </p:sp>
+      <p:pic>
+        <p:nvPicPr>
+          <p:cNvPr id="8" name="Marcador de contenido 3">
+            <a:extLst>
+              <a:ext uri="{FF2B5EF4-FFF2-40B4-BE49-F238E27FC236}">
+                <a16:creationId xmlns:a16="http://schemas.microsoft.com/office/drawing/2014/main" id="{D19492BC-3457-424B-849E-647EDF22A106}"/>
+              </a:ext>
+            </a:extLst>
+          </p:cNvPr>
+          <p:cNvPicPr>
+            <a:picLocks noGrp="1" noChangeAspect="1"/>
+          </p:cNvPicPr>
+          <p:nvPr>
+            <p:ph idx="1"/>
+          </p:nvPr>
+        </p:nvPicPr>
+        <p:blipFill>
+          <a:blip r:embed="rId2"/>
+          <a:stretch>
+            <a:fillRect/>
+          </a:stretch>
+        </p:blipFill>
+        <p:spPr>
+          <a:xfrm>
+            <a:off x="2357687" y="1900490"/>
+            <a:ext cx="9698409" cy="3874667"/>
+          </a:xfrm>
+          <a:prstGeom prst="rect">
+            <a:avLst/>
+          </a:prstGeom>
+        </p:spPr>
+      </p:pic>
+      <p:sp>
+        <p:nvSpPr>
+          <p:cNvPr id="11" name="Título 1">
+            <a:extLst>
+              <a:ext uri="{FF2B5EF4-FFF2-40B4-BE49-F238E27FC236}">
+                <a16:creationId xmlns:a16="http://schemas.microsoft.com/office/drawing/2014/main" id="{01ABD189-6D78-494B-B880-A499B0B2B099}"/>
+              </a:ext>
+            </a:extLst>
+          </p:cNvPr>
+          <p:cNvSpPr>
+            <a:spLocks noGrp="1"/>
+          </p:cNvSpPr>
+          <p:nvPr>
+            <p:ph type="title"/>
+          </p:nvPr>
+        </p:nvSpPr>
+        <p:spPr>
+          <a:xfrm>
+            <a:off x="746620" y="913721"/>
+            <a:ext cx="9821411" cy="1499616"/>
+          </a:xfrm>
+        </p:spPr>
+        <p:txBody>
+          <a:bodyPr>
+            <a:normAutofit/>
+          </a:bodyPr>
+          <a:lstStyle/>
+          <a:p>
+            <a:r>
+              <a:rPr lang="es-ES" altLang="es-ES" sz="4400" dirty="0">
+                <a:latin typeface="Arial" panose="020B0604020202020204" pitchFamily="34" charset="0"/>
+              </a:rPr>
+              <a:t>Tarjetas de embarque</a:t>
+            </a:r>
+            <a:br>
+              <a:rPr lang="es-ES" altLang="es-ES" sz="4400" dirty="0">
+                <a:latin typeface="Arial" panose="020B0604020202020204" pitchFamily="34" charset="0"/>
+              </a:rPr>
+            </a:br>
+            <a:endParaRPr lang="es-ES" dirty="0"/>
+          </a:p>
+        </p:txBody>
+      </p:sp>
+    </p:spTree>
+    <p:extLst>
+      <p:ext uri="{BB962C8B-B14F-4D97-AF65-F5344CB8AC3E}">
+        <p14:creationId xmlns:p14="http://schemas.microsoft.com/office/powerpoint/2010/main" val="3286443158"/>
+      </p:ext>
+    </p:extLst>
+  </p:cSld>
+  <p:clrMapOvr>
+    <a:masterClrMapping/>
+  </p:clrMapOvr>
+</p:sld>
+</file>
+
+<file path=ppt/slides/slide17.xml><?xml version="1.0" encoding="utf-8"?>
+<p:sld xmlns:a="http://schemas.openxmlformats.org/drawingml/2006/main" xmlns:r="http://schemas.openxmlformats.org/officeDocument/2006/relationships" xmlns:p="http://schemas.openxmlformats.org/presentationml/2006/main">
+  <p:cSld>
+    <p:spTree>
+      <p:nvGrpSpPr>
+        <p:cNvPr id="1" name=""/>
+        <p:cNvGrpSpPr/>
+        <p:nvPr/>
+      </p:nvGrpSpPr>
+      <p:grpSpPr>
+        <a:xfrm>
+          <a:off x="0" y="0"/>
+          <a:ext cx="0" cy="0"/>
+          <a:chOff x="0" y="0"/>
+          <a:chExt cx="0" cy="0"/>
+        </a:xfrm>
+      </p:grpSpPr>
+      <p:sp>
+        <p:nvSpPr>
+          <p:cNvPr id="2" name="Título 1">
+            <a:extLst>
+              <a:ext uri="{FF2B5EF4-FFF2-40B4-BE49-F238E27FC236}">
+                <a16:creationId xmlns:a16="http://schemas.microsoft.com/office/drawing/2014/main" id="{AC7DBC01-8ECE-41C5-8E3F-384133D4DA41}"/>
+              </a:ext>
+            </a:extLst>
+          </p:cNvPr>
+          <p:cNvSpPr>
+            <a:spLocks noGrp="1"/>
+          </p:cNvSpPr>
+          <p:nvPr>
+            <p:ph type="title"/>
+          </p:nvPr>
+        </p:nvSpPr>
+        <p:spPr/>
+        <p:txBody>
+          <a:bodyPr/>
+          <a:lstStyle/>
+          <a:p>
+            <a:r>
+              <a:rPr lang="es-ES" sz="4400" dirty="0"/>
+              <a:t>Aspectos a resaltar:</a:t>
+            </a:r>
+            <a:endParaRPr lang="es-ES" dirty="0"/>
+          </a:p>
+        </p:txBody>
+      </p:sp>
+      <p:sp>
+        <p:nvSpPr>
+          <p:cNvPr id="3" name="Marcador de contenido 2">
+            <a:extLst>
+              <a:ext uri="{FF2B5EF4-FFF2-40B4-BE49-F238E27FC236}">
+                <a16:creationId xmlns:a16="http://schemas.microsoft.com/office/drawing/2014/main" id="{4385F995-2760-4091-A3CB-24ACD965BE59}"/>
+              </a:ext>
+            </a:extLst>
+          </p:cNvPr>
+          <p:cNvSpPr>
+            <a:spLocks noGrp="1"/>
+          </p:cNvSpPr>
+          <p:nvPr>
+            <p:ph idx="1"/>
+          </p:nvPr>
+        </p:nvSpPr>
+        <p:spPr>
+          <a:xfrm>
+            <a:off x="2189991" y="1853248"/>
+            <a:ext cx="8946541" cy="4195481"/>
+          </a:xfrm>
+        </p:spPr>
+        <p:txBody>
+          <a:bodyPr>
+            <a:normAutofit/>
+          </a:bodyPr>
+          <a:lstStyle/>
+          <a:p>
+            <a:r>
+              <a:rPr lang="es-ES" dirty="0"/>
+              <a:t>Uso de </a:t>
+            </a:r>
+            <a:r>
+              <a:rPr lang="es-ES" dirty="0" err="1"/>
+              <a:t>session</a:t>
+            </a:r>
+            <a:r>
+              <a:rPr lang="es-ES" dirty="0"/>
+              <a:t>.</a:t>
+            </a:r>
+          </a:p>
+          <a:p>
+            <a:pPr marL="0" indent="0">
+              <a:buNone/>
+            </a:pPr>
+            <a:endParaRPr lang="es-ES" dirty="0"/>
+          </a:p>
+          <a:p>
+            <a:r>
+              <a:rPr lang="es-ES" dirty="0"/>
+              <a:t>Uso de </a:t>
+            </a:r>
+            <a:r>
+              <a:rPr lang="es-ES" dirty="0" err="1"/>
+              <a:t>trello</a:t>
+            </a:r>
+            <a:r>
+              <a:rPr lang="es-ES" dirty="0"/>
+              <a:t>.</a:t>
+            </a:r>
+          </a:p>
+          <a:p>
+            <a:endParaRPr lang="es-ES" dirty="0"/>
+          </a:p>
+          <a:p>
+            <a:r>
+              <a:rPr lang="es-ES" dirty="0"/>
+              <a:t>Control de versiones:</a:t>
+            </a:r>
+          </a:p>
+          <a:p>
+            <a:pPr lvl="1"/>
+            <a:r>
+              <a:rPr lang="es-ES" dirty="0"/>
+              <a:t>La tradicional: por comandos.</a:t>
+            </a:r>
+          </a:p>
+          <a:p>
+            <a:pPr lvl="1"/>
+            <a:r>
+              <a:rPr lang="es-ES" dirty="0"/>
+              <a:t>La que nos ofrece VSC(Visual Studio </a:t>
+            </a:r>
+            <a:r>
+              <a:rPr lang="es-ES" dirty="0" err="1"/>
+              <a:t>Code</a:t>
+            </a:r>
+            <a:r>
+              <a:rPr lang="es-ES" dirty="0"/>
+              <a:t>).//Poner foto</a:t>
+            </a:r>
+          </a:p>
+          <a:p>
+            <a:endParaRPr lang="es-ES" dirty="0"/>
+          </a:p>
+          <a:p>
+            <a:r>
+              <a:rPr lang="es-ES" dirty="0"/>
+              <a:t>Metodologías de organización.</a:t>
+            </a:r>
+          </a:p>
+        </p:txBody>
+      </p:sp>
+      <p:sp>
+        <p:nvSpPr>
+          <p:cNvPr id="5" name="CuadroTexto 4">
+            <a:extLst>
+              <a:ext uri="{FF2B5EF4-FFF2-40B4-BE49-F238E27FC236}">
+                <a16:creationId xmlns:a16="http://schemas.microsoft.com/office/drawing/2014/main" id="{C68EC0AD-0AEE-4F4E-AEE1-28A128CF2A1A}"/>
+              </a:ext>
+            </a:extLst>
+          </p:cNvPr>
+          <p:cNvSpPr txBox="1"/>
+          <p:nvPr/>
+        </p:nvSpPr>
+        <p:spPr>
+          <a:xfrm>
+            <a:off x="135904" y="2413337"/>
+            <a:ext cx="2054087" cy="2031325"/>
+          </a:xfrm>
+          <a:prstGeom prst="rect">
+            <a:avLst/>
+          </a:prstGeom>
+          <a:noFill/>
+          <a:ln>
+            <a:solidFill>
+              <a:schemeClr val="tx1"/>
+            </a:solidFill>
+          </a:ln>
+        </p:spPr>
+        <p:txBody>
+          <a:bodyPr wrap="square" rtlCol="0">
+            <a:spAutoFit/>
+          </a:bodyPr>
+          <a:lstStyle/>
+          <a:p>
+            <a:pPr marL="285750" indent="-285750">
+              <a:buFont typeface="Wingdings" panose="05000000000000000000" pitchFamily="2" charset="2"/>
+              <a:buChar char="q"/>
+            </a:pPr>
+            <a:r>
               <a:rPr lang="es-ES" dirty="0"/>
               <a:t>Presentación</a:t>
             </a:r>
@@ -4384,7 +5533,7 @@
 </p:sld>
 </file>
 
-<file path=ppt/slides/slide12.xml><?xml version="1.0" encoding="utf-8"?>
+<file path=ppt/slides/slide18.xml><?xml version="1.0" encoding="utf-8"?>
 <p:sld xmlns:a="http://schemas.openxmlformats.org/drawingml/2006/main" xmlns:r="http://schemas.openxmlformats.org/officeDocument/2006/relationships" xmlns:p="http://schemas.openxmlformats.org/presentationml/2006/main">
   <p:cSld>
     <p:spTree>
@@ -4795,7 +5944,7 @@
         </p:nvSpPr>
         <p:spPr>
           <a:xfrm>
-            <a:off x="2189991" y="2052919"/>
+            <a:off x="2844332" y="2077303"/>
             <a:ext cx="8946541" cy="4195481"/>
           </a:xfrm>
         </p:spPr>
@@ -4838,7 +5987,7 @@
             </a:r>
             <a:r>
               <a:rPr lang="es-ES" dirty="0" err="1"/>
-              <a:t>Panagitidis</a:t>
+              <a:t>Panagiotidis</a:t>
             </a:r>
             <a:r>
               <a:rPr lang="es-ES" dirty="0"/>

</xml_diff>

<commit_message>
Arreglo de fallos y exportación a PDF
</commit_message>
<xml_diff>
--- a/AIRDSS.pptx
+++ b/AIRDSS.pptx
@@ -5,7 +5,7 @@
     <p:sldMasterId id="2147483648" r:id="rId1"/>
   </p:sldMasterIdLst>
   <p:notesMasterIdLst>
-    <p:notesMasterId r:id="rId29"/>
+    <p:notesMasterId r:id="rId28"/>
   </p:notesMasterIdLst>
   <p:sldIdLst>
     <p:sldId id="256" r:id="rId2"/>
@@ -32,9 +32,8 @@
     <p:sldId id="272" r:id="rId23"/>
     <p:sldId id="273" r:id="rId24"/>
     <p:sldId id="274" r:id="rId25"/>
-    <p:sldId id="275" r:id="rId26"/>
-    <p:sldId id="277" r:id="rId27"/>
-    <p:sldId id="276" r:id="rId28"/>
+    <p:sldId id="277" r:id="rId26"/>
+    <p:sldId id="276" r:id="rId27"/>
   </p:sldIdLst>
   <p:sldSz cx="12192000" cy="6858000"/>
   <p:notesSz cx="6858000" cy="9144000"/>
@@ -2372,7 +2371,7 @@
           </a:ln>
           <a:extLst>
             <a:ext uri="{C572A759-6A51-4108-AA02-DFA0A04FC94B}">
-              <ma14:wrappingTextBoxFlag xmlns="" xmlns:m="http://schemas.openxmlformats.org/officeDocument/2006/math" xmlns:a14="http://schemas.microsoft.com/office/drawing/2010/main" xmlns:ma14="http://schemas.microsoft.com/office/mac/drawingml/2011/main" val="1"/>
+              <ma14:wrappingTextBoxFlag xmlns:ma14="http://schemas.microsoft.com/office/mac/drawingml/2011/main" xmlns:a14="http://schemas.microsoft.com/office/drawing/2010/main" xmlns:m="http://schemas.openxmlformats.org/officeDocument/2006/math" xmlns="" val="1"/>
             </a:ext>
           </a:extLst>
         </p:spPr>
@@ -2411,7 +2410,7 @@
           </a:ln>
           <a:extLst>
             <a:ext uri="{C572A759-6A51-4108-AA02-DFA0A04FC94B}">
-              <ma14:wrappingTextBoxFlag xmlns="" xmlns:m="http://schemas.openxmlformats.org/officeDocument/2006/math" xmlns:a14="http://schemas.microsoft.com/office/drawing/2010/main" xmlns:ma14="http://schemas.microsoft.com/office/mac/drawingml/2011/main" val="1"/>
+              <ma14:wrappingTextBoxFlag xmlns:ma14="http://schemas.microsoft.com/office/mac/drawingml/2011/main" xmlns:a14="http://schemas.microsoft.com/office/drawing/2010/main" xmlns:m="http://schemas.openxmlformats.org/officeDocument/2006/math" xmlns="" val="1"/>
             </a:ext>
           </a:extLst>
         </p:spPr>
@@ -3528,7 +3527,7 @@
         <p:spPr>
           <a:xfrm>
             <a:off x="135904" y="2413337"/>
-            <a:ext cx="2054087" cy="2031325"/>
+            <a:ext cx="2054087" cy="1754326"/>
           </a:xfrm>
           <a:prstGeom prst="rect">
             <a:avLst/>
@@ -3605,9 +3604,6 @@
               <a:rPr lang="es-ES" dirty="0"/>
               <a:t>Conclusiones</a:t>
             </a:r>
-          </a:p>
-          <a:p>
-            <a:endParaRPr lang="es-ES" dirty="0"/>
           </a:p>
         </p:txBody>
       </p:sp>
@@ -3755,7 +3751,7 @@
         <p:spPr>
           <a:xfrm>
             <a:off x="5564666" y="1483916"/>
-            <a:ext cx="5731121" cy="369332"/>
+            <a:ext cx="5602816" cy="369332"/>
           </a:xfrm>
           <a:prstGeom prst="rect">
             <a:avLst/>
@@ -3771,7 +3767,7 @@
               <a:rPr lang="es-ES" altLang="es-ES" dirty="0">
                 <a:latin typeface="Arial" panose="020B0604020202020204" pitchFamily="34" charset="0"/>
               </a:rPr>
-              <a:t>Listar Cliente: Buscador, DNI=65, Fecha Descendente</a:t>
+              <a:t>Listar Cliente: Buscador, DNI=65, Fecha Ascendente</a:t>
             </a:r>
             <a:endParaRPr lang="es-ES" dirty="0"/>
           </a:p>
@@ -3792,7 +3788,7 @@
         <p:spPr>
           <a:xfrm>
             <a:off x="135904" y="2413337"/>
-            <a:ext cx="2054087" cy="2031325"/>
+            <a:ext cx="2054087" cy="1754326"/>
           </a:xfrm>
           <a:prstGeom prst="rect">
             <a:avLst/>
@@ -3869,9 +3865,6 @@
               <a:rPr lang="es-ES" dirty="0"/>
               <a:t>Conclusiones</a:t>
             </a:r>
-          </a:p>
-          <a:p>
-            <a:endParaRPr lang="es-ES" dirty="0"/>
           </a:p>
         </p:txBody>
       </p:sp>
@@ -4026,7 +4019,7 @@
         <p:spPr>
           <a:xfrm>
             <a:off x="135904" y="2413337"/>
-            <a:ext cx="2054087" cy="2031325"/>
+            <a:ext cx="2054087" cy="1754326"/>
           </a:xfrm>
           <a:prstGeom prst="rect">
             <a:avLst/>
@@ -4103,9 +4096,6 @@
               <a:rPr lang="es-ES" dirty="0"/>
               <a:t>Conclusiones</a:t>
             </a:r>
-          </a:p>
-          <a:p>
-            <a:endParaRPr lang="es-ES" dirty="0"/>
           </a:p>
         </p:txBody>
       </p:sp>
@@ -4260,7 +4250,7 @@
         <p:spPr>
           <a:xfrm>
             <a:off x="135904" y="2413337"/>
-            <a:ext cx="2054087" cy="2031325"/>
+            <a:ext cx="2054087" cy="1754326"/>
           </a:xfrm>
           <a:prstGeom prst="rect">
             <a:avLst/>
@@ -4337,9 +4327,6 @@
               <a:rPr lang="es-ES" dirty="0"/>
               <a:t>Conclusiones</a:t>
             </a:r>
-          </a:p>
-          <a:p>
-            <a:endParaRPr lang="es-ES" dirty="0"/>
           </a:p>
         </p:txBody>
       </p:sp>
@@ -4462,7 +4449,7 @@
           </a:ln>
           <a:extLst>
             <a:ext uri="{C572A759-6A51-4108-AA02-DFA0A04FC94B}">
-              <ma14:wrappingTextBoxFlag xmlns="" xmlns:m="http://schemas.openxmlformats.org/officeDocument/2006/math" xmlns:a14="http://schemas.microsoft.com/office/drawing/2010/main" xmlns:ma14="http://schemas.microsoft.com/office/mac/drawingml/2011/main" val="1"/>
+              <ma14:wrappingTextBoxFlag xmlns:ma14="http://schemas.microsoft.com/office/mac/drawingml/2011/main" xmlns:a14="http://schemas.microsoft.com/office/drawing/2010/main" xmlns:m="http://schemas.openxmlformats.org/officeDocument/2006/math" xmlns="" val="1"/>
             </a:ext>
           </a:extLst>
         </p:spPr>
@@ -4537,7 +4524,7 @@
           </a:ln>
           <a:extLst>
             <a:ext uri="{C572A759-6A51-4108-AA02-DFA0A04FC94B}">
-              <ma14:wrappingTextBoxFlag xmlns="" xmlns:m="http://schemas.openxmlformats.org/officeDocument/2006/math" xmlns:a14="http://schemas.microsoft.com/office/drawing/2010/main" xmlns:ma14="http://schemas.microsoft.com/office/mac/drawingml/2011/main" val="1"/>
+              <ma14:wrappingTextBoxFlag xmlns:ma14="http://schemas.microsoft.com/office/mac/drawingml/2011/main" xmlns:a14="http://schemas.microsoft.com/office/drawing/2010/main" xmlns:m="http://schemas.openxmlformats.org/officeDocument/2006/math" xmlns="" val="1"/>
             </a:ext>
           </a:extLst>
         </p:spPr>
@@ -4745,7 +4732,7 @@
           </a:ln>
           <a:extLst>
             <a:ext uri="{C572A759-6A51-4108-AA02-DFA0A04FC94B}">
-              <ma14:wrappingTextBoxFlag xmlns="" xmlns:m="http://schemas.openxmlformats.org/officeDocument/2006/math" xmlns:a14="http://schemas.microsoft.com/office/drawing/2010/main" xmlns:ma14="http://schemas.microsoft.com/office/mac/drawingml/2011/main" val="1"/>
+              <ma14:wrappingTextBoxFlag xmlns:ma14="http://schemas.microsoft.com/office/mac/drawingml/2011/main" xmlns:a14="http://schemas.microsoft.com/office/drawing/2010/main" xmlns:m="http://schemas.openxmlformats.org/officeDocument/2006/math" xmlns="" val="1"/>
             </a:ext>
           </a:extLst>
         </p:spPr>
@@ -4891,7 +4878,7 @@
           </a:ln>
           <a:extLst>
             <a:ext uri="{C572A759-6A51-4108-AA02-DFA0A04FC94B}">
-              <ma14:wrappingTextBoxFlag xmlns="" xmlns:m="http://schemas.openxmlformats.org/officeDocument/2006/math" xmlns:a14="http://schemas.microsoft.com/office/drawing/2010/main" xmlns:ma14="http://schemas.microsoft.com/office/mac/drawingml/2011/main" val="1"/>
+              <ma14:wrappingTextBoxFlag xmlns:ma14="http://schemas.microsoft.com/office/mac/drawingml/2011/main" xmlns:a14="http://schemas.microsoft.com/office/drawing/2010/main" xmlns:m="http://schemas.openxmlformats.org/officeDocument/2006/math" xmlns="" val="1"/>
             </a:ext>
           </a:extLst>
         </p:spPr>
@@ -5072,7 +5059,7 @@
           </a:ln>
           <a:extLst>
             <a:ext uri="{C572A759-6A51-4108-AA02-DFA0A04FC94B}">
-              <ma14:wrappingTextBoxFlag xmlns="" xmlns:m="http://schemas.openxmlformats.org/officeDocument/2006/math" xmlns:a14="http://schemas.microsoft.com/office/drawing/2010/main" xmlns:ma14="http://schemas.microsoft.com/office/mac/drawingml/2011/main" val="1"/>
+              <ma14:wrappingTextBoxFlag xmlns:ma14="http://schemas.microsoft.com/office/mac/drawingml/2011/main" xmlns:a14="http://schemas.microsoft.com/office/drawing/2010/main" xmlns:m="http://schemas.openxmlformats.org/officeDocument/2006/math" xmlns="" val="1"/>
             </a:ext>
           </a:extLst>
         </p:spPr>
@@ -5253,7 +5240,7 @@
           </a:ln>
           <a:extLst>
             <a:ext uri="{C572A759-6A51-4108-AA02-DFA0A04FC94B}">
-              <ma14:wrappingTextBoxFlag xmlns="" xmlns:m="http://schemas.openxmlformats.org/officeDocument/2006/math" xmlns:a14="http://schemas.microsoft.com/office/drawing/2010/main" xmlns:ma14="http://schemas.microsoft.com/office/mac/drawingml/2011/main" val="1"/>
+              <ma14:wrappingTextBoxFlag xmlns:ma14="http://schemas.microsoft.com/office/mac/drawingml/2011/main" xmlns:a14="http://schemas.microsoft.com/office/drawing/2010/main" xmlns:m="http://schemas.openxmlformats.org/officeDocument/2006/math" xmlns="" val="1"/>
             </a:ext>
           </a:extLst>
         </p:spPr>
@@ -5424,7 +5411,7 @@
           </a:ln>
           <a:extLst>
             <a:ext uri="{C572A759-6A51-4108-AA02-DFA0A04FC94B}">
-              <ma14:wrappingTextBoxFlag xmlns="" xmlns:m="http://schemas.openxmlformats.org/officeDocument/2006/math" xmlns:a14="http://schemas.microsoft.com/office/drawing/2010/main" xmlns:ma14="http://schemas.microsoft.com/office/mac/drawingml/2011/main" val="1"/>
+              <ma14:wrappingTextBoxFlag xmlns:ma14="http://schemas.microsoft.com/office/mac/drawingml/2011/main" xmlns:a14="http://schemas.microsoft.com/office/drawing/2010/main" xmlns:m="http://schemas.openxmlformats.org/officeDocument/2006/math" xmlns="" val="1"/>
             </a:ext>
           </a:extLst>
         </p:spPr>
@@ -5699,7 +5686,7 @@
           </a:ln>
           <a:extLst>
             <a:ext uri="{C572A759-6A51-4108-AA02-DFA0A04FC94B}">
-              <ma14:wrappingTextBoxFlag xmlns="" xmlns:m="http://schemas.openxmlformats.org/officeDocument/2006/math" xmlns:a14="http://schemas.microsoft.com/office/drawing/2010/main" xmlns:ma14="http://schemas.microsoft.com/office/mac/drawingml/2011/main" val="1"/>
+              <ma14:wrappingTextBoxFlag xmlns:ma14="http://schemas.microsoft.com/office/mac/drawingml/2011/main" xmlns:a14="http://schemas.microsoft.com/office/drawing/2010/main" xmlns:m="http://schemas.openxmlformats.org/officeDocument/2006/math" xmlns="" val="1"/>
             </a:ext>
           </a:extLst>
         </p:spPr>
@@ -5871,7 +5858,7 @@
           </a:ln>
           <a:extLst>
             <a:ext uri="{C572A759-6A51-4108-AA02-DFA0A04FC94B}">
-              <ma14:wrappingTextBoxFlag xmlns="" xmlns:m="http://schemas.openxmlformats.org/officeDocument/2006/math" xmlns:a14="http://schemas.microsoft.com/office/drawing/2010/main" xmlns:ma14="http://schemas.microsoft.com/office/mac/drawingml/2011/main" val="1"/>
+              <ma14:wrappingTextBoxFlag xmlns:ma14="http://schemas.microsoft.com/office/mac/drawingml/2011/main" xmlns:a14="http://schemas.microsoft.com/office/drawing/2010/main" xmlns:m="http://schemas.openxmlformats.org/officeDocument/2006/math" xmlns="" val="1"/>
             </a:ext>
           </a:extLst>
         </p:spPr>
@@ -6080,7 +6067,7 @@
           </a:ln>
           <a:extLst>
             <a:ext uri="{C572A759-6A51-4108-AA02-DFA0A04FC94B}">
-              <ma14:wrappingTextBoxFlag xmlns="" xmlns:m="http://schemas.openxmlformats.org/officeDocument/2006/math" xmlns:a14="http://schemas.microsoft.com/office/drawing/2010/main" xmlns:ma14="http://schemas.microsoft.com/office/mac/drawingml/2011/main" val="1"/>
+              <ma14:wrappingTextBoxFlag xmlns:ma14="http://schemas.microsoft.com/office/mac/drawingml/2011/main" xmlns:a14="http://schemas.microsoft.com/office/drawing/2010/main" xmlns:m="http://schemas.openxmlformats.org/officeDocument/2006/math" xmlns="" val="1"/>
             </a:ext>
           </a:extLst>
         </p:spPr>
@@ -6165,7 +6152,7 @@
           </a:ln>
           <a:extLst>
             <a:ext uri="{C572A759-6A51-4108-AA02-DFA0A04FC94B}">
-              <ma14:wrappingTextBoxFlag xmlns="" xmlns:m="http://schemas.openxmlformats.org/officeDocument/2006/math" xmlns:a14="http://schemas.microsoft.com/office/drawing/2010/main" xmlns:ma14="http://schemas.microsoft.com/office/mac/drawingml/2011/main" val="1"/>
+              <ma14:wrappingTextBoxFlag xmlns:ma14="http://schemas.microsoft.com/office/mac/drawingml/2011/main" xmlns:a14="http://schemas.microsoft.com/office/drawing/2010/main" xmlns:m="http://schemas.openxmlformats.org/officeDocument/2006/math" xmlns="" val="1"/>
             </a:ext>
           </a:extLst>
         </p:spPr>
@@ -6305,7 +6292,7 @@
           </a:ln>
           <a:extLst>
             <a:ext uri="{C572A759-6A51-4108-AA02-DFA0A04FC94B}">
-              <ma14:wrappingTextBoxFlag xmlns="" xmlns:m="http://schemas.openxmlformats.org/officeDocument/2006/math" xmlns:a14="http://schemas.microsoft.com/office/drawing/2010/main" xmlns:ma14="http://schemas.microsoft.com/office/mac/drawingml/2011/main" val="1"/>
+              <ma14:wrappingTextBoxFlag xmlns:ma14="http://schemas.microsoft.com/office/mac/drawingml/2011/main" xmlns:a14="http://schemas.microsoft.com/office/drawing/2010/main" xmlns:m="http://schemas.openxmlformats.org/officeDocument/2006/math" xmlns="" val="1"/>
             </a:ext>
           </a:extLst>
         </p:spPr>
@@ -6390,7 +6377,7 @@
           </a:ln>
           <a:extLst>
             <a:ext uri="{C572A759-6A51-4108-AA02-DFA0A04FC94B}">
-              <ma14:wrappingTextBoxFlag xmlns="" xmlns:m="http://schemas.openxmlformats.org/officeDocument/2006/math" xmlns:a14="http://schemas.microsoft.com/office/drawing/2010/main" xmlns:ma14="http://schemas.microsoft.com/office/mac/drawingml/2011/main" val="1"/>
+              <ma14:wrappingTextBoxFlag xmlns:ma14="http://schemas.microsoft.com/office/mac/drawingml/2011/main" xmlns:a14="http://schemas.microsoft.com/office/drawing/2010/main" xmlns:m="http://schemas.openxmlformats.org/officeDocument/2006/math" xmlns="" val="1"/>
             </a:ext>
           </a:extLst>
         </p:spPr>
@@ -6522,7 +6509,7 @@
           </a:ln>
           <a:extLst>
             <a:ext uri="{C572A759-6A51-4108-AA02-DFA0A04FC94B}">
-              <ma14:wrappingTextBoxFlag xmlns="" xmlns:m="http://schemas.openxmlformats.org/officeDocument/2006/math" xmlns:a14="http://schemas.microsoft.com/office/drawing/2010/main" xmlns:ma14="http://schemas.microsoft.com/office/mac/drawingml/2011/main" val="1"/>
+              <ma14:wrappingTextBoxFlag xmlns:ma14="http://schemas.microsoft.com/office/mac/drawingml/2011/main" xmlns:a14="http://schemas.microsoft.com/office/drawing/2010/main" xmlns:m="http://schemas.openxmlformats.org/officeDocument/2006/math" xmlns="" val="1"/>
             </a:ext>
           </a:extLst>
         </p:spPr>
@@ -6666,233 +6653,6 @@
 </file>
 
 <file path=ppt/slides/slide25.xml><?xml version="1.0" encoding="utf-8"?>
-<p:sld xmlns:a="http://schemas.openxmlformats.org/drawingml/2006/main" xmlns:r="http://schemas.openxmlformats.org/officeDocument/2006/relationships" xmlns:p="http://schemas.openxmlformats.org/presentationml/2006/main">
-  <p:cSld>
-    <p:spTree>
-      <p:nvGrpSpPr>
-        <p:cNvPr id="1" name=""/>
-        <p:cNvGrpSpPr/>
-        <p:nvPr/>
-      </p:nvGrpSpPr>
-      <p:grpSpPr>
-        <a:xfrm>
-          <a:off x="0" y="0"/>
-          <a:ext cx="0" cy="0"/>
-          <a:chOff x="0" y="0"/>
-          <a:chExt cx="0" cy="0"/>
-        </a:xfrm>
-      </p:grpSpPr>
-      <p:sp>
-        <p:nvSpPr>
-          <p:cNvPr id="186" name="Título 1"/>
-          <p:cNvSpPr txBox="1">
-            <a:spLocks noGrp="1"/>
-          </p:cNvSpPr>
-          <p:nvPr>
-            <p:ph type="title"/>
-          </p:nvPr>
-        </p:nvSpPr>
-        <p:spPr>
-          <a:xfrm>
-            <a:off x="1024128" y="585216"/>
-            <a:ext cx="9720072" cy="1499617"/>
-          </a:xfrm>
-          <a:prstGeom prst="rect">
-            <a:avLst/>
-          </a:prstGeom>
-        </p:spPr>
-        <p:txBody>
-          <a:bodyPr/>
-          <a:lstStyle>
-            <a:lvl1pPr>
-              <a:defRPr sz="4400"/>
-            </a:lvl1pPr>
-          </a:lstStyle>
-          <a:p>
-            <a:r>
-              <a:t>Aspectos a resaltar:</a:t>
-            </a:r>
-          </a:p>
-        </p:txBody>
-      </p:sp>
-      <p:sp>
-        <p:nvSpPr>
-          <p:cNvPr id="187" name="Marcador de contenido 2"/>
-          <p:cNvSpPr txBox="1">
-            <a:spLocks noGrp="1"/>
-          </p:cNvSpPr>
-          <p:nvPr>
-            <p:ph type="body" idx="1"/>
-          </p:nvPr>
-        </p:nvSpPr>
-        <p:spPr>
-          <a:xfrm>
-            <a:off x="2189990" y="1853247"/>
-            <a:ext cx="8946543" cy="4195482"/>
-          </a:xfrm>
-          <a:prstGeom prst="rect">
-            <a:avLst/>
-          </a:prstGeom>
-        </p:spPr>
-        <p:txBody>
-          <a:bodyPr/>
-          <a:lstStyle/>
-          <a:p>
-            <a:r>
-              <a:t>Uso de session.</a:t>
-            </a:r>
-          </a:p>
-          <a:p>
-            <a:pPr marL="0" indent="0">
-              <a:buSzTx/>
-              <a:buNone/>
-            </a:pPr>
-            <a:endParaRPr/>
-          </a:p>
-          <a:p>
-            <a:r>
-              <a:t>Uso de trello.</a:t>
-            </a:r>
-          </a:p>
-          <a:p>
-            <a:endParaRPr/>
-          </a:p>
-          <a:p>
-            <a:r>
-              <a:t>Control de versiones:</a:t>
-            </a:r>
-          </a:p>
-          <a:p>
-            <a:pPr marL="265175" lvl="1" indent="-137160">
-              <a:spcBef>
-                <a:spcPts val="400"/>
-              </a:spcBef>
-              <a:buFontTx/>
-              <a:defRPr sz="1800"/>
-            </a:pPr>
-            <a:r>
-              <a:t>La tradicional: por comandos.</a:t>
-            </a:r>
-          </a:p>
-          <a:p>
-            <a:pPr marL="265175" lvl="1" indent="-137160">
-              <a:spcBef>
-                <a:spcPts val="400"/>
-              </a:spcBef>
-              <a:buFontTx/>
-              <a:defRPr sz="1800"/>
-            </a:pPr>
-            <a:r>
-              <a:t>La que nos ofrece VSC(Visual Studio Code).//Poner foto</a:t>
-            </a:r>
-          </a:p>
-          <a:p>
-            <a:endParaRPr sz="1800"/>
-          </a:p>
-          <a:p>
-            <a:r>
-              <a:t>Metodologías de organización.</a:t>
-            </a:r>
-          </a:p>
-        </p:txBody>
-      </p:sp>
-      <p:sp>
-        <p:nvSpPr>
-          <p:cNvPr id="188" name="CuadroTexto 4"/>
-          <p:cNvSpPr txBox="1"/>
-          <p:nvPr/>
-        </p:nvSpPr>
-        <p:spPr>
-          <a:xfrm>
-            <a:off x="135903" y="2413336"/>
-            <a:ext cx="2054089" cy="1790066"/>
-          </a:xfrm>
-          <a:prstGeom prst="rect">
-            <a:avLst/>
-          </a:prstGeom>
-          <a:ln>
-            <a:solidFill>
-              <a:srgbClr val="2E2B21"/>
-            </a:solidFill>
-          </a:ln>
-          <a:extLst>
-            <a:ext uri="{C572A759-6A51-4108-AA02-DFA0A04FC94B}">
-              <ma14:wrappingTextBoxFlag xmlns="" xmlns:m="http://schemas.openxmlformats.org/officeDocument/2006/math" xmlns:a14="http://schemas.microsoft.com/office/drawing/2010/main" xmlns:ma14="http://schemas.microsoft.com/office/mac/drawingml/2011/main" val="1"/>
-            </a:ext>
-          </a:extLst>
-        </p:spPr>
-        <p:txBody>
-          <a:bodyPr lIns="45719" rIns="45719">
-            <a:spAutoFit/>
-          </a:bodyPr>
-          <a:lstStyle/>
-          <a:p>
-            <a:pPr marL="285750" indent="-285750">
-              <a:buSzPct val="100000"/>
-              <a:buChar char="❑"/>
-            </a:pPr>
-            <a:r>
-              <a:t>Presentación</a:t>
-            </a:r>
-          </a:p>
-          <a:p>
-            <a:pPr marL="285750" indent="-285750">
-              <a:buSzPct val="100000"/>
-              <a:buChar char="❑"/>
-            </a:pPr>
-            <a:r>
-              <a:t>Objetivos</a:t>
-            </a:r>
-          </a:p>
-          <a:p>
-            <a:pPr marL="285750" indent="-285750">
-              <a:buSzPct val="100000"/>
-              <a:buChar char="❑"/>
-            </a:pPr>
-            <a:r>
-              <a:t>Funcionalidades</a:t>
-            </a:r>
-          </a:p>
-          <a:p>
-            <a:pPr marL="285750" indent="-285750">
-              <a:buSzPct val="100000"/>
-              <a:buChar char="❑"/>
-            </a:pPr>
-            <a:r>
-              <a:t>Demostración</a:t>
-            </a:r>
-          </a:p>
-          <a:p>
-            <a:pPr marL="285750" indent="-285750">
-              <a:buSzPct val="100000"/>
-              <a:buChar char="❑"/>
-              <a:defRPr b="1"/>
-            </a:pPr>
-            <a:r>
-              <a:t>Aspectos</a:t>
-            </a:r>
-          </a:p>
-          <a:p>
-            <a:pPr marL="285750" indent="-285750">
-              <a:buSzPct val="100000"/>
-              <a:buChar char="❑"/>
-            </a:pPr>
-            <a:r>
-              <a:t>Conclusiones</a:t>
-            </a:r>
-          </a:p>
-        </p:txBody>
-      </p:sp>
-    </p:spTree>
-  </p:cSld>
-  <p:clrMapOvr>
-    <a:masterClrMapping/>
-  </p:clrMapOvr>
-  <p:transition spd="med"/>
-</p:sld>
-</file>
-
-<file path=ppt/slides/slide26.xml><?xml version="1.0" encoding="utf-8"?>
 <p:sld xmlns:a="http://schemas.openxmlformats.org/drawingml/2006/main" xmlns:r="http://schemas.openxmlformats.org/officeDocument/2006/relationships" xmlns:p="http://schemas.openxmlformats.org/presentationml/2006/main">
   <p:cSld>
     <p:spTree>
@@ -6962,7 +6722,7 @@
         </p:spPr>
         <p:txBody>
           <a:bodyPr>
-            <a:normAutofit/>
+            <a:normAutofit fontScale="92500" lnSpcReduction="10000"/>
           </a:bodyPr>
           <a:lstStyle/>
           <a:p>
@@ -6980,6 +6740,23 @@
             </a:r>
           </a:p>
           <a:p>
+            <a:endParaRPr lang="es-ES" dirty="0"/>
+          </a:p>
+          <a:p>
+            <a:r>
+              <a:rPr lang="es-ES" dirty="0"/>
+              <a:t>Uso de </a:t>
+            </a:r>
+            <a:r>
+              <a:rPr lang="es-ES" dirty="0" err="1"/>
+              <a:t>ninjamock</a:t>
+            </a:r>
+            <a:r>
+              <a:rPr lang="es-ES" dirty="0"/>
+              <a:t>.</a:t>
+            </a:r>
+          </a:p>
+          <a:p>
             <a:pPr marL="0" indent="0">
               <a:buNone/>
             </a:pPr>
@@ -6988,18 +6765,25 @@
           <a:p>
             <a:r>
               <a:rPr lang="es-ES" dirty="0"/>
+              <a:t>Metodologías de organización:</a:t>
+            </a:r>
+          </a:p>
+          <a:p>
+            <a:pPr lvl="1"/>
+            <a:r>
+              <a:rPr lang="es-ES" dirty="0"/>
               <a:t>Uso de </a:t>
             </a:r>
             <a:r>
               <a:rPr lang="es-ES" dirty="0" err="1"/>
               <a:t>trello</a:t>
             </a:r>
-            <a:r>
-              <a:rPr lang="es-ES" dirty="0"/>
-              <a:t>.</a:t>
-            </a:r>
-          </a:p>
-          <a:p>
+            <a:endParaRPr lang="es-ES" dirty="0"/>
+          </a:p>
+          <a:p>
+            <a:pPr marL="0" indent="0">
+              <a:buNone/>
+            </a:pPr>
             <a:endParaRPr lang="es-ES" dirty="0"/>
           </a:p>
           <a:p>
@@ -7028,12 +6812,6 @@
             <a:r>
               <a:rPr lang="es-ES" dirty="0"/>
               <a:t>).</a:t>
-            </a:r>
-          </a:p>
-          <a:p>
-            <a:r>
-              <a:rPr lang="es-ES" dirty="0"/>
-              <a:t>Metodologías de organización.</a:t>
             </a:r>
           </a:p>
         </p:txBody>
@@ -7053,7 +6831,7 @@
         <p:spPr>
           <a:xfrm>
             <a:off x="135904" y="2413337"/>
-            <a:ext cx="2054087" cy="2031325"/>
+            <a:ext cx="2054087" cy="1754326"/>
           </a:xfrm>
           <a:prstGeom prst="rect">
             <a:avLst/>
@@ -7129,9 +6907,6 @@
               <a:rPr lang="es-ES" dirty="0"/>
               <a:t>Conclusiones</a:t>
             </a:r>
-          </a:p>
-          <a:p>
-            <a:endParaRPr lang="es-ES" dirty="0"/>
           </a:p>
         </p:txBody>
       </p:sp>
@@ -7157,8 +6932,38 @@
         </p:blipFill>
         <p:spPr>
           <a:xfrm>
-            <a:off x="8148221" y="2084832"/>
+            <a:off x="8148221" y="2577201"/>
             <a:ext cx="3907875" cy="4023709"/>
+          </a:xfrm>
+          <a:prstGeom prst="rect">
+            <a:avLst/>
+          </a:prstGeom>
+        </p:spPr>
+      </p:pic>
+      <p:pic>
+        <p:nvPicPr>
+          <p:cNvPr id="6" name="Imagen 5">
+            <a:extLst>
+              <a:ext uri="{FF2B5EF4-FFF2-40B4-BE49-F238E27FC236}">
+                <a16:creationId xmlns:a16="http://schemas.microsoft.com/office/drawing/2014/main" id="{1B559CD6-9550-471A-ACF9-B0ADCDDC181D}"/>
+              </a:ext>
+            </a:extLst>
+          </p:cNvPr>
+          <p:cNvPicPr>
+            <a:picLocks noChangeAspect="1"/>
+          </p:cNvPicPr>
+          <p:nvPr/>
+        </p:nvPicPr>
+        <p:blipFill>
+          <a:blip r:embed="rId3"/>
+          <a:stretch>
+            <a:fillRect/>
+          </a:stretch>
+        </p:blipFill>
+        <p:spPr>
+          <a:xfrm>
+            <a:off x="5286375" y="2587752"/>
+            <a:ext cx="1619250" cy="390525"/>
           </a:xfrm>
           <a:prstGeom prst="rect">
             <a:avLst/>
@@ -7179,7 +6984,7 @@
 </p:sld>
 </file>
 
-<file path=ppt/slides/slide27.xml><?xml version="1.0" encoding="utf-8"?>
+<file path=ppt/slides/slide26.xml><?xml version="1.0" encoding="utf-8"?>
 <p:sld xmlns:a="http://schemas.openxmlformats.org/drawingml/2006/main" xmlns:r="http://schemas.openxmlformats.org/officeDocument/2006/relationships" xmlns:p="http://schemas.openxmlformats.org/presentationml/2006/main">
   <p:cSld>
     <p:spTree>
@@ -7255,7 +7060,7 @@
           </a:ln>
           <a:extLst>
             <a:ext uri="{C572A759-6A51-4108-AA02-DFA0A04FC94B}">
-              <ma14:wrappingTextBoxFlag xmlns="" xmlns:m="http://schemas.openxmlformats.org/officeDocument/2006/math" xmlns:a14="http://schemas.microsoft.com/office/drawing/2010/main" xmlns:ma14="http://schemas.microsoft.com/office/mac/drawingml/2011/main" val="1"/>
+              <ma14:wrappingTextBoxFlag xmlns:ma14="http://schemas.microsoft.com/office/mac/drawingml/2011/main" xmlns:a14="http://schemas.microsoft.com/office/drawing/2010/main" xmlns:m="http://schemas.openxmlformats.org/officeDocument/2006/math" xmlns="" val="1"/>
             </a:ext>
           </a:extLst>
         </p:spPr>
@@ -7602,7 +7407,7 @@
           </a:ln>
           <a:extLst>
             <a:ext uri="{C572A759-6A51-4108-AA02-DFA0A04FC94B}">
-              <ma14:wrappingTextBoxFlag xmlns="" xmlns:m="http://schemas.openxmlformats.org/officeDocument/2006/math" xmlns:a14="http://schemas.microsoft.com/office/drawing/2010/main" xmlns:ma14="http://schemas.microsoft.com/office/mac/drawingml/2011/main" val="1"/>
+              <ma14:wrappingTextBoxFlag xmlns:ma14="http://schemas.microsoft.com/office/mac/drawingml/2011/main" xmlns:a14="http://schemas.microsoft.com/office/drawing/2010/main" xmlns:m="http://schemas.openxmlformats.org/officeDocument/2006/math" xmlns="" val="1"/>
             </a:ext>
           </a:extLst>
         </p:spPr>
@@ -7754,7 +7559,7 @@
           </a:ln>
           <a:extLst>
             <a:ext uri="{C572A759-6A51-4108-AA02-DFA0A04FC94B}">
-              <ma14:wrappingTextBoxFlag xmlns="" xmlns:m="http://schemas.openxmlformats.org/officeDocument/2006/math" xmlns:a14="http://schemas.microsoft.com/office/drawing/2010/main" xmlns:ma14="http://schemas.microsoft.com/office/mac/drawingml/2011/main" val="1"/>
+              <ma14:wrappingTextBoxFlag xmlns:ma14="http://schemas.microsoft.com/office/mac/drawingml/2011/main" xmlns:a14="http://schemas.microsoft.com/office/drawing/2010/main" xmlns:m="http://schemas.openxmlformats.org/officeDocument/2006/math" xmlns="" val="1"/>
             </a:ext>
           </a:extLst>
         </p:spPr>
@@ -8235,7 +8040,7 @@
           </a:ln>
           <a:extLst>
             <a:ext uri="{C572A759-6A51-4108-AA02-DFA0A04FC94B}">
-              <ma14:wrappingTextBoxFlag xmlns="" xmlns:m="http://schemas.openxmlformats.org/officeDocument/2006/math" xmlns:a14="http://schemas.microsoft.com/office/drawing/2010/main" xmlns:ma14="http://schemas.microsoft.com/office/mac/drawingml/2011/main" val="1"/>
+              <ma14:wrappingTextBoxFlag xmlns:ma14="http://schemas.microsoft.com/office/mac/drawingml/2011/main" xmlns:a14="http://schemas.microsoft.com/office/drawing/2010/main" xmlns:m="http://schemas.openxmlformats.org/officeDocument/2006/math" xmlns="" val="1"/>
             </a:ext>
           </a:extLst>
         </p:spPr>
@@ -8385,7 +8190,7 @@
           </a:ln>
           <a:extLst>
             <a:ext uri="{C572A759-6A51-4108-AA02-DFA0A04FC94B}">
-              <ma14:wrappingTextBoxFlag xmlns="" xmlns:m="http://schemas.openxmlformats.org/officeDocument/2006/math" xmlns:a14="http://schemas.microsoft.com/office/drawing/2010/main" xmlns:ma14="http://schemas.microsoft.com/office/mac/drawingml/2011/main" val="1"/>
+              <ma14:wrappingTextBoxFlag xmlns:ma14="http://schemas.microsoft.com/office/mac/drawingml/2011/main" xmlns:a14="http://schemas.microsoft.com/office/drawing/2010/main" xmlns:m="http://schemas.openxmlformats.org/officeDocument/2006/math" xmlns="" val="1"/>
             </a:ext>
           </a:extLst>
         </p:spPr>
@@ -8431,7 +8236,7 @@
           </a:ln>
           <a:extLst>
             <a:ext uri="{C572A759-6A51-4108-AA02-DFA0A04FC94B}">
-              <ma14:wrappingTextBoxFlag xmlns="" xmlns:m="http://schemas.openxmlformats.org/officeDocument/2006/math" xmlns:a14="http://schemas.microsoft.com/office/drawing/2010/main" xmlns:ma14="http://schemas.microsoft.com/office/mac/drawingml/2011/main" val="1"/>
+              <ma14:wrappingTextBoxFlag xmlns:ma14="http://schemas.microsoft.com/office/mac/drawingml/2011/main" xmlns:a14="http://schemas.microsoft.com/office/drawing/2010/main" xmlns:m="http://schemas.openxmlformats.org/officeDocument/2006/math" xmlns="" val="1"/>
             </a:ext>
           </a:extLst>
         </p:spPr>
@@ -8642,7 +8447,7 @@
         <p:spPr>
           <a:xfrm>
             <a:off x="135904" y="2413337"/>
-            <a:ext cx="2054087" cy="2031325"/>
+            <a:ext cx="2054087" cy="1754326"/>
           </a:xfrm>
           <a:prstGeom prst="rect">
             <a:avLst/>
@@ -8719,9 +8524,6 @@
               <a:rPr lang="es-ES" dirty="0"/>
               <a:t>Conclusiones</a:t>
             </a:r>
-          </a:p>
-          <a:p>
-            <a:endParaRPr lang="es-ES" dirty="0"/>
           </a:p>
         </p:txBody>
       </p:sp>
@@ -8875,7 +8677,7 @@
         <p:spPr>
           <a:xfrm>
             <a:off x="135904" y="2413337"/>
-            <a:ext cx="2054087" cy="2031325"/>
+            <a:ext cx="2054087" cy="1754326"/>
           </a:xfrm>
           <a:prstGeom prst="rect">
             <a:avLst/>
@@ -8952,9 +8754,6 @@
               <a:rPr lang="es-ES" dirty="0"/>
               <a:t>Conclusiones</a:t>
             </a:r>
-          </a:p>
-          <a:p>
-            <a:endParaRPr lang="es-ES" dirty="0"/>
           </a:p>
         </p:txBody>
       </p:sp>
@@ -9109,7 +8908,7 @@
         <p:spPr>
           <a:xfrm>
             <a:off x="135904" y="2413337"/>
-            <a:ext cx="2054087" cy="2031325"/>
+            <a:ext cx="2054087" cy="1754326"/>
           </a:xfrm>
           <a:prstGeom prst="rect">
             <a:avLst/>
@@ -9186,9 +8985,6 @@
               <a:rPr lang="es-ES" dirty="0"/>
               <a:t>Conclusiones</a:t>
             </a:r>
-          </a:p>
-          <a:p>
-            <a:endParaRPr lang="es-ES" dirty="0"/>
           </a:p>
         </p:txBody>
       </p:sp>

</xml_diff>

<commit_message>
Presentación hecha parte abraham
</commit_message>
<xml_diff>
--- a/AIRDSS.pptx
+++ b/AIRDSS.pptx
@@ -5,7 +5,7 @@
     <p:sldMasterId id="2147483648" r:id="rId1"/>
   </p:sldMasterIdLst>
   <p:notesMasterIdLst>
-    <p:notesMasterId r:id="rId9"/>
+    <p:notesMasterId r:id="rId14"/>
   </p:notesMasterIdLst>
   <p:sldIdLst>
     <p:sldId id="256" r:id="rId2"/>
@@ -13,8 +13,13 @@
     <p:sldId id="278" r:id="rId4"/>
     <p:sldId id="260" r:id="rId5"/>
     <p:sldId id="261" r:id="rId6"/>
-    <p:sldId id="277" r:id="rId7"/>
-    <p:sldId id="276" r:id="rId8"/>
+    <p:sldId id="279" r:id="rId7"/>
+    <p:sldId id="280" r:id="rId8"/>
+    <p:sldId id="281" r:id="rId9"/>
+    <p:sldId id="282" r:id="rId10"/>
+    <p:sldId id="283" r:id="rId11"/>
+    <p:sldId id="277" r:id="rId12"/>
+    <p:sldId id="276" r:id="rId13"/>
   </p:sldIdLst>
   <p:sldSz cx="12192000" cy="6858000"/>
   <p:notesSz cx="6858000" cy="9144000"/>
@@ -3581,6 +3586,1651 @@
 </p:sld>
 </file>
 
+<file path=ppt/slides/slide10.xml><?xml version="1.0" encoding="utf-8"?>
+<p:sld xmlns:a="http://schemas.openxmlformats.org/drawingml/2006/main" xmlns:r="http://schemas.openxmlformats.org/officeDocument/2006/relationships" xmlns:p="http://schemas.openxmlformats.org/presentationml/2006/main">
+  <p:cSld>
+    <p:spTree>
+      <p:nvGrpSpPr>
+        <p:cNvPr id="1" name=""/>
+        <p:cNvGrpSpPr/>
+        <p:nvPr/>
+      </p:nvGrpSpPr>
+      <p:grpSpPr>
+        <a:xfrm>
+          <a:off x="0" y="0"/>
+          <a:ext cx="0" cy="0"/>
+          <a:chOff x="0" y="0"/>
+          <a:chExt cx="0" cy="0"/>
+        </a:xfrm>
+      </p:grpSpPr>
+      <p:sp>
+        <p:nvSpPr>
+          <p:cNvPr id="122" name="Título 1"/>
+          <p:cNvSpPr txBox="1">
+            <a:spLocks noGrp="1"/>
+          </p:cNvSpPr>
+          <p:nvPr>
+            <p:ph type="title"/>
+          </p:nvPr>
+        </p:nvSpPr>
+        <p:spPr>
+          <a:xfrm>
+            <a:off x="1024128" y="585216"/>
+            <a:ext cx="9720072" cy="1499617"/>
+          </a:xfrm>
+          <a:prstGeom prst="rect">
+            <a:avLst/>
+          </a:prstGeom>
+        </p:spPr>
+        <p:txBody>
+          <a:bodyPr/>
+          <a:lstStyle/>
+          <a:p>
+            <a:pPr defTabSz="886968">
+              <a:defRPr sz="3783" spc="97">
+                <a:latin typeface="Arial"/>
+                <a:ea typeface="Arial"/>
+                <a:cs typeface="Arial"/>
+                <a:sym typeface="Arial"/>
+              </a:defRPr>
+            </a:pPr>
+            <a:r>
+              <a:rPr dirty="0" err="1"/>
+              <a:t>Demostración</a:t>
+            </a:r>
+            <a:r>
+              <a:rPr dirty="0"/>
+              <a:t> </a:t>
+            </a:r>
+            <a:r>
+              <a:rPr dirty="0" err="1"/>
+              <a:t>funcional</a:t>
+            </a:r>
+            <a:r>
+              <a:rPr dirty="0"/>
+              <a:t> del </a:t>
+            </a:r>
+            <a:r>
+              <a:rPr dirty="0" err="1"/>
+              <a:t>proyecto</a:t>
+            </a:r>
+            <a:r>
+              <a:rPr dirty="0"/>
+              <a:t>.</a:t>
+            </a:r>
+            <a:br>
+              <a:rPr dirty="0"/>
+            </a:br>
+            <a:endParaRPr dirty="0"/>
+          </a:p>
+        </p:txBody>
+      </p:sp>
+      <p:sp>
+        <p:nvSpPr>
+          <p:cNvPr id="123" name="Rectángulo 4"/>
+          <p:cNvSpPr txBox="1"/>
+          <p:nvPr/>
+        </p:nvSpPr>
+        <p:spPr>
+          <a:xfrm>
+            <a:off x="5564666" y="1483916"/>
+            <a:ext cx="900244" cy="369332"/>
+          </a:xfrm>
+          <a:prstGeom prst="rect">
+            <a:avLst/>
+          </a:prstGeom>
+          <a:ln w="12700">
+            <a:miter lim="400000"/>
+          </a:ln>
+          <a:extLst>
+            <a:ext uri="{C572A759-6A51-4108-AA02-DFA0A04FC94B}">
+              <ma14:wrappingTextBoxFlag xmlns="" xmlns:m="http://schemas.openxmlformats.org/officeDocument/2006/math" xmlns:a14="http://schemas.microsoft.com/office/drawing/2010/main" xmlns:ma14="http://schemas.microsoft.com/office/mac/drawingml/2011/main" val="1"/>
+            </a:ext>
+          </a:extLst>
+        </p:spPr>
+        <p:txBody>
+          <a:bodyPr wrap="none" lIns="45719" rIns="45719">
+            <a:spAutoFit/>
+          </a:bodyPr>
+          <a:lstStyle>
+            <a:lvl1pPr>
+              <a:defRPr>
+                <a:latin typeface="Arial"/>
+                <a:ea typeface="Arial"/>
+                <a:cs typeface="Arial"/>
+                <a:sym typeface="Arial"/>
+              </a:defRPr>
+            </a:lvl1pPr>
+          </a:lstStyle>
+          <a:p>
+            <a:r>
+              <a:rPr lang="es-ES" dirty="0"/>
+              <a:t>Mi perfil</a:t>
+            </a:r>
+            <a:endParaRPr dirty="0"/>
+          </a:p>
+        </p:txBody>
+      </p:sp>
+      <p:sp>
+        <p:nvSpPr>
+          <p:cNvPr id="9" name="CuadroTexto 5">
+            <a:extLst>
+              <a:ext uri="{FF2B5EF4-FFF2-40B4-BE49-F238E27FC236}">
+                <a16:creationId xmlns:a16="http://schemas.microsoft.com/office/drawing/2014/main" id="{32E4E81B-0198-4264-983A-EFF3D96CCFE4}"/>
+              </a:ext>
+            </a:extLst>
+          </p:cNvPr>
+          <p:cNvSpPr txBox="1"/>
+          <p:nvPr/>
+        </p:nvSpPr>
+        <p:spPr>
+          <a:xfrm>
+            <a:off x="227331" y="2498332"/>
+            <a:ext cx="2054089" cy="1477328"/>
+          </a:xfrm>
+          <a:prstGeom prst="rect">
+            <a:avLst/>
+          </a:prstGeom>
+          <a:ln>
+            <a:solidFill>
+              <a:srgbClr val="2E2B21"/>
+            </a:solidFill>
+          </a:ln>
+          <a:extLst>
+            <a:ext uri="{C572A759-6A51-4108-AA02-DFA0A04FC94B}">
+              <ma14:wrappingTextBoxFlag xmlns="" xmlns:m="http://schemas.openxmlformats.org/officeDocument/2006/math" xmlns:a14="http://schemas.microsoft.com/office/drawing/2010/main" xmlns:ma14="http://schemas.microsoft.com/office/mac/drawingml/2011/main" val="1"/>
+            </a:ext>
+          </a:extLst>
+        </p:spPr>
+        <p:txBody>
+          <a:bodyPr lIns="45719" rIns="45719">
+            <a:spAutoFit/>
+          </a:bodyPr>
+          <a:lstStyle/>
+          <a:p>
+            <a:pPr marL="285750" indent="-285750">
+              <a:buSzPct val="100000"/>
+              <a:buChar char="❑"/>
+            </a:pPr>
+            <a:r>
+              <a:rPr lang="es-ES" dirty="0"/>
+              <a:t>UML</a:t>
+            </a:r>
+            <a:endParaRPr dirty="0"/>
+          </a:p>
+          <a:p>
+            <a:pPr marL="285750" indent="-285750">
+              <a:buSzPct val="100000"/>
+              <a:buChar char="❑"/>
+            </a:pPr>
+            <a:r>
+              <a:rPr dirty="0" err="1"/>
+              <a:t>Funcionalidades</a:t>
+            </a:r>
+            <a:endParaRPr dirty="0"/>
+          </a:p>
+          <a:p>
+            <a:pPr marL="285750" indent="-285750">
+              <a:buSzPct val="100000"/>
+              <a:buChar char="❑"/>
+              <a:defRPr b="1"/>
+            </a:pPr>
+            <a:r>
+              <a:rPr dirty="0" err="1"/>
+              <a:t>Demostración</a:t>
+            </a:r>
+            <a:endParaRPr dirty="0"/>
+          </a:p>
+          <a:p>
+            <a:pPr marL="285750" indent="-285750">
+              <a:buSzPct val="100000"/>
+              <a:buChar char="❑"/>
+            </a:pPr>
+            <a:r>
+              <a:rPr dirty="0" err="1"/>
+              <a:t>Aspectos</a:t>
+            </a:r>
+            <a:endParaRPr dirty="0"/>
+          </a:p>
+          <a:p>
+            <a:pPr marL="285750" indent="-285750">
+              <a:buSzPct val="100000"/>
+              <a:buChar char="❑"/>
+            </a:pPr>
+            <a:r>
+              <a:rPr dirty="0" err="1"/>
+              <a:t>Conclusiones</a:t>
+            </a:r>
+            <a:endParaRPr dirty="0"/>
+          </a:p>
+        </p:txBody>
+      </p:sp>
+      <p:pic>
+        <p:nvPicPr>
+          <p:cNvPr id="4" name="Imagen 3">
+            <a:extLst>
+              <a:ext uri="{FF2B5EF4-FFF2-40B4-BE49-F238E27FC236}">
+                <a16:creationId xmlns:a16="http://schemas.microsoft.com/office/drawing/2014/main" id="{3585F9CA-84B4-4647-8A47-399E5C587C9B}"/>
+              </a:ext>
+            </a:extLst>
+          </p:cNvPr>
+          <p:cNvPicPr>
+            <a:picLocks noChangeAspect="1"/>
+          </p:cNvPicPr>
+          <p:nvPr/>
+        </p:nvPicPr>
+        <p:blipFill>
+          <a:blip r:embed="rId2">
+            <a:extLst>
+              <a:ext uri="{28A0092B-C50C-407E-A947-70E740481C1C}">
+                <a14:useLocalDpi xmlns:a14="http://schemas.microsoft.com/office/drawing/2010/main" val="0"/>
+              </a:ext>
+            </a:extLst>
+          </a:blip>
+          <a:stretch>
+            <a:fillRect/>
+          </a:stretch>
+        </p:blipFill>
+        <p:spPr>
+          <a:xfrm>
+            <a:off x="4200525" y="2405634"/>
+            <a:ext cx="3790950" cy="3867150"/>
+          </a:xfrm>
+          <a:prstGeom prst="rect">
+            <a:avLst/>
+          </a:prstGeom>
+        </p:spPr>
+      </p:pic>
+    </p:spTree>
+    <p:extLst>
+      <p:ext uri="{BB962C8B-B14F-4D97-AF65-F5344CB8AC3E}">
+        <p14:creationId xmlns:p14="http://schemas.microsoft.com/office/powerpoint/2010/main" val="1478250187"/>
+      </p:ext>
+    </p:extLst>
+  </p:cSld>
+  <p:clrMapOvr>
+    <a:masterClrMapping/>
+  </p:clrMapOvr>
+  <p:transition spd="med"/>
+</p:sld>
+</file>
+
+<file path=ppt/slides/slide11.xml><?xml version="1.0" encoding="utf-8"?>
+<p:sld xmlns:a="http://schemas.openxmlformats.org/drawingml/2006/main" xmlns:r="http://schemas.openxmlformats.org/officeDocument/2006/relationships" xmlns:p="http://schemas.openxmlformats.org/presentationml/2006/main">
+  <p:cSld>
+    <p:spTree>
+      <p:nvGrpSpPr>
+        <p:cNvPr id="1" name=""/>
+        <p:cNvGrpSpPr/>
+        <p:nvPr/>
+      </p:nvGrpSpPr>
+      <p:grpSpPr>
+        <a:xfrm>
+          <a:off x="0" y="0"/>
+          <a:ext cx="0" cy="0"/>
+          <a:chOff x="0" y="0"/>
+          <a:chExt cx="0" cy="0"/>
+        </a:xfrm>
+      </p:grpSpPr>
+      <p:sp>
+        <p:nvSpPr>
+          <p:cNvPr id="2" name="Título 1">
+            <a:extLst>
+              <a:ext uri="{FF2B5EF4-FFF2-40B4-BE49-F238E27FC236}">
+                <a16:creationId xmlns:a16="http://schemas.microsoft.com/office/drawing/2014/main" id="{AC7DBC01-8ECE-41C5-8E3F-384133D4DA41}"/>
+              </a:ext>
+            </a:extLst>
+          </p:cNvPr>
+          <p:cNvSpPr>
+            <a:spLocks noGrp="1"/>
+          </p:cNvSpPr>
+          <p:nvPr>
+            <p:ph type="title"/>
+          </p:nvPr>
+        </p:nvSpPr>
+        <p:spPr/>
+        <p:txBody>
+          <a:bodyPr/>
+          <a:lstStyle/>
+          <a:p>
+            <a:r>
+              <a:rPr lang="es-ES" sz="4400" dirty="0"/>
+              <a:t>Aspectos a resaltar:</a:t>
+            </a:r>
+            <a:endParaRPr lang="es-ES" dirty="0"/>
+          </a:p>
+        </p:txBody>
+      </p:sp>
+      <p:sp>
+        <p:nvSpPr>
+          <p:cNvPr id="5" name="CuadroTexto 4">
+            <a:extLst>
+              <a:ext uri="{FF2B5EF4-FFF2-40B4-BE49-F238E27FC236}">
+                <a16:creationId xmlns:a16="http://schemas.microsoft.com/office/drawing/2014/main" id="{C68EC0AD-0AEE-4F4E-AEE1-28A128CF2A1A}"/>
+              </a:ext>
+            </a:extLst>
+          </p:cNvPr>
+          <p:cNvSpPr txBox="1"/>
+          <p:nvPr/>
+        </p:nvSpPr>
+        <p:spPr>
+          <a:xfrm>
+            <a:off x="135904" y="2413337"/>
+            <a:ext cx="2054087" cy="1477328"/>
+          </a:xfrm>
+          <a:prstGeom prst="rect">
+            <a:avLst/>
+          </a:prstGeom>
+          <a:noFill/>
+          <a:ln>
+            <a:solidFill>
+              <a:schemeClr val="tx1"/>
+            </a:solidFill>
+          </a:ln>
+        </p:spPr>
+        <p:txBody>
+          <a:bodyPr wrap="square" rtlCol="0">
+            <a:spAutoFit/>
+          </a:bodyPr>
+          <a:lstStyle/>
+          <a:p>
+            <a:pPr marL="285750" indent="-285750">
+              <a:buFont typeface="Wingdings" panose="05000000000000000000" pitchFamily="2" charset="2"/>
+              <a:buChar char="q"/>
+            </a:pPr>
+            <a:r>
+              <a:rPr lang="es-ES" dirty="0"/>
+              <a:t>UML</a:t>
+            </a:r>
+          </a:p>
+          <a:p>
+            <a:pPr marL="285750" indent="-285750">
+              <a:buFont typeface="Wingdings" panose="05000000000000000000" pitchFamily="2" charset="2"/>
+              <a:buChar char="q"/>
+            </a:pPr>
+            <a:r>
+              <a:rPr lang="es-ES" dirty="0"/>
+              <a:t>Funcionalidades</a:t>
+            </a:r>
+          </a:p>
+          <a:p>
+            <a:pPr marL="285750" indent="-285750">
+              <a:buFont typeface="Wingdings" panose="05000000000000000000" pitchFamily="2" charset="2"/>
+              <a:buChar char="q"/>
+            </a:pPr>
+            <a:r>
+              <a:rPr lang="es-ES" dirty="0"/>
+              <a:t>Demostración</a:t>
+            </a:r>
+          </a:p>
+          <a:p>
+            <a:pPr marL="285750" indent="-285750">
+              <a:buFont typeface="Wingdings" panose="05000000000000000000" pitchFamily="2" charset="2"/>
+              <a:buChar char="q"/>
+            </a:pPr>
+            <a:r>
+              <a:rPr lang="es-ES" b="1" dirty="0"/>
+              <a:t>Aspectos</a:t>
+            </a:r>
+          </a:p>
+          <a:p>
+            <a:pPr marL="285750" indent="-285750">
+              <a:buFont typeface="Wingdings" panose="05000000000000000000" pitchFamily="2" charset="2"/>
+              <a:buChar char="q"/>
+            </a:pPr>
+            <a:r>
+              <a:rPr lang="es-ES" dirty="0"/>
+              <a:t>Conclusiones</a:t>
+            </a:r>
+          </a:p>
+        </p:txBody>
+      </p:sp>
+      <p:sp>
+        <p:nvSpPr>
+          <p:cNvPr id="8" name="Marcador de texto 7">
+            <a:extLst>
+              <a:ext uri="{FF2B5EF4-FFF2-40B4-BE49-F238E27FC236}">
+                <a16:creationId xmlns:a16="http://schemas.microsoft.com/office/drawing/2014/main" id="{9FD5B537-1BD9-402F-B27C-A11A4569434D}"/>
+              </a:ext>
+            </a:extLst>
+          </p:cNvPr>
+          <p:cNvSpPr>
+            <a:spLocks noGrp="1"/>
+          </p:cNvSpPr>
+          <p:nvPr>
+            <p:ph type="body" idx="1"/>
+          </p:nvPr>
+        </p:nvSpPr>
+        <p:spPr>
+          <a:xfrm>
+            <a:off x="2321169" y="2286000"/>
+            <a:ext cx="8423031" cy="4023360"/>
+          </a:xfrm>
+        </p:spPr>
+        <p:txBody>
+          <a:bodyPr/>
+          <a:lstStyle/>
+          <a:p>
+            <a:pPr lvl="0">
+              <a:buFont typeface="Arial" panose="020B0604020202020204" pitchFamily="34" charset="0"/>
+              <a:buChar char="•"/>
+            </a:pPr>
+            <a:r>
+              <a:rPr lang="es-ES" dirty="0"/>
+              <a:t>Abrir página web desde el móvil.</a:t>
+            </a:r>
+          </a:p>
+          <a:p>
+            <a:pPr lvl="0">
+              <a:buFont typeface="Arial" panose="020B0604020202020204" pitchFamily="34" charset="0"/>
+              <a:buChar char="•"/>
+            </a:pPr>
+            <a:r>
+              <a:rPr lang="es-ES" dirty="0"/>
+              <a:t>Capa de servicios y UML</a:t>
+            </a:r>
+          </a:p>
+          <a:p>
+            <a:pPr lvl="0">
+              <a:buFont typeface="Arial" panose="020B0604020202020204" pitchFamily="34" charset="0"/>
+              <a:buChar char="•"/>
+            </a:pPr>
+            <a:r>
+              <a:rPr lang="es-ES" dirty="0"/>
+              <a:t>Notificaciones al administrador</a:t>
+            </a:r>
+          </a:p>
+          <a:p>
+            <a:pPr lvl="0">
+              <a:buFont typeface="Arial" panose="020B0604020202020204" pitchFamily="34" charset="0"/>
+              <a:buChar char="•"/>
+            </a:pPr>
+            <a:r>
+              <a:rPr lang="es-ES" dirty="0"/>
+              <a:t>Correo de reseteo de contraseñas</a:t>
+            </a:r>
+          </a:p>
+          <a:p>
+            <a:pPr lvl="0">
+              <a:buFont typeface="Arial" panose="020B0604020202020204" pitchFamily="34" charset="0"/>
+              <a:buChar char="•"/>
+            </a:pPr>
+            <a:r>
+              <a:rPr lang="es-ES" dirty="0"/>
+              <a:t>Middleware para controlar el acceso a los usuarios a diferentes páginas o secciones de las mismas.</a:t>
+            </a:r>
+          </a:p>
+          <a:p>
+            <a:pPr lvl="0">
+              <a:buFont typeface="Arial" panose="020B0604020202020204" pitchFamily="34" charset="0"/>
+              <a:buChar char="•"/>
+            </a:pPr>
+            <a:r>
+              <a:rPr lang="es-ES" dirty="0"/>
+              <a:t>Validación de </a:t>
+            </a:r>
+            <a:r>
+              <a:rPr lang="es-ES" dirty="0" err="1"/>
+              <a:t>dni</a:t>
+            </a:r>
+            <a:r>
+              <a:rPr lang="es-ES" dirty="0"/>
+              <a:t>.</a:t>
+            </a:r>
+          </a:p>
+          <a:p>
+            <a:pPr lvl="0">
+              <a:buFont typeface="Arial" panose="020B0604020202020204" pitchFamily="34" charset="0"/>
+              <a:buChar char="•"/>
+            </a:pPr>
+            <a:r>
+              <a:rPr lang="es-ES" dirty="0"/>
+              <a:t>Buscador de vuelos con carrusel de fotografías.</a:t>
+            </a:r>
+          </a:p>
+          <a:p>
+            <a:pPr lvl="0">
+              <a:buFont typeface="Arial" panose="020B0604020202020204" pitchFamily="34" charset="0"/>
+              <a:buChar char="•"/>
+            </a:pPr>
+            <a:r>
+              <a:rPr lang="es-ES" dirty="0"/>
+              <a:t>En contacto geolocalización integrada con Google </a:t>
+            </a:r>
+            <a:r>
+              <a:rPr lang="es-ES" dirty="0" err="1"/>
+              <a:t>maps</a:t>
+            </a:r>
+            <a:endParaRPr lang="es-ES" dirty="0"/>
+          </a:p>
+          <a:p>
+            <a:endParaRPr lang="es-ES" dirty="0"/>
+          </a:p>
+        </p:txBody>
+      </p:sp>
+    </p:spTree>
+    <p:extLst>
+      <p:ext uri="{BB962C8B-B14F-4D97-AF65-F5344CB8AC3E}">
+        <p14:creationId xmlns:p14="http://schemas.microsoft.com/office/powerpoint/2010/main" val="1696344510"/>
+      </p:ext>
+    </p:extLst>
+  </p:cSld>
+  <p:clrMapOvr>
+    <a:masterClrMapping/>
+  </p:clrMapOvr>
+  <p:transition spd="med"/>
+</p:sld>
+</file>
+
+<file path=ppt/slides/slide12.xml><?xml version="1.0" encoding="utf-8"?>
+<p:sld xmlns:a="http://schemas.openxmlformats.org/drawingml/2006/main" xmlns:r="http://schemas.openxmlformats.org/officeDocument/2006/relationships" xmlns:p="http://schemas.openxmlformats.org/presentationml/2006/main">
+  <p:cSld>
+    <p:spTree>
+      <p:nvGrpSpPr>
+        <p:cNvPr id="1" name=""/>
+        <p:cNvGrpSpPr/>
+        <p:nvPr/>
+      </p:nvGrpSpPr>
+      <p:grpSpPr>
+        <a:xfrm>
+          <a:off x="0" y="0"/>
+          <a:ext cx="0" cy="0"/>
+          <a:chOff x="0" y="0"/>
+          <a:chExt cx="0" cy="0"/>
+        </a:xfrm>
+      </p:grpSpPr>
+      <p:sp>
+        <p:nvSpPr>
+          <p:cNvPr id="190" name="Título 1"/>
+          <p:cNvSpPr txBox="1">
+            <a:spLocks noGrp="1"/>
+          </p:cNvSpPr>
+          <p:nvPr>
+            <p:ph type="title"/>
+          </p:nvPr>
+        </p:nvSpPr>
+        <p:spPr>
+          <a:xfrm>
+            <a:off x="1024128" y="585216"/>
+            <a:ext cx="9720072" cy="1499617"/>
+          </a:xfrm>
+          <a:prstGeom prst="rect">
+            <a:avLst/>
+          </a:prstGeom>
+        </p:spPr>
+        <p:txBody>
+          <a:bodyPr/>
+          <a:lstStyle>
+            <a:lvl1pPr>
+              <a:defRPr sz="4400">
+                <a:latin typeface="Arial"/>
+                <a:ea typeface="Arial"/>
+                <a:cs typeface="Arial"/>
+                <a:sym typeface="Arial"/>
+              </a:defRPr>
+            </a:lvl1pPr>
+          </a:lstStyle>
+          <a:p>
+            <a:r>
+              <a:rPr dirty="0" err="1"/>
+              <a:t>Conclusiones</a:t>
+            </a:r>
+            <a:r>
+              <a:rPr dirty="0"/>
+              <a:t>.</a:t>
+            </a:r>
+          </a:p>
+        </p:txBody>
+      </p:sp>
+      <p:sp>
+        <p:nvSpPr>
+          <p:cNvPr id="191" name="CuadroTexto 4"/>
+          <p:cNvSpPr txBox="1"/>
+          <p:nvPr/>
+        </p:nvSpPr>
+        <p:spPr>
+          <a:xfrm>
+            <a:off x="135903" y="2413336"/>
+            <a:ext cx="2054089" cy="1477328"/>
+          </a:xfrm>
+          <a:prstGeom prst="rect">
+            <a:avLst/>
+          </a:prstGeom>
+          <a:ln>
+            <a:solidFill>
+              <a:srgbClr val="2E2B21"/>
+            </a:solidFill>
+          </a:ln>
+          <a:extLst>
+            <a:ext uri="{C572A759-6A51-4108-AA02-DFA0A04FC94B}">
+              <ma14:wrappingTextBoxFlag xmlns="" xmlns:m="http://schemas.openxmlformats.org/officeDocument/2006/math" xmlns:a14="http://schemas.microsoft.com/office/drawing/2010/main" xmlns:ma14="http://schemas.microsoft.com/office/mac/drawingml/2011/main" val="1"/>
+            </a:ext>
+          </a:extLst>
+        </p:spPr>
+        <p:txBody>
+          <a:bodyPr lIns="45719" rIns="45719">
+            <a:spAutoFit/>
+          </a:bodyPr>
+          <a:lstStyle/>
+          <a:p>
+            <a:pPr marL="285750" indent="-285750">
+              <a:buSzPct val="100000"/>
+              <a:buChar char="❑"/>
+            </a:pPr>
+            <a:r>
+              <a:rPr lang="es-ES" dirty="0"/>
+              <a:t>UML</a:t>
+            </a:r>
+            <a:endParaRPr dirty="0"/>
+          </a:p>
+          <a:p>
+            <a:pPr marL="285750" indent="-285750">
+              <a:buSzPct val="100000"/>
+              <a:buChar char="❑"/>
+            </a:pPr>
+            <a:r>
+              <a:rPr dirty="0" err="1"/>
+              <a:t>Funcionalidades</a:t>
+            </a:r>
+            <a:endParaRPr dirty="0"/>
+          </a:p>
+          <a:p>
+            <a:pPr marL="285750" indent="-285750">
+              <a:buSzPct val="100000"/>
+              <a:buChar char="❑"/>
+            </a:pPr>
+            <a:r>
+              <a:rPr dirty="0" err="1"/>
+              <a:t>Demostración</a:t>
+            </a:r>
+            <a:endParaRPr dirty="0"/>
+          </a:p>
+          <a:p>
+            <a:pPr marL="285750" indent="-285750">
+              <a:buSzPct val="100000"/>
+              <a:buChar char="❑"/>
+            </a:pPr>
+            <a:r>
+              <a:rPr dirty="0" err="1"/>
+              <a:t>Aspectos</a:t>
+            </a:r>
+            <a:endParaRPr dirty="0"/>
+          </a:p>
+          <a:p>
+            <a:pPr marL="285750" indent="-285750">
+              <a:buSzPct val="100000"/>
+              <a:buChar char="❑"/>
+              <a:defRPr b="1"/>
+            </a:pPr>
+            <a:r>
+              <a:rPr dirty="0" err="1"/>
+              <a:t>Conclusiones</a:t>
+            </a:r>
+            <a:endParaRPr dirty="0"/>
+          </a:p>
+        </p:txBody>
+      </p:sp>
+      <p:sp>
+        <p:nvSpPr>
+          <p:cNvPr id="192" name="Marcador de contenido 2"/>
+          <p:cNvSpPr txBox="1">
+            <a:spLocks noGrp="1"/>
+          </p:cNvSpPr>
+          <p:nvPr>
+            <p:ph type="body" idx="1"/>
+          </p:nvPr>
+        </p:nvSpPr>
+        <p:spPr>
+          <a:xfrm>
+            <a:off x="2190749" y="1852614"/>
+            <a:ext cx="8945565" cy="1576386"/>
+          </a:xfrm>
+          <a:prstGeom prst="rect">
+            <a:avLst/>
+          </a:prstGeom>
+        </p:spPr>
+        <p:txBody>
+          <a:bodyPr>
+            <a:normAutofit fontScale="92500" lnSpcReduction="10000"/>
+          </a:bodyPr>
+          <a:lstStyle/>
+          <a:p>
+            <a:pPr>
+              <a:buFont typeface="Arial"/>
+              <a:buChar char="•"/>
+            </a:pPr>
+            <a:r>
+              <a:rPr dirty="0"/>
+              <a:t> </a:t>
+            </a:r>
+            <a:r>
+              <a:rPr dirty="0" err="1"/>
+              <a:t>Fácil</a:t>
+            </a:r>
+            <a:r>
+              <a:rPr dirty="0"/>
+              <a:t> </a:t>
+            </a:r>
+            <a:r>
+              <a:rPr dirty="0" err="1"/>
+              <a:t>manejo</a:t>
+            </a:r>
+            <a:r>
+              <a:rPr dirty="0"/>
+              <a:t> de la </a:t>
+            </a:r>
+            <a:r>
+              <a:rPr dirty="0" err="1"/>
+              <a:t>plataforma</a:t>
+            </a:r>
+            <a:r>
+              <a:rPr dirty="0"/>
+              <a:t> </a:t>
+            </a:r>
+            <a:r>
+              <a:rPr dirty="0" err="1"/>
+              <a:t>escogida</a:t>
+            </a:r>
+            <a:r>
+              <a:rPr dirty="0"/>
+              <a:t> (Laravel)</a:t>
+            </a:r>
+            <a:r>
+              <a:rPr lang="es-ES" dirty="0"/>
+              <a:t> y gran documentación</a:t>
+            </a:r>
+            <a:r>
+              <a:rPr dirty="0"/>
+              <a:t>.</a:t>
+            </a:r>
+          </a:p>
+          <a:p>
+            <a:pPr>
+              <a:buFont typeface="Arial"/>
+              <a:buChar char="•"/>
+            </a:pPr>
+            <a:r>
+              <a:rPr dirty="0"/>
+              <a:t> </a:t>
+            </a:r>
+            <a:r>
+              <a:rPr dirty="0" err="1"/>
+              <a:t>Integración</a:t>
+            </a:r>
+            <a:r>
+              <a:rPr dirty="0"/>
+              <a:t> entre Laravel, Visual Code y </a:t>
+            </a:r>
+            <a:r>
+              <a:rPr dirty="0" err="1"/>
+              <a:t>Github</a:t>
+            </a:r>
+            <a:r>
+              <a:rPr dirty="0"/>
+              <a:t>.</a:t>
+            </a:r>
+          </a:p>
+          <a:p>
+            <a:pPr>
+              <a:buFont typeface="Arial"/>
+              <a:buChar char="•"/>
+            </a:pPr>
+            <a:r>
+              <a:rPr dirty="0"/>
+              <a:t> Buena </a:t>
+            </a:r>
+            <a:r>
+              <a:rPr dirty="0" err="1"/>
+              <a:t>organización</a:t>
+            </a:r>
+            <a:r>
+              <a:rPr lang="es-ES" dirty="0"/>
+              <a:t> y comunicación</a:t>
+            </a:r>
+            <a:r>
+              <a:rPr dirty="0"/>
+              <a:t> de</a:t>
+            </a:r>
+            <a:r>
+              <a:rPr lang="es-ES" dirty="0"/>
+              <a:t>l</a:t>
+            </a:r>
+            <a:r>
+              <a:rPr dirty="0"/>
+              <a:t> </a:t>
+            </a:r>
+            <a:r>
+              <a:rPr dirty="0" err="1"/>
+              <a:t>equipo</a:t>
+            </a:r>
+            <a:r>
+              <a:rPr lang="es-ES" dirty="0"/>
+              <a:t> </a:t>
+            </a:r>
+            <a:r>
+              <a:rPr dirty="0"/>
+              <a:t>.</a:t>
+            </a:r>
+            <a:endParaRPr lang="es-ES" dirty="0"/>
+          </a:p>
+          <a:p>
+            <a:pPr>
+              <a:buFont typeface="Arial"/>
+              <a:buChar char="•"/>
+            </a:pPr>
+            <a:r>
+              <a:rPr lang="es-ES" dirty="0"/>
+              <a:t> </a:t>
+            </a:r>
+            <a:r>
+              <a:rPr lang="es-ES"/>
+              <a:t>Buena etodología </a:t>
+            </a:r>
+            <a:r>
+              <a:rPr lang="es-ES" dirty="0"/>
+              <a:t>de trabajo utilizada en las prácticas </a:t>
+            </a:r>
+          </a:p>
+          <a:p>
+            <a:pPr marL="0" indent="0">
+              <a:buNone/>
+            </a:pPr>
+            <a:endParaRPr dirty="0"/>
+          </a:p>
+          <a:p>
+            <a:pPr>
+              <a:buFont typeface="Arial"/>
+              <a:buChar char="•"/>
+            </a:pPr>
+            <a:endParaRPr dirty="0"/>
+          </a:p>
+        </p:txBody>
+      </p:sp>
+      <p:sp>
+        <p:nvSpPr>
+          <p:cNvPr id="7" name="Marcador de contenido 2">
+            <a:extLst>
+              <a:ext uri="{FF2B5EF4-FFF2-40B4-BE49-F238E27FC236}">
+                <a16:creationId xmlns:a16="http://schemas.microsoft.com/office/drawing/2014/main" id="{3957B8EA-D80D-4B07-9253-1F7E6C282644}"/>
+              </a:ext>
+            </a:extLst>
+          </p:cNvPr>
+          <p:cNvSpPr txBox="1">
+            <a:spLocks/>
+          </p:cNvSpPr>
+          <p:nvPr/>
+        </p:nvSpPr>
+        <p:spPr>
+          <a:xfrm>
+            <a:off x="2189992" y="3647652"/>
+            <a:ext cx="3905251" cy="2920553"/>
+          </a:xfrm>
+          <a:prstGeom prst="rect">
+            <a:avLst/>
+          </a:prstGeom>
+          <a:ln w="12700">
+            <a:miter lim="400000"/>
+          </a:ln>
+          <a:extLst>
+            <a:ext uri="{C572A759-6A51-4108-AA02-DFA0A04FC94B}">
+              <ma14:wrappingTextBoxFlag xmlns="" xmlns:m="http://schemas.openxmlformats.org/officeDocument/2006/math" xmlns:a14="http://schemas.microsoft.com/office/drawing/2010/main" xmlns:ma14="http://schemas.microsoft.com/office/mac/drawingml/2011/main" val="1"/>
+            </a:ext>
+          </a:extLst>
+        </p:spPr>
+        <p:txBody>
+          <a:bodyPr lIns="45719" rIns="45719">
+            <a:normAutofit/>
+          </a:bodyPr>
+          <a:lstStyle>
+            <a:lvl1pPr marL="91439" marR="0" indent="-91439" algn="l" defTabSz="914400" rtl="0" latinLnBrk="0">
+              <a:lnSpc>
+                <a:spcPct val="90000"/>
+              </a:lnSpc>
+              <a:spcBef>
+                <a:spcPts val="1200"/>
+              </a:spcBef>
+              <a:spcAft>
+                <a:spcPts val="0"/>
+              </a:spcAft>
+              <a:buClr>
+                <a:schemeClr val="accent2"/>
+              </a:buClr>
+              <a:buSzPct val="100000"/>
+              <a:buFont typeface="Tw Cen MT"/>
+              <a:buChar char=" "/>
+              <a:tabLst/>
+              <a:defRPr sz="2200" b="0" i="0" u="none" strike="noStrike" cap="none" spc="0" baseline="0">
+                <a:ln>
+                  <a:noFill/>
+                </a:ln>
+                <a:solidFill>
+                  <a:srgbClr val="2E2B21"/>
+                </a:solidFill>
+                <a:uFillTx/>
+                <a:latin typeface="Tw Cen MT"/>
+                <a:ea typeface="Tw Cen MT"/>
+                <a:cs typeface="Tw Cen MT"/>
+                <a:sym typeface="Tw Cen MT"/>
+              </a:defRPr>
+            </a:lvl1pPr>
+            <a:lvl2pPr marL="295655" marR="0" indent="-167639" algn="l" defTabSz="914400" rtl="0" latinLnBrk="0">
+              <a:lnSpc>
+                <a:spcPct val="90000"/>
+              </a:lnSpc>
+              <a:spcBef>
+                <a:spcPts val="1200"/>
+              </a:spcBef>
+              <a:spcAft>
+                <a:spcPts val="0"/>
+              </a:spcAft>
+              <a:buClr>
+                <a:schemeClr val="accent2"/>
+              </a:buClr>
+              <a:buSzPct val="100000"/>
+              <a:buFont typeface="Tw Cen MT"/>
+              <a:buChar char=""/>
+              <a:tabLst/>
+              <a:defRPr sz="2200" b="0" i="0" u="none" strike="noStrike" cap="none" spc="0" baseline="0">
+                <a:ln>
+                  <a:noFill/>
+                </a:ln>
+                <a:solidFill>
+                  <a:srgbClr val="2E2B21"/>
+                </a:solidFill>
+                <a:uFillTx/>
+                <a:latin typeface="Tw Cen MT"/>
+                <a:ea typeface="Tw Cen MT"/>
+                <a:cs typeface="Tw Cen MT"/>
+                <a:sym typeface="Tw Cen MT"/>
+              </a:defRPr>
+            </a:lvl2pPr>
+            <a:lvl3pPr marL="526433" marR="0" indent="-215537" algn="l" defTabSz="914400" rtl="0" latinLnBrk="0">
+              <a:lnSpc>
+                <a:spcPct val="90000"/>
+              </a:lnSpc>
+              <a:spcBef>
+                <a:spcPts val="1200"/>
+              </a:spcBef>
+              <a:spcAft>
+                <a:spcPts val="0"/>
+              </a:spcAft>
+              <a:buClr>
+                <a:schemeClr val="accent2"/>
+              </a:buClr>
+              <a:buSzPct val="100000"/>
+              <a:buFont typeface="Tw Cen MT"/>
+              <a:buChar char=""/>
+              <a:tabLst/>
+              <a:defRPr sz="2200" b="0" i="0" u="none" strike="noStrike" cap="none" spc="0" baseline="0">
+                <a:ln>
+                  <a:noFill/>
+                </a:ln>
+                <a:solidFill>
+                  <a:srgbClr val="2E2B21"/>
+                </a:solidFill>
+                <a:uFillTx/>
+                <a:latin typeface="Tw Cen MT"/>
+                <a:ea typeface="Tw Cen MT"/>
+                <a:cs typeface="Tw Cen MT"/>
+                <a:sym typeface="Tw Cen MT"/>
+              </a:defRPr>
+            </a:lvl3pPr>
+            <a:lvl4pPr marL="672737" marR="0" indent="-215537" algn="l" defTabSz="914400" rtl="0" latinLnBrk="0">
+              <a:lnSpc>
+                <a:spcPct val="90000"/>
+              </a:lnSpc>
+              <a:spcBef>
+                <a:spcPts val="1200"/>
+              </a:spcBef>
+              <a:spcAft>
+                <a:spcPts val="0"/>
+              </a:spcAft>
+              <a:buClr>
+                <a:schemeClr val="accent2"/>
+              </a:buClr>
+              <a:buSzPct val="100000"/>
+              <a:buFont typeface="Tw Cen MT"/>
+              <a:buChar char=""/>
+              <a:tabLst/>
+              <a:defRPr sz="2200" b="0" i="0" u="none" strike="noStrike" cap="none" spc="0" baseline="0">
+                <a:ln>
+                  <a:noFill/>
+                </a:ln>
+                <a:solidFill>
+                  <a:srgbClr val="2E2B21"/>
+                </a:solidFill>
+                <a:uFillTx/>
+                <a:latin typeface="Tw Cen MT"/>
+                <a:ea typeface="Tw Cen MT"/>
+                <a:cs typeface="Tw Cen MT"/>
+                <a:sym typeface="Tw Cen MT"/>
+              </a:defRPr>
+            </a:lvl4pPr>
+            <a:lvl5pPr marL="855617" marR="0" indent="-215537" algn="l" defTabSz="914400" rtl="0" latinLnBrk="0">
+              <a:lnSpc>
+                <a:spcPct val="90000"/>
+              </a:lnSpc>
+              <a:spcBef>
+                <a:spcPts val="1200"/>
+              </a:spcBef>
+              <a:spcAft>
+                <a:spcPts val="0"/>
+              </a:spcAft>
+              <a:buClr>
+                <a:schemeClr val="accent2"/>
+              </a:buClr>
+              <a:buSzPct val="100000"/>
+              <a:buFont typeface="Tw Cen MT"/>
+              <a:buChar char=""/>
+              <a:tabLst/>
+              <a:defRPr sz="2200" b="0" i="0" u="none" strike="noStrike" cap="none" spc="0" baseline="0">
+                <a:ln>
+                  <a:noFill/>
+                </a:ln>
+                <a:solidFill>
+                  <a:srgbClr val="2E2B21"/>
+                </a:solidFill>
+                <a:uFillTx/>
+                <a:latin typeface="Tw Cen MT"/>
+                <a:ea typeface="Tw Cen MT"/>
+                <a:cs typeface="Tw Cen MT"/>
+                <a:sym typeface="Tw Cen MT"/>
+              </a:defRPr>
+            </a:lvl5pPr>
+            <a:lvl6pPr marL="992777" marR="0" indent="-215537" algn="l" defTabSz="914400" rtl="0" latinLnBrk="0">
+              <a:lnSpc>
+                <a:spcPct val="90000"/>
+              </a:lnSpc>
+              <a:spcBef>
+                <a:spcPts val="1200"/>
+              </a:spcBef>
+              <a:spcAft>
+                <a:spcPts val="0"/>
+              </a:spcAft>
+              <a:buClr>
+                <a:schemeClr val="accent2"/>
+              </a:buClr>
+              <a:buSzPct val="100000"/>
+              <a:buFont typeface="Tw Cen MT"/>
+              <a:buChar char=""/>
+              <a:tabLst/>
+              <a:defRPr sz="2200" b="0" i="0" u="none" strike="noStrike" cap="none" spc="0" baseline="0">
+                <a:ln>
+                  <a:noFill/>
+                </a:ln>
+                <a:solidFill>
+                  <a:srgbClr val="2E2B21"/>
+                </a:solidFill>
+                <a:uFillTx/>
+                <a:latin typeface="Tw Cen MT"/>
+                <a:ea typeface="Tw Cen MT"/>
+                <a:cs typeface="Tw Cen MT"/>
+                <a:sym typeface="Tw Cen MT"/>
+              </a:defRPr>
+            </a:lvl6pPr>
+            <a:lvl7pPr marL="1139081" marR="0" indent="-215537" algn="l" defTabSz="914400" rtl="0" latinLnBrk="0">
+              <a:lnSpc>
+                <a:spcPct val="90000"/>
+              </a:lnSpc>
+              <a:spcBef>
+                <a:spcPts val="1200"/>
+              </a:spcBef>
+              <a:spcAft>
+                <a:spcPts val="0"/>
+              </a:spcAft>
+              <a:buClr>
+                <a:schemeClr val="accent2"/>
+              </a:buClr>
+              <a:buSzPct val="100000"/>
+              <a:buFont typeface="Tw Cen MT"/>
+              <a:buChar char=""/>
+              <a:tabLst/>
+              <a:defRPr sz="2200" b="0" i="0" u="none" strike="noStrike" cap="none" spc="0" baseline="0">
+                <a:ln>
+                  <a:noFill/>
+                </a:ln>
+                <a:solidFill>
+                  <a:srgbClr val="2E2B21"/>
+                </a:solidFill>
+                <a:uFillTx/>
+                <a:latin typeface="Tw Cen MT"/>
+                <a:ea typeface="Tw Cen MT"/>
+                <a:cs typeface="Tw Cen MT"/>
+                <a:sym typeface="Tw Cen MT"/>
+              </a:defRPr>
+            </a:lvl7pPr>
+            <a:lvl8pPr marL="1294529" marR="0" indent="-215537" algn="l" defTabSz="914400" rtl="0" latinLnBrk="0">
+              <a:lnSpc>
+                <a:spcPct val="90000"/>
+              </a:lnSpc>
+              <a:spcBef>
+                <a:spcPts val="1200"/>
+              </a:spcBef>
+              <a:spcAft>
+                <a:spcPts val="0"/>
+              </a:spcAft>
+              <a:buClr>
+                <a:schemeClr val="accent2"/>
+              </a:buClr>
+              <a:buSzPct val="100000"/>
+              <a:buFont typeface="Tw Cen MT"/>
+              <a:buChar char=""/>
+              <a:tabLst/>
+              <a:defRPr sz="2200" b="0" i="0" u="none" strike="noStrike" cap="none" spc="0" baseline="0">
+                <a:ln>
+                  <a:noFill/>
+                </a:ln>
+                <a:solidFill>
+                  <a:srgbClr val="2E2B21"/>
+                </a:solidFill>
+                <a:uFillTx/>
+                <a:latin typeface="Tw Cen MT"/>
+                <a:ea typeface="Tw Cen MT"/>
+                <a:cs typeface="Tw Cen MT"/>
+                <a:sym typeface="Tw Cen MT"/>
+              </a:defRPr>
+            </a:lvl8pPr>
+            <a:lvl9pPr marL="1440833" marR="0" indent="-215537" algn="l" defTabSz="914400" rtl="0" latinLnBrk="0">
+              <a:lnSpc>
+                <a:spcPct val="90000"/>
+              </a:lnSpc>
+              <a:spcBef>
+                <a:spcPts val="1200"/>
+              </a:spcBef>
+              <a:spcAft>
+                <a:spcPts val="0"/>
+              </a:spcAft>
+              <a:buClr>
+                <a:schemeClr val="accent2"/>
+              </a:buClr>
+              <a:buSzPct val="100000"/>
+              <a:buFont typeface="Tw Cen MT"/>
+              <a:buChar char=""/>
+              <a:tabLst/>
+              <a:defRPr sz="2200" b="0" i="0" u="none" strike="noStrike" cap="none" spc="0" baseline="0">
+                <a:ln>
+                  <a:noFill/>
+                </a:ln>
+                <a:solidFill>
+                  <a:srgbClr val="2E2B21"/>
+                </a:solidFill>
+                <a:uFillTx/>
+                <a:latin typeface="Tw Cen MT"/>
+                <a:ea typeface="Tw Cen MT"/>
+                <a:cs typeface="Tw Cen MT"/>
+                <a:sym typeface="Tw Cen MT"/>
+              </a:defRPr>
+            </a:lvl9pPr>
+          </a:lstStyle>
+          <a:p>
+            <a:pPr hangingPunct="1">
+              <a:buFont typeface="Arial"/>
+              <a:buChar char="•"/>
+            </a:pPr>
+            <a:r>
+              <a:rPr lang="es-ES" dirty="0"/>
+              <a:t> </a:t>
+            </a:r>
+            <a:r>
+              <a:rPr lang="es-ES" b="1" dirty="0"/>
+              <a:t>Problemas</a:t>
+            </a:r>
+            <a:r>
+              <a:rPr lang="es-ES" dirty="0"/>
+              <a:t>:</a:t>
+            </a:r>
+          </a:p>
+          <a:p>
+            <a:pPr marL="219455" lvl="1" indent="-91439" hangingPunct="1">
+              <a:buFont typeface="Arial"/>
+              <a:buChar char="•"/>
+            </a:pPr>
+            <a:r>
+              <a:rPr lang="es-ES" dirty="0"/>
+              <a:t> Consultas entre diferentes tablas</a:t>
+            </a:r>
+          </a:p>
+          <a:p>
+            <a:pPr marL="219455" lvl="1" indent="-91439" hangingPunct="1">
+              <a:buFont typeface="Arial"/>
+              <a:buChar char="•"/>
+            </a:pPr>
+            <a:r>
+              <a:rPr lang="es-ES" dirty="0"/>
+              <a:t> </a:t>
+            </a:r>
+            <a:r>
+              <a:rPr lang="es-ES" dirty="0" err="1"/>
+              <a:t>Value</a:t>
+            </a:r>
+            <a:r>
+              <a:rPr lang="es-ES" dirty="0"/>
+              <a:t> del </a:t>
+            </a:r>
+            <a:r>
+              <a:rPr lang="es-ES" dirty="0" err="1"/>
+              <a:t>option</a:t>
+            </a:r>
+            <a:r>
+              <a:rPr lang="es-ES" dirty="0"/>
+              <a:t> del </a:t>
+            </a:r>
+            <a:r>
+              <a:rPr lang="es-ES" dirty="0" err="1"/>
+              <a:t>select</a:t>
+            </a:r>
+            <a:endParaRPr lang="es-ES" dirty="0"/>
+          </a:p>
+          <a:p>
+            <a:pPr marL="219455" lvl="1" indent="-91439" hangingPunct="1">
+              <a:buFont typeface="Arial"/>
+              <a:buChar char="•"/>
+            </a:pPr>
+            <a:r>
+              <a:rPr lang="es-ES" dirty="0"/>
+              <a:t>Grupos de rutas(Middleware)</a:t>
+            </a:r>
+          </a:p>
+          <a:p>
+            <a:pPr marL="219455" lvl="1" indent="-91439" hangingPunct="1">
+              <a:buFont typeface="Arial"/>
+              <a:buChar char="•"/>
+            </a:pPr>
+            <a:r>
+              <a:rPr lang="es-ES" dirty="0"/>
+              <a:t>Fechas</a:t>
+            </a:r>
+          </a:p>
+        </p:txBody>
+      </p:sp>
+      <p:sp>
+        <p:nvSpPr>
+          <p:cNvPr id="8" name="Marcador de contenido 2">
+            <a:extLst>
+              <a:ext uri="{FF2B5EF4-FFF2-40B4-BE49-F238E27FC236}">
+                <a16:creationId xmlns:a16="http://schemas.microsoft.com/office/drawing/2014/main" id="{C951198A-3A8A-4065-A35E-FFE6AF844232}"/>
+              </a:ext>
+            </a:extLst>
+          </p:cNvPr>
+          <p:cNvSpPr txBox="1">
+            <a:spLocks/>
+          </p:cNvSpPr>
+          <p:nvPr/>
+        </p:nvSpPr>
+        <p:spPr>
+          <a:xfrm>
+            <a:off x="6663531" y="3647651"/>
+            <a:ext cx="3905251" cy="2920553"/>
+          </a:xfrm>
+          <a:prstGeom prst="rect">
+            <a:avLst/>
+          </a:prstGeom>
+          <a:ln w="12700">
+            <a:miter lim="400000"/>
+          </a:ln>
+          <a:extLst>
+            <a:ext uri="{C572A759-6A51-4108-AA02-DFA0A04FC94B}">
+              <ma14:wrappingTextBoxFlag xmlns="" xmlns:m="http://schemas.openxmlformats.org/officeDocument/2006/math" xmlns:a14="http://schemas.microsoft.com/office/drawing/2010/main" xmlns:ma14="http://schemas.microsoft.com/office/mac/drawingml/2011/main" val="1"/>
+            </a:ext>
+          </a:extLst>
+        </p:spPr>
+        <p:txBody>
+          <a:bodyPr lIns="45719" rIns="45719">
+            <a:normAutofit fontScale="92500"/>
+          </a:bodyPr>
+          <a:lstStyle>
+            <a:lvl1pPr marL="91439" marR="0" indent="-91439" algn="l" defTabSz="914400" rtl="0" latinLnBrk="0">
+              <a:lnSpc>
+                <a:spcPct val="90000"/>
+              </a:lnSpc>
+              <a:spcBef>
+                <a:spcPts val="1200"/>
+              </a:spcBef>
+              <a:spcAft>
+                <a:spcPts val="0"/>
+              </a:spcAft>
+              <a:buClr>
+                <a:schemeClr val="accent2"/>
+              </a:buClr>
+              <a:buSzPct val="100000"/>
+              <a:buFont typeface="Tw Cen MT"/>
+              <a:buChar char=" "/>
+              <a:tabLst/>
+              <a:defRPr sz="2200" b="0" i="0" u="none" strike="noStrike" cap="none" spc="0" baseline="0">
+                <a:ln>
+                  <a:noFill/>
+                </a:ln>
+                <a:solidFill>
+                  <a:srgbClr val="2E2B21"/>
+                </a:solidFill>
+                <a:uFillTx/>
+                <a:latin typeface="Tw Cen MT"/>
+                <a:ea typeface="Tw Cen MT"/>
+                <a:cs typeface="Tw Cen MT"/>
+                <a:sym typeface="Tw Cen MT"/>
+              </a:defRPr>
+            </a:lvl1pPr>
+            <a:lvl2pPr marL="295655" marR="0" indent="-167639" algn="l" defTabSz="914400" rtl="0" latinLnBrk="0">
+              <a:lnSpc>
+                <a:spcPct val="90000"/>
+              </a:lnSpc>
+              <a:spcBef>
+                <a:spcPts val="1200"/>
+              </a:spcBef>
+              <a:spcAft>
+                <a:spcPts val="0"/>
+              </a:spcAft>
+              <a:buClr>
+                <a:schemeClr val="accent2"/>
+              </a:buClr>
+              <a:buSzPct val="100000"/>
+              <a:buFont typeface="Tw Cen MT"/>
+              <a:buChar char=""/>
+              <a:tabLst/>
+              <a:defRPr sz="2200" b="0" i="0" u="none" strike="noStrike" cap="none" spc="0" baseline="0">
+                <a:ln>
+                  <a:noFill/>
+                </a:ln>
+                <a:solidFill>
+                  <a:srgbClr val="2E2B21"/>
+                </a:solidFill>
+                <a:uFillTx/>
+                <a:latin typeface="Tw Cen MT"/>
+                <a:ea typeface="Tw Cen MT"/>
+                <a:cs typeface="Tw Cen MT"/>
+                <a:sym typeface="Tw Cen MT"/>
+              </a:defRPr>
+            </a:lvl2pPr>
+            <a:lvl3pPr marL="526433" marR="0" indent="-215537" algn="l" defTabSz="914400" rtl="0" latinLnBrk="0">
+              <a:lnSpc>
+                <a:spcPct val="90000"/>
+              </a:lnSpc>
+              <a:spcBef>
+                <a:spcPts val="1200"/>
+              </a:spcBef>
+              <a:spcAft>
+                <a:spcPts val="0"/>
+              </a:spcAft>
+              <a:buClr>
+                <a:schemeClr val="accent2"/>
+              </a:buClr>
+              <a:buSzPct val="100000"/>
+              <a:buFont typeface="Tw Cen MT"/>
+              <a:buChar char=""/>
+              <a:tabLst/>
+              <a:defRPr sz="2200" b="0" i="0" u="none" strike="noStrike" cap="none" spc="0" baseline="0">
+                <a:ln>
+                  <a:noFill/>
+                </a:ln>
+                <a:solidFill>
+                  <a:srgbClr val="2E2B21"/>
+                </a:solidFill>
+                <a:uFillTx/>
+                <a:latin typeface="Tw Cen MT"/>
+                <a:ea typeface="Tw Cen MT"/>
+                <a:cs typeface="Tw Cen MT"/>
+                <a:sym typeface="Tw Cen MT"/>
+              </a:defRPr>
+            </a:lvl3pPr>
+            <a:lvl4pPr marL="672737" marR="0" indent="-215537" algn="l" defTabSz="914400" rtl="0" latinLnBrk="0">
+              <a:lnSpc>
+                <a:spcPct val="90000"/>
+              </a:lnSpc>
+              <a:spcBef>
+                <a:spcPts val="1200"/>
+              </a:spcBef>
+              <a:spcAft>
+                <a:spcPts val="0"/>
+              </a:spcAft>
+              <a:buClr>
+                <a:schemeClr val="accent2"/>
+              </a:buClr>
+              <a:buSzPct val="100000"/>
+              <a:buFont typeface="Tw Cen MT"/>
+              <a:buChar char=""/>
+              <a:tabLst/>
+              <a:defRPr sz="2200" b="0" i="0" u="none" strike="noStrike" cap="none" spc="0" baseline="0">
+                <a:ln>
+                  <a:noFill/>
+                </a:ln>
+                <a:solidFill>
+                  <a:srgbClr val="2E2B21"/>
+                </a:solidFill>
+                <a:uFillTx/>
+                <a:latin typeface="Tw Cen MT"/>
+                <a:ea typeface="Tw Cen MT"/>
+                <a:cs typeface="Tw Cen MT"/>
+                <a:sym typeface="Tw Cen MT"/>
+              </a:defRPr>
+            </a:lvl4pPr>
+            <a:lvl5pPr marL="855617" marR="0" indent="-215537" algn="l" defTabSz="914400" rtl="0" latinLnBrk="0">
+              <a:lnSpc>
+                <a:spcPct val="90000"/>
+              </a:lnSpc>
+              <a:spcBef>
+                <a:spcPts val="1200"/>
+              </a:spcBef>
+              <a:spcAft>
+                <a:spcPts val="0"/>
+              </a:spcAft>
+              <a:buClr>
+                <a:schemeClr val="accent2"/>
+              </a:buClr>
+              <a:buSzPct val="100000"/>
+              <a:buFont typeface="Tw Cen MT"/>
+              <a:buChar char=""/>
+              <a:tabLst/>
+              <a:defRPr sz="2200" b="0" i="0" u="none" strike="noStrike" cap="none" spc="0" baseline="0">
+                <a:ln>
+                  <a:noFill/>
+                </a:ln>
+                <a:solidFill>
+                  <a:srgbClr val="2E2B21"/>
+                </a:solidFill>
+                <a:uFillTx/>
+                <a:latin typeface="Tw Cen MT"/>
+                <a:ea typeface="Tw Cen MT"/>
+                <a:cs typeface="Tw Cen MT"/>
+                <a:sym typeface="Tw Cen MT"/>
+              </a:defRPr>
+            </a:lvl5pPr>
+            <a:lvl6pPr marL="992777" marR="0" indent="-215537" algn="l" defTabSz="914400" rtl="0" latinLnBrk="0">
+              <a:lnSpc>
+                <a:spcPct val="90000"/>
+              </a:lnSpc>
+              <a:spcBef>
+                <a:spcPts val="1200"/>
+              </a:spcBef>
+              <a:spcAft>
+                <a:spcPts val="0"/>
+              </a:spcAft>
+              <a:buClr>
+                <a:schemeClr val="accent2"/>
+              </a:buClr>
+              <a:buSzPct val="100000"/>
+              <a:buFont typeface="Tw Cen MT"/>
+              <a:buChar char=""/>
+              <a:tabLst/>
+              <a:defRPr sz="2200" b="0" i="0" u="none" strike="noStrike" cap="none" spc="0" baseline="0">
+                <a:ln>
+                  <a:noFill/>
+                </a:ln>
+                <a:solidFill>
+                  <a:srgbClr val="2E2B21"/>
+                </a:solidFill>
+                <a:uFillTx/>
+                <a:latin typeface="Tw Cen MT"/>
+                <a:ea typeface="Tw Cen MT"/>
+                <a:cs typeface="Tw Cen MT"/>
+                <a:sym typeface="Tw Cen MT"/>
+              </a:defRPr>
+            </a:lvl6pPr>
+            <a:lvl7pPr marL="1139081" marR="0" indent="-215537" algn="l" defTabSz="914400" rtl="0" latinLnBrk="0">
+              <a:lnSpc>
+                <a:spcPct val="90000"/>
+              </a:lnSpc>
+              <a:spcBef>
+                <a:spcPts val="1200"/>
+              </a:spcBef>
+              <a:spcAft>
+                <a:spcPts val="0"/>
+              </a:spcAft>
+              <a:buClr>
+                <a:schemeClr val="accent2"/>
+              </a:buClr>
+              <a:buSzPct val="100000"/>
+              <a:buFont typeface="Tw Cen MT"/>
+              <a:buChar char=""/>
+              <a:tabLst/>
+              <a:defRPr sz="2200" b="0" i="0" u="none" strike="noStrike" cap="none" spc="0" baseline="0">
+                <a:ln>
+                  <a:noFill/>
+                </a:ln>
+                <a:solidFill>
+                  <a:srgbClr val="2E2B21"/>
+                </a:solidFill>
+                <a:uFillTx/>
+                <a:latin typeface="Tw Cen MT"/>
+                <a:ea typeface="Tw Cen MT"/>
+                <a:cs typeface="Tw Cen MT"/>
+                <a:sym typeface="Tw Cen MT"/>
+              </a:defRPr>
+            </a:lvl7pPr>
+            <a:lvl8pPr marL="1294529" marR="0" indent="-215537" algn="l" defTabSz="914400" rtl="0" latinLnBrk="0">
+              <a:lnSpc>
+                <a:spcPct val="90000"/>
+              </a:lnSpc>
+              <a:spcBef>
+                <a:spcPts val="1200"/>
+              </a:spcBef>
+              <a:spcAft>
+                <a:spcPts val="0"/>
+              </a:spcAft>
+              <a:buClr>
+                <a:schemeClr val="accent2"/>
+              </a:buClr>
+              <a:buSzPct val="100000"/>
+              <a:buFont typeface="Tw Cen MT"/>
+              <a:buChar char=""/>
+              <a:tabLst/>
+              <a:defRPr sz="2200" b="0" i="0" u="none" strike="noStrike" cap="none" spc="0" baseline="0">
+                <a:ln>
+                  <a:noFill/>
+                </a:ln>
+                <a:solidFill>
+                  <a:srgbClr val="2E2B21"/>
+                </a:solidFill>
+                <a:uFillTx/>
+                <a:latin typeface="Tw Cen MT"/>
+                <a:ea typeface="Tw Cen MT"/>
+                <a:cs typeface="Tw Cen MT"/>
+                <a:sym typeface="Tw Cen MT"/>
+              </a:defRPr>
+            </a:lvl8pPr>
+            <a:lvl9pPr marL="1440833" marR="0" indent="-215537" algn="l" defTabSz="914400" rtl="0" latinLnBrk="0">
+              <a:lnSpc>
+                <a:spcPct val="90000"/>
+              </a:lnSpc>
+              <a:spcBef>
+                <a:spcPts val="1200"/>
+              </a:spcBef>
+              <a:spcAft>
+                <a:spcPts val="0"/>
+              </a:spcAft>
+              <a:buClr>
+                <a:schemeClr val="accent2"/>
+              </a:buClr>
+              <a:buSzPct val="100000"/>
+              <a:buFont typeface="Tw Cen MT"/>
+              <a:buChar char=""/>
+              <a:tabLst/>
+              <a:defRPr sz="2200" b="0" i="0" u="none" strike="noStrike" cap="none" spc="0" baseline="0">
+                <a:ln>
+                  <a:noFill/>
+                </a:ln>
+                <a:solidFill>
+                  <a:srgbClr val="2E2B21"/>
+                </a:solidFill>
+                <a:uFillTx/>
+                <a:latin typeface="Tw Cen MT"/>
+                <a:ea typeface="Tw Cen MT"/>
+                <a:cs typeface="Tw Cen MT"/>
+                <a:sym typeface="Tw Cen MT"/>
+              </a:defRPr>
+            </a:lvl9pPr>
+          </a:lstStyle>
+          <a:p>
+            <a:pPr hangingPunct="1">
+              <a:buFont typeface="Arial"/>
+              <a:buChar char="•"/>
+              <a:defRPr b="1"/>
+            </a:pPr>
+            <a:r>
+              <a:rPr lang="es-ES" b="1" dirty="0"/>
+              <a:t> Posibles mejoras :</a:t>
+            </a:r>
+          </a:p>
+          <a:p>
+            <a:pPr marL="219455" lvl="1" indent="-91439" hangingPunct="1">
+              <a:buFont typeface="Arial"/>
+              <a:buChar char="•"/>
+            </a:pPr>
+            <a:r>
+              <a:rPr lang="es-ES" dirty="0"/>
+              <a:t> Mejorar estilo de la interfaz.</a:t>
+            </a:r>
+          </a:p>
+          <a:p>
+            <a:pPr marL="219455" lvl="1" indent="-91439" hangingPunct="1">
+              <a:buFont typeface="Arial"/>
+              <a:buChar char="•"/>
+            </a:pPr>
+            <a:r>
+              <a:rPr lang="es-ES" dirty="0"/>
+              <a:t> Añadir más opciones al buscador</a:t>
+            </a:r>
+          </a:p>
+          <a:p>
+            <a:pPr marL="219455" lvl="1" indent="-91439" hangingPunct="1">
+              <a:buFont typeface="Arial"/>
+              <a:buChar char="•"/>
+            </a:pPr>
+            <a:r>
+              <a:rPr lang="es-ES" dirty="0"/>
+              <a:t> Ofrecer ofertas de vuelos</a:t>
+            </a:r>
+          </a:p>
+          <a:p>
+            <a:pPr marL="219455" lvl="1" indent="-91439" hangingPunct="1">
+              <a:buFont typeface="Arial"/>
+              <a:buChar char="•"/>
+            </a:pPr>
+            <a:r>
+              <a:rPr lang="es-ES" dirty="0"/>
+              <a:t> Roles y usuarios</a:t>
+            </a:r>
+          </a:p>
+          <a:p>
+            <a:pPr marL="219455" lvl="1" indent="-91439" hangingPunct="1">
+              <a:buFont typeface="Arial"/>
+              <a:buChar char="•"/>
+            </a:pPr>
+            <a:r>
+              <a:rPr lang="es-ES" dirty="0"/>
+              <a:t> Reasignar a pasajeros por    cancelación de vuelos</a:t>
+            </a:r>
+          </a:p>
+        </p:txBody>
+      </p:sp>
+    </p:spTree>
+  </p:cSld>
+  <p:clrMapOvr>
+    <a:masterClrMapping/>
+  </p:clrMapOvr>
+  <p:transition spd="med"/>
+</p:sld>
+</file>
+
 <file path=ppt/slides/slide2.xml><?xml version="1.0" encoding="utf-8"?>
 <p:sld xmlns:a="http://schemas.openxmlformats.org/drawingml/2006/main" xmlns:r="http://schemas.openxmlformats.org/officeDocument/2006/relationships" xmlns:p="http://schemas.openxmlformats.org/presentationml/2006/main">
   <p:cSld>
@@ -4305,7 +5955,7 @@
         <p:spPr>
           <a:xfrm>
             <a:off x="5564666" y="1483916"/>
-            <a:ext cx="1718182" cy="350662"/>
+            <a:ext cx="1797926" cy="369332"/>
           </a:xfrm>
           <a:prstGeom prst="rect">
             <a:avLst/>
@@ -4335,16 +5985,8 @@
           </a:lstStyle>
           <a:p>
             <a:r>
-              <a:rPr dirty="0" err="1"/>
-              <a:t>Página</a:t>
-            </a:r>
-            <a:r>
-              <a:rPr dirty="0"/>
-              <a:t> de </a:t>
-            </a:r>
-            <a:r>
-              <a:rPr dirty="0" err="1"/>
-              <a:t>inicio</a:t>
+              <a:rPr lang="es-ES" dirty="0"/>
+              <a:t>Buscador vuelos</a:t>
             </a:r>
             <a:endParaRPr dirty="0"/>
           </a:p>
@@ -4358,7 +6000,7 @@
         </p:nvSpPr>
         <p:spPr>
           <a:xfrm>
-            <a:off x="135903" y="2413336"/>
+            <a:off x="213264" y="1834578"/>
             <a:ext cx="2054089" cy="1477328"/>
           </a:xfrm>
           <a:prstGeom prst="rect">
@@ -4440,7 +6082,13 @@
       </p:sp>
       <p:pic>
         <p:nvPicPr>
-          <p:cNvPr id="125" name="Captura de pantalla 2019-04-08 a las 10.39.53.png" descr="Captura de pantalla 2019-04-08 a las 10.39.53.png"/>
+          <p:cNvPr id="3" name="Imagen 2">
+            <a:extLst>
+              <a:ext uri="{FF2B5EF4-FFF2-40B4-BE49-F238E27FC236}">
+                <a16:creationId xmlns:a16="http://schemas.microsoft.com/office/drawing/2014/main" id="{01003D0B-C013-4802-A14C-FD6F5B273DDE}"/>
+              </a:ext>
+            </a:extLst>
+          </p:cNvPr>
           <p:cNvPicPr>
             <a:picLocks noChangeAspect="1"/>
           </p:cNvPicPr>
@@ -4448,7 +6096,11 @@
         </p:nvPicPr>
         <p:blipFill>
           <a:blip r:embed="rId2">
-            <a:extLst/>
+            <a:extLst>
+              <a:ext uri="{28A0092B-C50C-407E-A947-70E740481C1C}">
+                <a14:useLocalDpi xmlns:a14="http://schemas.microsoft.com/office/drawing/2010/main" val="0"/>
+              </a:ext>
+            </a:extLst>
           </a:blip>
           <a:stretch>
             <a:fillRect/>
@@ -4456,15 +6108,12 @@
         </p:blipFill>
         <p:spPr>
           <a:xfrm>
-            <a:off x="3044571" y="2073158"/>
-            <a:ext cx="6758371" cy="4125750"/>
+            <a:off x="104775" y="3429000"/>
+            <a:ext cx="11982450" cy="3238500"/>
           </a:xfrm>
           <a:prstGeom prst="rect">
             <a:avLst/>
           </a:prstGeom>
-          <a:ln w="12700">
-            <a:miter lim="400000"/>
-          </a:ln>
         </p:spPr>
       </p:pic>
     </p:spTree>
@@ -4495,244 +6144,152 @@
       </p:grpSpPr>
       <p:sp>
         <p:nvSpPr>
-          <p:cNvPr id="2" name="Título 1">
-            <a:extLst>
-              <a:ext uri="{FF2B5EF4-FFF2-40B4-BE49-F238E27FC236}">
-                <a16:creationId xmlns:a16="http://schemas.microsoft.com/office/drawing/2014/main" id="{AC7DBC01-8ECE-41C5-8E3F-384133D4DA41}"/>
-              </a:ext>
-            </a:extLst>
-          </p:cNvPr>
-          <p:cNvSpPr>
+          <p:cNvPr id="122" name="Título 1"/>
+          <p:cNvSpPr txBox="1">
             <a:spLocks noGrp="1"/>
           </p:cNvSpPr>
           <p:nvPr>
             <p:ph type="title"/>
           </p:nvPr>
         </p:nvSpPr>
-        <p:spPr/>
+        <p:spPr>
+          <a:xfrm>
+            <a:off x="1024128" y="585216"/>
+            <a:ext cx="9720072" cy="1499617"/>
+          </a:xfrm>
+          <a:prstGeom prst="rect">
+            <a:avLst/>
+          </a:prstGeom>
+        </p:spPr>
         <p:txBody>
           <a:bodyPr/>
           <a:lstStyle/>
           <a:p>
-            <a:r>
-              <a:rPr lang="es-ES" sz="4400" dirty="0"/>
-              <a:t>Aspectos a resaltar:</a:t>
-            </a:r>
-            <a:endParaRPr lang="es-ES" dirty="0"/>
+            <a:pPr defTabSz="886968">
+              <a:defRPr sz="3783" spc="97">
+                <a:latin typeface="Arial"/>
+                <a:ea typeface="Arial"/>
+                <a:cs typeface="Arial"/>
+                <a:sym typeface="Arial"/>
+              </a:defRPr>
+            </a:pPr>
+            <a:r>
+              <a:rPr dirty="0" err="1"/>
+              <a:t>Demostración</a:t>
+            </a:r>
+            <a:r>
+              <a:rPr dirty="0"/>
+              <a:t> </a:t>
+            </a:r>
+            <a:r>
+              <a:rPr dirty="0" err="1"/>
+              <a:t>funcional</a:t>
+            </a:r>
+            <a:r>
+              <a:rPr dirty="0"/>
+              <a:t> del </a:t>
+            </a:r>
+            <a:r>
+              <a:rPr dirty="0" err="1"/>
+              <a:t>proyecto</a:t>
+            </a:r>
+            <a:r>
+              <a:rPr dirty="0"/>
+              <a:t>.</a:t>
+            </a:r>
+            <a:br>
+              <a:rPr dirty="0"/>
+            </a:br>
+            <a:endParaRPr dirty="0"/>
           </a:p>
         </p:txBody>
       </p:sp>
       <p:sp>
         <p:nvSpPr>
-          <p:cNvPr id="5" name="CuadroTexto 4">
-            <a:extLst>
-              <a:ext uri="{FF2B5EF4-FFF2-40B4-BE49-F238E27FC236}">
-                <a16:creationId xmlns:a16="http://schemas.microsoft.com/office/drawing/2014/main" id="{C68EC0AD-0AEE-4F4E-AEE1-28A128CF2A1A}"/>
-              </a:ext>
-            </a:extLst>
-          </p:cNvPr>
+          <p:cNvPr id="123" name="Rectángulo 4"/>
           <p:cNvSpPr txBox="1"/>
           <p:nvPr/>
         </p:nvSpPr>
         <p:spPr>
           <a:xfrm>
-            <a:off x="135904" y="2413337"/>
-            <a:ext cx="2054087" cy="1477328"/>
+            <a:off x="5564666" y="1483916"/>
+            <a:ext cx="1797926" cy="369332"/>
           </a:xfrm>
           <a:prstGeom prst="rect">
             <a:avLst/>
           </a:prstGeom>
-          <a:noFill/>
-          <a:ln>
-            <a:solidFill>
-              <a:schemeClr val="tx1"/>
-            </a:solidFill>
+          <a:ln w="12700">
+            <a:miter lim="400000"/>
           </a:ln>
+          <a:extLst>
+            <a:ext uri="{C572A759-6A51-4108-AA02-DFA0A04FC94B}">
+              <ma14:wrappingTextBoxFlag xmlns="" xmlns:m="http://schemas.openxmlformats.org/officeDocument/2006/math" xmlns:a14="http://schemas.microsoft.com/office/drawing/2010/main" xmlns:ma14="http://schemas.microsoft.com/office/mac/drawingml/2011/main" val="1"/>
+            </a:ext>
+          </a:extLst>
         </p:spPr>
         <p:txBody>
-          <a:bodyPr wrap="square" rtlCol="0">
+          <a:bodyPr wrap="none" lIns="45719" rIns="45719">
             <a:spAutoFit/>
           </a:bodyPr>
-          <a:lstStyle/>
-          <a:p>
-            <a:pPr marL="285750" indent="-285750">
-              <a:buFont typeface="Wingdings" panose="05000000000000000000" pitchFamily="2" charset="2"/>
-              <a:buChar char="q"/>
-            </a:pPr>
+          <a:lstStyle>
+            <a:lvl1pPr>
+              <a:defRPr>
+                <a:latin typeface="Arial"/>
+                <a:ea typeface="Arial"/>
+                <a:cs typeface="Arial"/>
+                <a:sym typeface="Arial"/>
+              </a:defRPr>
+            </a:lvl1pPr>
+          </a:lstStyle>
+          <a:p>
             <a:r>
               <a:rPr lang="es-ES" dirty="0"/>
-              <a:t>UML</a:t>
-            </a:r>
-          </a:p>
-          <a:p>
-            <a:pPr marL="285750" indent="-285750">
-              <a:buFont typeface="Wingdings" panose="05000000000000000000" pitchFamily="2" charset="2"/>
-              <a:buChar char="q"/>
-            </a:pPr>
-            <a:r>
-              <a:rPr lang="es-ES" dirty="0"/>
-              <a:t>Funcionalidades</a:t>
-            </a:r>
-          </a:p>
-          <a:p>
-            <a:pPr marL="285750" indent="-285750">
-              <a:buFont typeface="Wingdings" panose="05000000000000000000" pitchFamily="2" charset="2"/>
-              <a:buChar char="q"/>
-            </a:pPr>
-            <a:r>
-              <a:rPr lang="es-ES" dirty="0"/>
-              <a:t>Demostración</a:t>
-            </a:r>
-          </a:p>
-          <a:p>
-            <a:pPr marL="285750" indent="-285750">
-              <a:buFont typeface="Wingdings" panose="05000000000000000000" pitchFamily="2" charset="2"/>
-              <a:buChar char="q"/>
-            </a:pPr>
-            <a:r>
-              <a:rPr lang="es-ES" b="1" dirty="0"/>
-              <a:t>Aspectos</a:t>
-            </a:r>
-          </a:p>
-          <a:p>
-            <a:pPr marL="285750" indent="-285750">
-              <a:buFont typeface="Wingdings" panose="05000000000000000000" pitchFamily="2" charset="2"/>
-              <a:buChar char="q"/>
-            </a:pPr>
-            <a:r>
-              <a:rPr lang="es-ES" dirty="0"/>
-              <a:t>Conclusiones</a:t>
-            </a:r>
+              <a:t>Buscador vuelos</a:t>
+            </a:r>
+            <a:endParaRPr dirty="0"/>
           </a:p>
         </p:txBody>
       </p:sp>
-      <p:sp>
-        <p:nvSpPr>
-          <p:cNvPr id="8" name="Marcador de texto 7">
+      <p:pic>
+        <p:nvPicPr>
+          <p:cNvPr id="6" name="Imagen 5">
             <a:extLst>
               <a:ext uri="{FF2B5EF4-FFF2-40B4-BE49-F238E27FC236}">
-                <a16:creationId xmlns:a16="http://schemas.microsoft.com/office/drawing/2014/main" id="{9FD5B537-1BD9-402F-B27C-A11A4569434D}"/>
+                <a16:creationId xmlns:a16="http://schemas.microsoft.com/office/drawing/2014/main" id="{A3B77471-D63B-4A35-9984-B4AD96EDB204}"/>
               </a:ext>
             </a:extLst>
           </p:cNvPr>
-          <p:cNvSpPr>
-            <a:spLocks noGrp="1"/>
-          </p:cNvSpPr>
-          <p:nvPr>
-            <p:ph type="body" idx="1"/>
-          </p:nvPr>
-        </p:nvSpPr>
+          <p:cNvPicPr>
+            <a:picLocks noChangeAspect="1"/>
+          </p:cNvPicPr>
+          <p:nvPr/>
+        </p:nvPicPr>
+        <p:blipFill>
+          <a:blip r:embed="rId2">
+            <a:extLst>
+              <a:ext uri="{28A0092B-C50C-407E-A947-70E740481C1C}">
+                <a14:useLocalDpi xmlns:a14="http://schemas.microsoft.com/office/drawing/2010/main" val="0"/>
+              </a:ext>
+            </a:extLst>
+          </a:blip>
+          <a:stretch>
+            <a:fillRect/>
+          </a:stretch>
+        </p:blipFill>
         <p:spPr>
           <a:xfrm>
-            <a:off x="2321169" y="2286000"/>
-            <a:ext cx="8423031" cy="4023360"/>
+            <a:off x="574614" y="2084833"/>
+            <a:ext cx="11042772" cy="4707334"/>
           </a:xfrm>
+          <a:prstGeom prst="rect">
+            <a:avLst/>
+          </a:prstGeom>
         </p:spPr>
-        <p:txBody>
-          <a:bodyPr/>
-          <a:lstStyle/>
-          <a:p>
-            <a:pPr lvl="0">
-              <a:buFont typeface="Arial" panose="020B0604020202020204" pitchFamily="34" charset="0"/>
-              <a:buChar char="•"/>
-            </a:pPr>
-            <a:r>
-              <a:rPr lang="es-ES" dirty="0"/>
-              <a:t>Abrir página web desde el móvil.</a:t>
-            </a:r>
-          </a:p>
-          <a:p>
-            <a:pPr lvl="0">
-              <a:buFont typeface="Arial" panose="020B0604020202020204" pitchFamily="34" charset="0"/>
-              <a:buChar char="•"/>
-            </a:pPr>
-            <a:r>
-              <a:rPr lang="es-ES" dirty="0"/>
-              <a:t>Capa de servicios y UML</a:t>
-            </a:r>
-          </a:p>
-          <a:p>
-            <a:pPr lvl="0">
-              <a:buFont typeface="Arial" panose="020B0604020202020204" pitchFamily="34" charset="0"/>
-              <a:buChar char="•"/>
-            </a:pPr>
-            <a:r>
-              <a:rPr lang="es-ES" dirty="0"/>
-              <a:t>Notificaciones al administrador</a:t>
-            </a:r>
-          </a:p>
-          <a:p>
-            <a:pPr lvl="0">
-              <a:buFont typeface="Arial" panose="020B0604020202020204" pitchFamily="34" charset="0"/>
-              <a:buChar char="•"/>
-            </a:pPr>
-            <a:r>
-              <a:rPr lang="es-ES" dirty="0"/>
-              <a:t>Correo de reseteo de contraseñas</a:t>
-            </a:r>
-          </a:p>
-          <a:p>
-            <a:pPr lvl="0">
-              <a:buFont typeface="Arial" panose="020B0604020202020204" pitchFamily="34" charset="0"/>
-              <a:buChar char="•"/>
-            </a:pPr>
-            <a:r>
-              <a:rPr lang="es-ES" dirty="0"/>
-              <a:t>Middleware para controlar el acceso a los usuarios a diferentes páginas o secciones de las mismas.</a:t>
-            </a:r>
-          </a:p>
-          <a:p>
-            <a:pPr lvl="0">
-              <a:buFont typeface="Arial" panose="020B0604020202020204" pitchFamily="34" charset="0"/>
-              <a:buChar char="•"/>
-            </a:pPr>
-            <a:r>
-              <a:rPr lang="es-ES" dirty="0"/>
-              <a:t>Validación de </a:t>
-            </a:r>
-            <a:r>
-              <a:rPr lang="es-ES" dirty="0" err="1"/>
-              <a:t>dni</a:t>
-            </a:r>
-            <a:r>
-              <a:rPr lang="es-ES" dirty="0"/>
-              <a:t>.</a:t>
-            </a:r>
-          </a:p>
-          <a:p>
-            <a:pPr lvl="0">
-              <a:buFont typeface="Arial" panose="020B0604020202020204" pitchFamily="34" charset="0"/>
-              <a:buChar char="•"/>
-            </a:pPr>
-            <a:r>
-              <a:rPr lang="es-ES" dirty="0"/>
-              <a:t>Buscador de vuelos con carrusel de fotografías.</a:t>
-            </a:r>
-          </a:p>
-          <a:p>
-            <a:pPr lvl="0">
-              <a:buFont typeface="Arial" panose="020B0604020202020204" pitchFamily="34" charset="0"/>
-              <a:buChar char="•"/>
-            </a:pPr>
-            <a:r>
-              <a:rPr lang="es-ES" dirty="0"/>
-              <a:t>En contacto geolocalización integrada con Google </a:t>
-            </a:r>
-            <a:r>
-              <a:rPr lang="es-ES" dirty="0" err="1"/>
-              <a:t>maps</a:t>
-            </a:r>
-            <a:endParaRPr lang="es-ES" dirty="0"/>
-          </a:p>
-          <a:p>
-            <a:endParaRPr lang="es-ES" dirty="0"/>
-          </a:p>
-        </p:txBody>
-      </p:sp>
+      </p:pic>
     </p:spTree>
     <p:extLst>
       <p:ext uri="{BB962C8B-B14F-4D97-AF65-F5344CB8AC3E}">
-        <p14:creationId xmlns:p14="http://schemas.microsoft.com/office/powerpoint/2010/main" val="1696344510"/>
+        <p14:creationId xmlns:p14="http://schemas.microsoft.com/office/powerpoint/2010/main" val="647747788"/>
       </p:ext>
     </p:extLst>
   </p:cSld>
@@ -4762,7 +6319,7 @@
       </p:grpSpPr>
       <p:sp>
         <p:nvSpPr>
-          <p:cNvPr id="190" name="Título 1"/>
+          <p:cNvPr id="122" name="Título 1"/>
           <p:cNvSpPr txBox="1">
             <a:spLocks noGrp="1"/>
           </p:cNvSpPr>
@@ -4781,9 +6338,77 @@
         </p:spPr>
         <p:txBody>
           <a:bodyPr/>
+          <a:lstStyle/>
+          <a:p>
+            <a:pPr defTabSz="886968">
+              <a:defRPr sz="3783" spc="97">
+                <a:latin typeface="Arial"/>
+                <a:ea typeface="Arial"/>
+                <a:cs typeface="Arial"/>
+                <a:sym typeface="Arial"/>
+              </a:defRPr>
+            </a:pPr>
+            <a:r>
+              <a:rPr dirty="0" err="1"/>
+              <a:t>Demostración</a:t>
+            </a:r>
+            <a:r>
+              <a:rPr dirty="0"/>
+              <a:t> </a:t>
+            </a:r>
+            <a:r>
+              <a:rPr dirty="0" err="1"/>
+              <a:t>funcional</a:t>
+            </a:r>
+            <a:r>
+              <a:rPr dirty="0"/>
+              <a:t> del </a:t>
+            </a:r>
+            <a:r>
+              <a:rPr dirty="0" err="1"/>
+              <a:t>proyecto</a:t>
+            </a:r>
+            <a:r>
+              <a:rPr dirty="0"/>
+              <a:t>.</a:t>
+            </a:r>
+            <a:br>
+              <a:rPr dirty="0"/>
+            </a:br>
+            <a:endParaRPr dirty="0"/>
+          </a:p>
+        </p:txBody>
+      </p:sp>
+      <p:sp>
+        <p:nvSpPr>
+          <p:cNvPr id="123" name="Rectángulo 4"/>
+          <p:cNvSpPr txBox="1"/>
+          <p:nvPr/>
+        </p:nvSpPr>
+        <p:spPr>
+          <a:xfrm>
+            <a:off x="5564666" y="1483916"/>
+            <a:ext cx="1015661" cy="369332"/>
+          </a:xfrm>
+          <a:prstGeom prst="rect">
+            <a:avLst/>
+          </a:prstGeom>
+          <a:ln w="12700">
+            <a:miter lim="400000"/>
+          </a:ln>
+          <a:extLst>
+            <a:ext uri="{C572A759-6A51-4108-AA02-DFA0A04FC94B}">
+              <ma14:wrappingTextBoxFlag xmlns="" xmlns:m="http://schemas.openxmlformats.org/officeDocument/2006/math" xmlns:a14="http://schemas.microsoft.com/office/drawing/2010/main" xmlns:ma14="http://schemas.microsoft.com/office/mac/drawingml/2011/main" val="1"/>
+            </a:ext>
+          </a:extLst>
+        </p:spPr>
+        <p:txBody>
+          <a:bodyPr wrap="none" lIns="45719" rIns="45719">
+            <a:spAutoFit/>
+          </a:bodyPr>
           <a:lstStyle>
             <a:lvl1pPr>
-              <a:defRPr sz="4400">
+              <a:defRPr>
                 <a:latin typeface="Arial"/>
                 <a:ea typeface="Arial"/>
                 <a:cs typeface="Arial"/>
@@ -4793,20 +6418,239 @@
           </a:lstStyle>
           <a:p>
             <a:r>
-              <a:t>Conclusiones.</a:t>
-            </a:r>
+              <a:rPr lang="es-ES" dirty="0"/>
+              <a:t>Contacto</a:t>
+            </a:r>
+            <a:endParaRPr dirty="0"/>
+          </a:p>
+        </p:txBody>
+      </p:sp>
+      <p:pic>
+        <p:nvPicPr>
+          <p:cNvPr id="3" name="Imagen 2">
+            <a:extLst>
+              <a:ext uri="{FF2B5EF4-FFF2-40B4-BE49-F238E27FC236}">
+                <a16:creationId xmlns:a16="http://schemas.microsoft.com/office/drawing/2014/main" id="{D06672E2-9361-4AA2-8D31-17CCE77C1A31}"/>
+              </a:ext>
+            </a:extLst>
+          </p:cNvPr>
+          <p:cNvPicPr>
+            <a:picLocks noChangeAspect="1"/>
+          </p:cNvPicPr>
+          <p:nvPr/>
+        </p:nvPicPr>
+        <p:blipFill>
+          <a:blip r:embed="rId2">
+            <a:extLst>
+              <a:ext uri="{28A0092B-C50C-407E-A947-70E740481C1C}">
+                <a14:useLocalDpi xmlns:a14="http://schemas.microsoft.com/office/drawing/2010/main" val="0"/>
+              </a:ext>
+            </a:extLst>
+          </a:blip>
+          <a:stretch>
+            <a:fillRect/>
+          </a:stretch>
+        </p:blipFill>
+        <p:spPr>
+          <a:xfrm>
+            <a:off x="0" y="2569590"/>
+            <a:ext cx="12192000" cy="3519827"/>
+          </a:xfrm>
+          <a:prstGeom prst="rect">
+            <a:avLst/>
+          </a:prstGeom>
+        </p:spPr>
+      </p:pic>
+    </p:spTree>
+    <p:extLst>
+      <p:ext uri="{BB962C8B-B14F-4D97-AF65-F5344CB8AC3E}">
+        <p14:creationId xmlns:p14="http://schemas.microsoft.com/office/powerpoint/2010/main" val="592811907"/>
+      </p:ext>
+    </p:extLst>
+  </p:cSld>
+  <p:clrMapOvr>
+    <a:masterClrMapping/>
+  </p:clrMapOvr>
+  <p:transition spd="med"/>
+</p:sld>
+</file>
+
+<file path=ppt/slides/slide8.xml><?xml version="1.0" encoding="utf-8"?>
+<p:sld xmlns:a="http://schemas.openxmlformats.org/drawingml/2006/main" xmlns:r="http://schemas.openxmlformats.org/officeDocument/2006/relationships" xmlns:p="http://schemas.openxmlformats.org/presentationml/2006/main">
+  <p:cSld>
+    <p:spTree>
+      <p:nvGrpSpPr>
+        <p:cNvPr id="1" name=""/>
+        <p:cNvGrpSpPr/>
+        <p:nvPr/>
+      </p:nvGrpSpPr>
+      <p:grpSpPr>
+        <a:xfrm>
+          <a:off x="0" y="0"/>
+          <a:ext cx="0" cy="0"/>
+          <a:chOff x="0" y="0"/>
+          <a:chExt cx="0" cy="0"/>
+        </a:xfrm>
+      </p:grpSpPr>
+      <p:sp>
+        <p:nvSpPr>
+          <p:cNvPr id="122" name="Título 1"/>
+          <p:cNvSpPr txBox="1">
+            <a:spLocks noGrp="1"/>
+          </p:cNvSpPr>
+          <p:nvPr>
+            <p:ph type="title"/>
+          </p:nvPr>
+        </p:nvSpPr>
+        <p:spPr>
+          <a:xfrm>
+            <a:off x="1024128" y="585216"/>
+            <a:ext cx="9720072" cy="1499617"/>
+          </a:xfrm>
+          <a:prstGeom prst="rect">
+            <a:avLst/>
+          </a:prstGeom>
+        </p:spPr>
+        <p:txBody>
+          <a:bodyPr/>
+          <a:lstStyle/>
+          <a:p>
+            <a:pPr defTabSz="886968">
+              <a:defRPr sz="3783" spc="97">
+                <a:latin typeface="Arial"/>
+                <a:ea typeface="Arial"/>
+                <a:cs typeface="Arial"/>
+                <a:sym typeface="Arial"/>
+              </a:defRPr>
+            </a:pPr>
+            <a:r>
+              <a:rPr dirty="0" err="1"/>
+              <a:t>Demostración</a:t>
+            </a:r>
+            <a:r>
+              <a:rPr dirty="0"/>
+              <a:t> </a:t>
+            </a:r>
+            <a:r>
+              <a:rPr dirty="0" err="1"/>
+              <a:t>funcional</a:t>
+            </a:r>
+            <a:r>
+              <a:rPr dirty="0"/>
+              <a:t> del </a:t>
+            </a:r>
+            <a:r>
+              <a:rPr dirty="0" err="1"/>
+              <a:t>proyecto</a:t>
+            </a:r>
+            <a:r>
+              <a:rPr dirty="0"/>
+              <a:t>.</a:t>
+            </a:r>
+            <a:br>
+              <a:rPr dirty="0"/>
+            </a:br>
+            <a:endParaRPr dirty="0"/>
           </a:p>
         </p:txBody>
       </p:sp>
       <p:sp>
         <p:nvSpPr>
-          <p:cNvPr id="191" name="CuadroTexto 4"/>
+          <p:cNvPr id="123" name="Rectángulo 4"/>
           <p:cNvSpPr txBox="1"/>
           <p:nvPr/>
         </p:nvSpPr>
         <p:spPr>
           <a:xfrm>
-            <a:off x="135903" y="2413336"/>
+            <a:off x="5564666" y="1483916"/>
+            <a:ext cx="1015661" cy="369332"/>
+          </a:xfrm>
+          <a:prstGeom prst="rect">
+            <a:avLst/>
+          </a:prstGeom>
+          <a:ln w="12700">
+            <a:miter lim="400000"/>
+          </a:ln>
+          <a:extLst>
+            <a:ext uri="{C572A759-6A51-4108-AA02-DFA0A04FC94B}">
+              <ma14:wrappingTextBoxFlag xmlns="" xmlns:m="http://schemas.openxmlformats.org/officeDocument/2006/math" xmlns:a14="http://schemas.microsoft.com/office/drawing/2010/main" xmlns:ma14="http://schemas.microsoft.com/office/mac/drawingml/2011/main" val="1"/>
+            </a:ext>
+          </a:extLst>
+        </p:spPr>
+        <p:txBody>
+          <a:bodyPr wrap="none" lIns="45719" rIns="45719">
+            <a:spAutoFit/>
+          </a:bodyPr>
+          <a:lstStyle>
+            <a:lvl1pPr>
+              <a:defRPr>
+                <a:latin typeface="Arial"/>
+                <a:ea typeface="Arial"/>
+                <a:cs typeface="Arial"/>
+                <a:sym typeface="Arial"/>
+              </a:defRPr>
+            </a:lvl1pPr>
+          </a:lstStyle>
+          <a:p>
+            <a:r>
+              <a:rPr lang="es-ES" dirty="0"/>
+              <a:t>Contacto</a:t>
+            </a:r>
+            <a:endParaRPr dirty="0"/>
+          </a:p>
+        </p:txBody>
+      </p:sp>
+      <p:pic>
+        <p:nvPicPr>
+          <p:cNvPr id="4" name="Imagen 3">
+            <a:extLst>
+              <a:ext uri="{FF2B5EF4-FFF2-40B4-BE49-F238E27FC236}">
+                <a16:creationId xmlns:a16="http://schemas.microsoft.com/office/drawing/2014/main" id="{419CB6A4-0D94-42DF-A2BD-08A9AD330532}"/>
+              </a:ext>
+            </a:extLst>
+          </p:cNvPr>
+          <p:cNvPicPr>
+            <a:picLocks noChangeAspect="1"/>
+          </p:cNvPicPr>
+          <p:nvPr/>
+        </p:nvPicPr>
+        <p:blipFill>
+          <a:blip r:embed="rId2">
+            <a:extLst>
+              <a:ext uri="{28A0092B-C50C-407E-A947-70E740481C1C}">
+                <a14:useLocalDpi xmlns:a14="http://schemas.microsoft.com/office/drawing/2010/main" val="0"/>
+              </a:ext>
+            </a:extLst>
+          </a:blip>
+          <a:stretch>
+            <a:fillRect/>
+          </a:stretch>
+        </p:blipFill>
+        <p:spPr>
+          <a:xfrm>
+            <a:off x="2560320" y="2084833"/>
+            <a:ext cx="8915400" cy="4106416"/>
+          </a:xfrm>
+          <a:prstGeom prst="rect">
+            <a:avLst/>
+          </a:prstGeom>
+        </p:spPr>
+      </p:pic>
+      <p:sp>
+        <p:nvSpPr>
+          <p:cNvPr id="7" name="CuadroTexto 5">
+            <a:extLst>
+              <a:ext uri="{FF2B5EF4-FFF2-40B4-BE49-F238E27FC236}">
+                <a16:creationId xmlns:a16="http://schemas.microsoft.com/office/drawing/2014/main" id="{5E7DFD3E-34AC-422B-8E40-12ADA37C2F1D}"/>
+              </a:ext>
+            </a:extLst>
+          </p:cNvPr>
+          <p:cNvSpPr txBox="1"/>
+          <p:nvPr/>
+        </p:nvSpPr>
+        <p:spPr>
+          <a:xfrm>
+            <a:off x="227331" y="2498332"/>
             <a:ext cx="2054089" cy="1477328"/>
           </a:xfrm>
           <a:prstGeom prst="rect">
@@ -4854,6 +6698,7 @@
             <a:pPr marL="285750" indent="-285750">
               <a:buSzPct val="100000"/>
               <a:buChar char="❑"/>
+              <a:defRPr b="1"/>
             </a:pPr>
             <a:r>
               <a:rPr dirty="0" err="1"/>
@@ -4876,7 +6721,6 @@
             <a:pPr marL="285750" indent="-285750">
               <a:buSzPct val="100000"/>
               <a:buChar char="❑"/>
-              <a:defRPr b="1"/>
             </a:pPr>
             <a:r>
               <a:rPr dirty="0" err="1"/>
@@ -4886,236 +6730,281 @@
           </a:p>
         </p:txBody>
       </p:sp>
+    </p:spTree>
+    <p:extLst>
+      <p:ext uri="{BB962C8B-B14F-4D97-AF65-F5344CB8AC3E}">
+        <p14:creationId xmlns:p14="http://schemas.microsoft.com/office/powerpoint/2010/main" val="1422319079"/>
+      </p:ext>
+    </p:extLst>
+  </p:cSld>
+  <p:clrMapOvr>
+    <a:masterClrMapping/>
+  </p:clrMapOvr>
+  <p:transition spd="med"/>
+</p:sld>
+</file>
+
+<file path=ppt/slides/slide9.xml><?xml version="1.0" encoding="utf-8"?>
+<p:sld xmlns:a="http://schemas.openxmlformats.org/drawingml/2006/main" xmlns:r="http://schemas.openxmlformats.org/officeDocument/2006/relationships" xmlns:p="http://schemas.openxmlformats.org/presentationml/2006/main">
+  <p:cSld>
+    <p:spTree>
+      <p:nvGrpSpPr>
+        <p:cNvPr id="1" name=""/>
+        <p:cNvGrpSpPr/>
+        <p:nvPr/>
+      </p:nvGrpSpPr>
+      <p:grpSpPr>
+        <a:xfrm>
+          <a:off x="0" y="0"/>
+          <a:ext cx="0" cy="0"/>
+          <a:chOff x="0" y="0"/>
+          <a:chExt cx="0" cy="0"/>
+        </a:xfrm>
+      </p:grpSpPr>
       <p:sp>
         <p:nvSpPr>
-          <p:cNvPr id="192" name="Marcador de contenido 2"/>
+          <p:cNvPr id="122" name="Título 1"/>
           <p:cNvSpPr txBox="1">
             <a:spLocks noGrp="1"/>
           </p:cNvSpPr>
           <p:nvPr>
-            <p:ph type="body" idx="1"/>
+            <p:ph type="title"/>
           </p:nvPr>
         </p:nvSpPr>
         <p:spPr>
           <a:xfrm>
-            <a:off x="2190749" y="1852613"/>
-            <a:ext cx="8945565" cy="4195763"/>
+            <a:off x="1024128" y="585216"/>
+            <a:ext cx="9720072" cy="1499617"/>
           </a:xfrm>
           <a:prstGeom prst="rect">
             <a:avLst/>
           </a:prstGeom>
         </p:spPr>
         <p:txBody>
-          <a:bodyPr>
-            <a:normAutofit/>
+          <a:bodyPr/>
+          <a:lstStyle/>
+          <a:p>
+            <a:pPr defTabSz="886968">
+              <a:defRPr sz="3783" spc="97">
+                <a:latin typeface="Arial"/>
+                <a:ea typeface="Arial"/>
+                <a:cs typeface="Arial"/>
+                <a:sym typeface="Arial"/>
+              </a:defRPr>
+            </a:pPr>
+            <a:r>
+              <a:rPr dirty="0" err="1"/>
+              <a:t>Demostración</a:t>
+            </a:r>
+            <a:r>
+              <a:rPr dirty="0"/>
+              <a:t> </a:t>
+            </a:r>
+            <a:r>
+              <a:rPr dirty="0" err="1"/>
+              <a:t>funcional</a:t>
+            </a:r>
+            <a:r>
+              <a:rPr dirty="0"/>
+              <a:t> del </a:t>
+            </a:r>
+            <a:r>
+              <a:rPr dirty="0" err="1"/>
+              <a:t>proyecto</a:t>
+            </a:r>
+            <a:r>
+              <a:rPr dirty="0"/>
+              <a:t>.</a:t>
+            </a:r>
+            <a:br>
+              <a:rPr dirty="0"/>
+            </a:br>
+            <a:endParaRPr dirty="0"/>
+          </a:p>
+        </p:txBody>
+      </p:sp>
+      <p:sp>
+        <p:nvSpPr>
+          <p:cNvPr id="123" name="Rectángulo 4"/>
+          <p:cNvSpPr txBox="1"/>
+          <p:nvPr/>
+        </p:nvSpPr>
+        <p:spPr>
+          <a:xfrm>
+            <a:off x="5564666" y="1483916"/>
+            <a:ext cx="900244" cy="369332"/>
+          </a:xfrm>
+          <a:prstGeom prst="rect">
+            <a:avLst/>
+          </a:prstGeom>
+          <a:ln w="12700">
+            <a:miter lim="400000"/>
+          </a:ln>
+          <a:extLst>
+            <a:ext uri="{C572A759-6A51-4108-AA02-DFA0A04FC94B}">
+              <ma14:wrappingTextBoxFlag xmlns="" xmlns:m="http://schemas.openxmlformats.org/officeDocument/2006/math" xmlns:a14="http://schemas.microsoft.com/office/drawing/2010/main" xmlns:ma14="http://schemas.microsoft.com/office/mac/drawingml/2011/main" val="1"/>
+            </a:ext>
+          </a:extLst>
+        </p:spPr>
+        <p:txBody>
+          <a:bodyPr wrap="none" lIns="45719" rIns="45719">
+            <a:spAutoFit/>
+          </a:bodyPr>
+          <a:lstStyle>
+            <a:lvl1pPr>
+              <a:defRPr>
+                <a:latin typeface="Arial"/>
+                <a:ea typeface="Arial"/>
+                <a:cs typeface="Arial"/>
+                <a:sym typeface="Arial"/>
+              </a:defRPr>
+            </a:lvl1pPr>
+          </a:lstStyle>
+          <a:p>
+            <a:r>
+              <a:rPr lang="es-ES" dirty="0"/>
+              <a:t>Mi perfil</a:t>
+            </a:r>
+            <a:endParaRPr dirty="0"/>
+          </a:p>
+        </p:txBody>
+      </p:sp>
+      <p:pic>
+        <p:nvPicPr>
+          <p:cNvPr id="3" name="Imagen 2">
+            <a:extLst>
+              <a:ext uri="{FF2B5EF4-FFF2-40B4-BE49-F238E27FC236}">
+                <a16:creationId xmlns:a16="http://schemas.microsoft.com/office/drawing/2014/main" id="{0AB50705-24B9-40EF-BA72-D81E290E0619}"/>
+              </a:ext>
+            </a:extLst>
+          </p:cNvPr>
+          <p:cNvPicPr>
+            <a:picLocks noChangeAspect="1"/>
+          </p:cNvPicPr>
+          <p:nvPr/>
+        </p:nvPicPr>
+        <p:blipFill>
+          <a:blip r:embed="rId2">
+            <a:extLst>
+              <a:ext uri="{28A0092B-C50C-407E-A947-70E740481C1C}">
+                <a14:useLocalDpi xmlns:a14="http://schemas.microsoft.com/office/drawing/2010/main" val="0"/>
+              </a:ext>
+            </a:extLst>
+          </a:blip>
+          <a:stretch>
+            <a:fillRect/>
+          </a:stretch>
+        </p:blipFill>
+        <p:spPr>
+          <a:xfrm>
+            <a:off x="2663409" y="2248852"/>
+            <a:ext cx="7934325" cy="3457575"/>
+          </a:xfrm>
+          <a:prstGeom prst="rect">
+            <a:avLst/>
+          </a:prstGeom>
+        </p:spPr>
+      </p:pic>
+      <p:sp>
+        <p:nvSpPr>
+          <p:cNvPr id="9" name="CuadroTexto 5">
+            <a:extLst>
+              <a:ext uri="{FF2B5EF4-FFF2-40B4-BE49-F238E27FC236}">
+                <a16:creationId xmlns:a16="http://schemas.microsoft.com/office/drawing/2014/main" id="{32E4E81B-0198-4264-983A-EFF3D96CCFE4}"/>
+              </a:ext>
+            </a:extLst>
+          </p:cNvPr>
+          <p:cNvSpPr txBox="1"/>
+          <p:nvPr/>
+        </p:nvSpPr>
+        <p:spPr>
+          <a:xfrm>
+            <a:off x="227331" y="2498332"/>
+            <a:ext cx="2054089" cy="1477328"/>
+          </a:xfrm>
+          <a:prstGeom prst="rect">
+            <a:avLst/>
+          </a:prstGeom>
+          <a:ln>
+            <a:solidFill>
+              <a:srgbClr val="2E2B21"/>
+            </a:solidFill>
+          </a:ln>
+          <a:extLst>
+            <a:ext uri="{C572A759-6A51-4108-AA02-DFA0A04FC94B}">
+              <ma14:wrappingTextBoxFlag xmlns="" xmlns:m="http://schemas.openxmlformats.org/officeDocument/2006/math" xmlns:a14="http://schemas.microsoft.com/office/drawing/2010/main" xmlns:ma14="http://schemas.microsoft.com/office/mac/drawingml/2011/main" val="1"/>
+            </a:ext>
+          </a:extLst>
+        </p:spPr>
+        <p:txBody>
+          <a:bodyPr lIns="45719" rIns="45719">
+            <a:spAutoFit/>
           </a:bodyPr>
           <a:lstStyle/>
           <a:p>
-            <a:pPr>
-              <a:buFont typeface="Arial"/>
-              <a:buChar char="•"/>
-            </a:pPr>
-            <a:r>
-              <a:rPr dirty="0"/>
-              <a:t> </a:t>
-            </a:r>
+            <a:pPr marL="285750" indent="-285750">
+              <a:buSzPct val="100000"/>
+              <a:buChar char="❑"/>
+            </a:pPr>
+            <a:r>
+              <a:rPr lang="es-ES" dirty="0"/>
+              <a:t>UML</a:t>
+            </a:r>
+            <a:endParaRPr dirty="0"/>
+          </a:p>
+          <a:p>
+            <a:pPr marL="285750" indent="-285750">
+              <a:buSzPct val="100000"/>
+              <a:buChar char="❑"/>
+            </a:pPr>
             <a:r>
               <a:rPr dirty="0" err="1"/>
-              <a:t>Fácil</a:t>
-            </a:r>
-            <a:r>
-              <a:rPr dirty="0"/>
-              <a:t> </a:t>
-            </a:r>
+              <a:t>Funcionalidades</a:t>
+            </a:r>
+            <a:endParaRPr dirty="0"/>
+          </a:p>
+          <a:p>
+            <a:pPr marL="285750" indent="-285750">
+              <a:buSzPct val="100000"/>
+              <a:buChar char="❑"/>
+              <a:defRPr b="1"/>
+            </a:pPr>
             <a:r>
               <a:rPr dirty="0" err="1"/>
-              <a:t>manejo</a:t>
-            </a:r>
-            <a:r>
-              <a:rPr dirty="0"/>
-              <a:t> de la </a:t>
-            </a:r>
+              <a:t>Demostración</a:t>
+            </a:r>
+            <a:endParaRPr dirty="0"/>
+          </a:p>
+          <a:p>
+            <a:pPr marL="285750" indent="-285750">
+              <a:buSzPct val="100000"/>
+              <a:buChar char="❑"/>
+            </a:pPr>
             <a:r>
               <a:rPr dirty="0" err="1"/>
-              <a:t>plataforma</a:t>
-            </a:r>
-            <a:r>
-              <a:rPr dirty="0"/>
-              <a:t> </a:t>
-            </a:r>
+              <a:t>Aspectos</a:t>
+            </a:r>
+            <a:endParaRPr dirty="0"/>
+          </a:p>
+          <a:p>
+            <a:pPr marL="285750" indent="-285750">
+              <a:buSzPct val="100000"/>
+              <a:buChar char="❑"/>
+            </a:pPr>
             <a:r>
               <a:rPr dirty="0" err="1"/>
-              <a:t>escogida</a:t>
-            </a:r>
-            <a:r>
-              <a:rPr dirty="0"/>
-              <a:t> (Laravel).</a:t>
-            </a:r>
-          </a:p>
-          <a:p>
-            <a:pPr>
-              <a:buFont typeface="Arial"/>
-              <a:buChar char="•"/>
-            </a:pPr>
-            <a:r>
-              <a:rPr dirty="0"/>
-              <a:t> </a:t>
-            </a:r>
-            <a:r>
-              <a:rPr dirty="0" err="1"/>
-              <a:t>Integración</a:t>
-            </a:r>
-            <a:r>
-              <a:rPr dirty="0"/>
-              <a:t> entre Laravel, Visual Code y </a:t>
-            </a:r>
-            <a:r>
-              <a:rPr dirty="0" err="1"/>
-              <a:t>Github</a:t>
-            </a:r>
-            <a:r>
-              <a:rPr dirty="0"/>
-              <a:t>.</a:t>
-            </a:r>
-          </a:p>
-          <a:p>
-            <a:pPr>
-              <a:buFont typeface="Arial"/>
-              <a:buChar char="•"/>
-            </a:pPr>
-            <a:r>
-              <a:rPr dirty="0"/>
-              <a:t> Buena </a:t>
-            </a:r>
-            <a:r>
-              <a:rPr dirty="0" err="1"/>
-              <a:t>organización</a:t>
-            </a:r>
-            <a:r>
-              <a:rPr dirty="0"/>
-              <a:t> de </a:t>
-            </a:r>
-            <a:r>
-              <a:rPr dirty="0" err="1"/>
-              <a:t>equipo</a:t>
-            </a:r>
-            <a:r>
-              <a:rPr dirty="0"/>
-              <a:t>.</a:t>
-            </a:r>
-          </a:p>
-          <a:p>
-            <a:pPr>
-              <a:buFont typeface="Arial"/>
-              <a:buChar char="•"/>
-            </a:pPr>
+              <a:t>Conclusiones</a:t>
+            </a:r>
             <a:endParaRPr dirty="0"/>
-          </a:p>
-          <a:p>
-            <a:pPr>
-              <a:buFont typeface="Arial"/>
-              <a:buChar char="•"/>
-            </a:pPr>
-            <a:r>
-              <a:rPr dirty="0"/>
-              <a:t> </a:t>
-            </a:r>
-            <a:r>
-              <a:rPr b="1" dirty="0" err="1"/>
-              <a:t>Problemas</a:t>
-            </a:r>
-            <a:r>
-              <a:rPr dirty="0"/>
-              <a:t>:</a:t>
-            </a:r>
-          </a:p>
-          <a:p>
-            <a:pPr marL="219455" lvl="1" indent="-91439">
-              <a:buFont typeface="Arial"/>
-              <a:buChar char="•"/>
-            </a:pPr>
-            <a:r>
-              <a:rPr dirty="0"/>
-              <a:t> </a:t>
-            </a:r>
-            <a:r>
-              <a:rPr lang="es-ES" dirty="0"/>
-              <a:t>Consultas entre diferentes tablas </a:t>
-            </a:r>
-            <a:endParaRPr dirty="0"/>
-          </a:p>
-          <a:p>
-            <a:pPr marL="219455" lvl="1" indent="-91439">
-              <a:buFont typeface="Arial"/>
-              <a:buChar char="•"/>
-            </a:pPr>
-            <a:endParaRPr dirty="0"/>
-          </a:p>
-          <a:p>
-            <a:pPr>
-              <a:buFont typeface="Arial"/>
-              <a:buChar char="•"/>
-              <a:defRPr b="1"/>
-            </a:pPr>
-            <a:r>
-              <a:rPr dirty="0"/>
-              <a:t> </a:t>
-            </a:r>
-            <a:r>
-              <a:rPr dirty="0" err="1"/>
-              <a:t>Posibles</a:t>
-            </a:r>
-            <a:r>
-              <a:rPr dirty="0"/>
-              <a:t> </a:t>
-            </a:r>
-            <a:r>
-              <a:rPr dirty="0" err="1"/>
-              <a:t>mejoras</a:t>
-            </a:r>
-            <a:r>
-              <a:rPr dirty="0"/>
-              <a:t> :</a:t>
-            </a:r>
-          </a:p>
-          <a:p>
-            <a:pPr marL="219455" lvl="1" indent="-91439">
-              <a:buFont typeface="Arial"/>
-              <a:buChar char="•"/>
-            </a:pPr>
-            <a:r>
-              <a:rPr dirty="0"/>
-              <a:t> </a:t>
-            </a:r>
-            <a:r>
-              <a:rPr dirty="0" err="1"/>
-              <a:t>Mejorar</a:t>
-            </a:r>
-            <a:r>
-              <a:rPr dirty="0"/>
-              <a:t> </a:t>
-            </a:r>
-            <a:r>
-              <a:rPr dirty="0" err="1"/>
-              <a:t>estilo</a:t>
-            </a:r>
-            <a:r>
-              <a:rPr dirty="0"/>
-              <a:t> de la </a:t>
-            </a:r>
-            <a:r>
-              <a:rPr dirty="0" err="1"/>
-              <a:t>interfaz</a:t>
-            </a:r>
-            <a:r>
-              <a:rPr dirty="0"/>
-              <a:t>.</a:t>
-            </a:r>
-            <a:endParaRPr lang="es-ES" dirty="0"/>
           </a:p>
         </p:txBody>
       </p:sp>
     </p:spTree>
+    <p:extLst>
+      <p:ext uri="{BB962C8B-B14F-4D97-AF65-F5344CB8AC3E}">
+        <p14:creationId xmlns:p14="http://schemas.microsoft.com/office/powerpoint/2010/main" val="907569077"/>
+      </p:ext>
+    </p:extLst>
   </p:cSld>
   <p:clrMapOvr>
     <a:masterClrMapping/>

</xml_diff>

<commit_message>
Update ppt y añadir columna precio
</commit_message>
<xml_diff>
--- a/AIRDSS.pptx
+++ b/AIRDSS.pptx
@@ -5,7 +5,7 @@
     <p:sldMasterId id="2147483648" r:id="rId1"/>
   </p:sldMasterIdLst>
   <p:notesMasterIdLst>
-    <p:notesMasterId r:id="rId18"/>
+    <p:notesMasterId r:id="rId23"/>
   </p:notesMasterIdLst>
   <p:sldIdLst>
     <p:sldId id="256" r:id="rId2"/>
@@ -14,16 +14,21 @@
     <p:sldId id="260" r:id="rId5"/>
     <p:sldId id="261" r:id="rId6"/>
     <p:sldId id="279" r:id="rId7"/>
-    <p:sldId id="280" r:id="rId8"/>
-    <p:sldId id="281" r:id="rId9"/>
-    <p:sldId id="282" r:id="rId10"/>
-    <p:sldId id="283" r:id="rId11"/>
-    <p:sldId id="277" r:id="rId12"/>
-    <p:sldId id="284" r:id="rId13"/>
-    <p:sldId id="285" r:id="rId14"/>
-    <p:sldId id="286" r:id="rId15"/>
-    <p:sldId id="287" r:id="rId16"/>
-    <p:sldId id="276" r:id="rId17"/>
+    <p:sldId id="288" r:id="rId8"/>
+    <p:sldId id="290" r:id="rId9"/>
+    <p:sldId id="293" r:id="rId10"/>
+    <p:sldId id="291" r:id="rId11"/>
+    <p:sldId id="292" r:id="rId12"/>
+    <p:sldId id="280" r:id="rId13"/>
+    <p:sldId id="281" r:id="rId14"/>
+    <p:sldId id="282" r:id="rId15"/>
+    <p:sldId id="283" r:id="rId16"/>
+    <p:sldId id="277" r:id="rId17"/>
+    <p:sldId id="284" r:id="rId18"/>
+    <p:sldId id="285" r:id="rId19"/>
+    <p:sldId id="286" r:id="rId20"/>
+    <p:sldId id="287" r:id="rId21"/>
+    <p:sldId id="276" r:id="rId22"/>
   </p:sldIdLst>
   <p:sldSz cx="12192000" cy="6858000"/>
   <p:notesSz cx="6858000" cy="9144000"/>
@@ -3677,6 +3682,1416 @@
         </p:nvSpPr>
         <p:spPr>
           <a:xfrm>
+            <a:off x="4304037" y="1715501"/>
+            <a:ext cx="3978010" cy="369332"/>
+          </a:xfrm>
+          <a:prstGeom prst="rect">
+            <a:avLst/>
+          </a:prstGeom>
+          <a:ln w="12700">
+            <a:miter lim="400000"/>
+          </a:ln>
+          <a:extLst>
+            <a:ext uri="{C572A759-6A51-4108-AA02-DFA0A04FC94B}">
+              <ma14:wrappingTextBoxFlag xmlns:ma14="http://schemas.microsoft.com/office/mac/drawingml/2011/main" xmlns:a14="http://schemas.microsoft.com/office/drawing/2010/main" xmlns:m="http://schemas.openxmlformats.org/officeDocument/2006/math" xmlns="" val="1"/>
+            </a:ext>
+          </a:extLst>
+        </p:spPr>
+        <p:txBody>
+          <a:bodyPr wrap="none" lIns="45719" rIns="45719">
+            <a:spAutoFit/>
+          </a:bodyPr>
+          <a:lstStyle>
+            <a:lvl1pPr>
+              <a:defRPr>
+                <a:latin typeface="Arial"/>
+                <a:ea typeface="Arial"/>
+                <a:cs typeface="Arial"/>
+                <a:sym typeface="Arial"/>
+              </a:defRPr>
+            </a:lvl1pPr>
+          </a:lstStyle>
+          <a:p>
+            <a:r>
+              <a:rPr lang="es-ES" dirty="0"/>
+              <a:t>Lógica de capa de servicio de compra</a:t>
+            </a:r>
+            <a:endParaRPr dirty="0"/>
+          </a:p>
+        </p:txBody>
+      </p:sp>
+      <p:sp>
+        <p:nvSpPr>
+          <p:cNvPr id="5" name="CuadroTexto 4">
+            <a:extLst>
+              <a:ext uri="{FF2B5EF4-FFF2-40B4-BE49-F238E27FC236}">
+                <a16:creationId xmlns:a16="http://schemas.microsoft.com/office/drawing/2014/main" id="{7EE5A81F-5F5A-4E7F-955D-02F1E31BC485}"/>
+              </a:ext>
+            </a:extLst>
+          </p:cNvPr>
+          <p:cNvSpPr txBox="1"/>
+          <p:nvPr/>
+        </p:nvSpPr>
+        <p:spPr>
+          <a:xfrm>
+            <a:off x="1278383" y="2352583"/>
+            <a:ext cx="9357065" cy="2862320"/>
+          </a:xfrm>
+          <a:prstGeom prst="rect">
+            <a:avLst/>
+          </a:prstGeom>
+          <a:noFill/>
+          <a:ln w="12700" cap="flat">
+            <a:noFill/>
+            <a:miter lim="400000"/>
+          </a:ln>
+          <a:effectLst/>
+          <a:sp3d/>
+        </p:spPr>
+        <p:style>
+          <a:lnRef idx="0">
+            <a:scrgbClr r="0" g="0" b="0"/>
+          </a:lnRef>
+          <a:fillRef idx="0">
+            <a:scrgbClr r="0" g="0" b="0"/>
+          </a:fillRef>
+          <a:effectRef idx="0">
+            <a:scrgbClr r="0" g="0" b="0"/>
+          </a:effectRef>
+          <a:fontRef idx="none"/>
+        </p:style>
+        <p:txBody>
+          <a:bodyPr rot="0" spcFirstLastPara="1" vertOverflow="overflow" horzOverflow="overflow" vert="horz" wrap="square" lIns="45719" tIns="45719" rIns="45719" bIns="45719" numCol="1" spcCol="38100" rtlCol="0" anchor="t">
+            <a:spAutoFit/>
+          </a:bodyPr>
+          <a:lstStyle/>
+          <a:p>
+            <a:pPr marR="0" algn="l" defTabSz="457200" rtl="0" fontAlgn="auto" latinLnBrk="0" hangingPunct="0">
+              <a:lnSpc>
+                <a:spcPct val="100000"/>
+              </a:lnSpc>
+              <a:spcBef>
+                <a:spcPts val="0"/>
+              </a:spcBef>
+              <a:spcAft>
+                <a:spcPts val="0"/>
+              </a:spcAft>
+              <a:buClrTx/>
+              <a:buSzTx/>
+              <a:tabLst/>
+            </a:pPr>
+            <a:r>
+              <a:rPr kumimoji="0" lang="es-ES" sz="1800" b="0" i="0" u="none" strike="noStrike" cap="none" spc="0" normalizeH="0" baseline="0" dirty="0">
+                <a:ln>
+                  <a:noFill/>
+                </a:ln>
+                <a:solidFill>
+                  <a:srgbClr val="2E2B21"/>
+                </a:solidFill>
+                <a:effectLst/>
+                <a:uFillTx/>
+                <a:latin typeface="Tw Cen MT"/>
+                <a:ea typeface="Tw Cen MT"/>
+                <a:cs typeface="Tw Cen MT"/>
+                <a:sym typeface="Tw Cen MT"/>
+              </a:rPr>
+              <a:t>Llamada a capa de servicios con </a:t>
+            </a:r>
+            <a:r>
+              <a:rPr lang="es-ES" dirty="0"/>
+              <a:t>transacciones </a:t>
+            </a:r>
+            <a:r>
+              <a:rPr kumimoji="0" lang="es-ES" sz="1800" b="0" i="0" u="none" strike="noStrike" cap="none" spc="0" normalizeH="0" baseline="0" dirty="0">
+                <a:ln>
+                  <a:noFill/>
+                </a:ln>
+                <a:solidFill>
+                  <a:srgbClr val="2E2B21"/>
+                </a:solidFill>
+                <a:effectLst/>
+                <a:uFillTx/>
+                <a:latin typeface="Tw Cen MT"/>
+                <a:ea typeface="Tw Cen MT"/>
+                <a:cs typeface="Tw Cen MT"/>
+                <a:sym typeface="Tw Cen MT"/>
+              </a:rPr>
+              <a:t>para efectuar compra:</a:t>
+            </a:r>
+          </a:p>
+          <a:p>
+            <a:pPr marL="285750" marR="0" indent="-285750" algn="l" defTabSz="457200" rtl="0" fontAlgn="auto" latinLnBrk="0" hangingPunct="0">
+              <a:lnSpc>
+                <a:spcPct val="100000"/>
+              </a:lnSpc>
+              <a:spcBef>
+                <a:spcPts val="0"/>
+              </a:spcBef>
+              <a:spcAft>
+                <a:spcPts val="0"/>
+              </a:spcAft>
+              <a:buClrTx/>
+              <a:buSzTx/>
+              <a:buFont typeface="Arial" panose="020B0604020202020204" pitchFamily="34" charset="0"/>
+              <a:buChar char="•"/>
+              <a:tabLst/>
+            </a:pPr>
+            <a:r>
+              <a:rPr lang="es-ES" dirty="0"/>
+              <a:t>Se pasa id del vuelo, del cliente, si tiene paquete y el asiento.</a:t>
+            </a:r>
+          </a:p>
+          <a:p>
+            <a:pPr marL="285750" marR="0" indent="-285750" algn="l" defTabSz="457200" rtl="0" fontAlgn="auto" latinLnBrk="0" hangingPunct="0">
+              <a:lnSpc>
+                <a:spcPct val="100000"/>
+              </a:lnSpc>
+              <a:spcBef>
+                <a:spcPts val="0"/>
+              </a:spcBef>
+              <a:spcAft>
+                <a:spcPts val="0"/>
+              </a:spcAft>
+              <a:buClrTx/>
+              <a:buSzTx/>
+              <a:buFont typeface="Arial" panose="020B0604020202020204" pitchFamily="34" charset="0"/>
+              <a:buChar char="•"/>
+              <a:tabLst/>
+            </a:pPr>
+            <a:r>
+              <a:rPr kumimoji="0" lang="es-ES" sz="1800" b="0" i="0" u="none" strike="noStrike" cap="none" spc="0" normalizeH="0" baseline="0" dirty="0">
+                <a:ln>
+                  <a:noFill/>
+                </a:ln>
+                <a:solidFill>
+                  <a:srgbClr val="2E2B21"/>
+                </a:solidFill>
+                <a:effectLst/>
+                <a:uFillTx/>
+                <a:latin typeface="Tw Cen MT"/>
+                <a:ea typeface="Tw Cen MT"/>
+                <a:cs typeface="Tw Cen MT"/>
+                <a:sym typeface="Tw Cen MT"/>
+              </a:rPr>
+              <a:t>Comprobación de si los datos son correctos: vuelo y cliente existe, asiento no ocupado.</a:t>
+            </a:r>
+          </a:p>
+          <a:p>
+            <a:pPr marL="285750" marR="0" indent="-285750" algn="l" defTabSz="457200" rtl="0" fontAlgn="auto" latinLnBrk="0" hangingPunct="0">
+              <a:lnSpc>
+                <a:spcPct val="100000"/>
+              </a:lnSpc>
+              <a:spcBef>
+                <a:spcPts val="0"/>
+              </a:spcBef>
+              <a:spcAft>
+                <a:spcPts val="0"/>
+              </a:spcAft>
+              <a:buClrTx/>
+              <a:buSzTx/>
+              <a:buFont typeface="Arial" panose="020B0604020202020204" pitchFamily="34" charset="0"/>
+              <a:buChar char="•"/>
+              <a:tabLst/>
+            </a:pPr>
+            <a:r>
+              <a:rPr lang="es-ES" dirty="0"/>
+              <a:t>Se simula la compra.</a:t>
+            </a:r>
+          </a:p>
+          <a:p>
+            <a:pPr marL="285750" marR="0" indent="-285750" algn="l" defTabSz="457200" rtl="0" fontAlgn="auto" latinLnBrk="0" hangingPunct="0">
+              <a:lnSpc>
+                <a:spcPct val="100000"/>
+              </a:lnSpc>
+              <a:spcBef>
+                <a:spcPts val="0"/>
+              </a:spcBef>
+              <a:spcAft>
+                <a:spcPts val="0"/>
+              </a:spcAft>
+              <a:buClrTx/>
+              <a:buSzTx/>
+              <a:buFont typeface="Arial" panose="020B0604020202020204" pitchFamily="34" charset="0"/>
+              <a:buChar char="•"/>
+              <a:tabLst/>
+            </a:pPr>
+            <a:r>
+              <a:rPr kumimoji="0" lang="es-ES" sz="1800" b="0" i="0" u="none" strike="noStrike" cap="none" spc="0" normalizeH="0" baseline="0" dirty="0">
+                <a:ln>
+                  <a:noFill/>
+                </a:ln>
+                <a:solidFill>
+                  <a:srgbClr val="2E2B21"/>
+                </a:solidFill>
+                <a:effectLst/>
+                <a:uFillTx/>
+                <a:latin typeface="Tw Cen MT"/>
+                <a:ea typeface="Tw Cen MT"/>
+                <a:cs typeface="Tw Cen MT"/>
+                <a:sym typeface="Tw Cen MT"/>
+              </a:rPr>
+              <a:t>Inserción de los nuevos datos: </a:t>
+            </a:r>
+            <a:r>
+              <a:rPr lang="es-ES" dirty="0"/>
+              <a:t>se crea ticket y un </a:t>
+            </a:r>
+            <a:r>
+              <a:rPr lang="es-ES" dirty="0" err="1"/>
+              <a:t>boardingPass</a:t>
+            </a:r>
+            <a:r>
+              <a:rPr lang="es-ES" dirty="0"/>
+              <a:t>, actualización de cliente y </a:t>
+            </a:r>
+            <a:r>
+              <a:rPr lang="es-ES" dirty="0" err="1"/>
+              <a:t>flight</a:t>
+            </a:r>
+            <a:r>
+              <a:rPr lang="es-ES" dirty="0"/>
+              <a:t>.</a:t>
+            </a:r>
+          </a:p>
+          <a:p>
+            <a:pPr marL="285750" marR="0" indent="-285750" algn="l" defTabSz="457200" rtl="0" fontAlgn="auto" latinLnBrk="0" hangingPunct="0">
+              <a:lnSpc>
+                <a:spcPct val="100000"/>
+              </a:lnSpc>
+              <a:spcBef>
+                <a:spcPts val="0"/>
+              </a:spcBef>
+              <a:spcAft>
+                <a:spcPts val="0"/>
+              </a:spcAft>
+              <a:buClrTx/>
+              <a:buSzTx/>
+              <a:buFont typeface="Arial" panose="020B0604020202020204" pitchFamily="34" charset="0"/>
+              <a:buChar char="•"/>
+              <a:tabLst/>
+            </a:pPr>
+            <a:r>
+              <a:rPr lang="es-ES" dirty="0"/>
+              <a:t>Se devuelve el ticket</a:t>
+            </a:r>
+          </a:p>
+          <a:p>
+            <a:pPr marR="0" algn="l" defTabSz="457200" rtl="0" fontAlgn="auto" latinLnBrk="0" hangingPunct="0">
+              <a:lnSpc>
+                <a:spcPct val="100000"/>
+              </a:lnSpc>
+              <a:spcBef>
+                <a:spcPts val="0"/>
+              </a:spcBef>
+              <a:spcAft>
+                <a:spcPts val="0"/>
+              </a:spcAft>
+              <a:buClrTx/>
+              <a:buSzTx/>
+              <a:tabLst/>
+            </a:pPr>
+            <a:endParaRPr kumimoji="0" lang="es-ES" sz="1800" b="0" i="0" u="none" strike="noStrike" cap="none" spc="0" normalizeH="0" baseline="0" dirty="0">
+              <a:ln>
+                <a:noFill/>
+              </a:ln>
+              <a:solidFill>
+                <a:srgbClr val="2E2B21"/>
+              </a:solidFill>
+              <a:effectLst/>
+              <a:uFillTx/>
+              <a:latin typeface="Tw Cen MT"/>
+              <a:ea typeface="Tw Cen MT"/>
+              <a:cs typeface="Tw Cen MT"/>
+              <a:sym typeface="Tw Cen MT"/>
+            </a:endParaRPr>
+          </a:p>
+          <a:p>
+            <a:pPr marR="0" algn="l" defTabSz="457200" rtl="0" fontAlgn="auto" latinLnBrk="0" hangingPunct="0">
+              <a:lnSpc>
+                <a:spcPct val="100000"/>
+              </a:lnSpc>
+              <a:spcBef>
+                <a:spcPts val="0"/>
+              </a:spcBef>
+              <a:spcAft>
+                <a:spcPts val="0"/>
+              </a:spcAft>
+              <a:buClrTx/>
+              <a:buSzTx/>
+              <a:tabLst/>
+            </a:pPr>
+            <a:r>
+              <a:rPr lang="es-ES" dirty="0"/>
+              <a:t>Si falla alguna cosa:</a:t>
+            </a:r>
+          </a:p>
+          <a:p>
+            <a:pPr marL="285750" marR="0" indent="-285750" algn="l" defTabSz="457200" rtl="0" fontAlgn="auto" latinLnBrk="0" hangingPunct="0">
+              <a:lnSpc>
+                <a:spcPct val="100000"/>
+              </a:lnSpc>
+              <a:spcBef>
+                <a:spcPts val="0"/>
+              </a:spcBef>
+              <a:spcAft>
+                <a:spcPts val="0"/>
+              </a:spcAft>
+              <a:buClrTx/>
+              <a:buSzTx/>
+              <a:buFont typeface="Arial" panose="020B0604020202020204" pitchFamily="34" charset="0"/>
+              <a:buChar char="•"/>
+              <a:tabLst/>
+            </a:pPr>
+            <a:r>
+              <a:rPr lang="es-ES" dirty="0"/>
+              <a:t>Se realiza un </a:t>
+            </a:r>
+            <a:r>
+              <a:rPr lang="es-ES" dirty="0" err="1"/>
+              <a:t>rollBack</a:t>
+            </a:r>
+            <a:r>
+              <a:rPr lang="es-ES" dirty="0"/>
+              <a:t> de las transacciones y se devuelve ticket nulo.</a:t>
+            </a:r>
+            <a:endParaRPr kumimoji="0" lang="es-ES" sz="1800" b="0" i="0" u="none" strike="noStrike" cap="none" spc="0" normalizeH="0" baseline="0" dirty="0">
+              <a:ln>
+                <a:noFill/>
+              </a:ln>
+              <a:solidFill>
+                <a:srgbClr val="2E2B21"/>
+              </a:solidFill>
+              <a:effectLst/>
+              <a:uFillTx/>
+              <a:latin typeface="Tw Cen MT"/>
+              <a:ea typeface="Tw Cen MT"/>
+              <a:cs typeface="Tw Cen MT"/>
+              <a:sym typeface="Tw Cen MT"/>
+            </a:endParaRPr>
+          </a:p>
+          <a:p>
+            <a:pPr marL="285750" marR="0" indent="-285750" algn="l" defTabSz="457200" rtl="0" fontAlgn="auto" latinLnBrk="0" hangingPunct="0">
+              <a:lnSpc>
+                <a:spcPct val="100000"/>
+              </a:lnSpc>
+              <a:spcBef>
+                <a:spcPts val="0"/>
+              </a:spcBef>
+              <a:spcAft>
+                <a:spcPts val="0"/>
+              </a:spcAft>
+              <a:buClrTx/>
+              <a:buSzTx/>
+              <a:buFont typeface="Arial" panose="020B0604020202020204" pitchFamily="34" charset="0"/>
+              <a:buChar char="•"/>
+              <a:tabLst/>
+            </a:pPr>
+            <a:endParaRPr kumimoji="0" lang="es-ES" sz="1800" b="0" i="0" u="none" strike="noStrike" cap="none" spc="0" normalizeH="0" baseline="0" dirty="0">
+              <a:ln>
+                <a:noFill/>
+              </a:ln>
+              <a:solidFill>
+                <a:srgbClr val="2E2B21"/>
+              </a:solidFill>
+              <a:effectLst/>
+              <a:uFillTx/>
+              <a:latin typeface="Tw Cen MT"/>
+              <a:ea typeface="Tw Cen MT"/>
+              <a:cs typeface="Tw Cen MT"/>
+              <a:sym typeface="Tw Cen MT"/>
+            </a:endParaRPr>
+          </a:p>
+        </p:txBody>
+      </p:sp>
+    </p:spTree>
+    <p:extLst>
+      <p:ext uri="{BB962C8B-B14F-4D97-AF65-F5344CB8AC3E}">
+        <p14:creationId xmlns:p14="http://schemas.microsoft.com/office/powerpoint/2010/main" val="668929490"/>
+      </p:ext>
+    </p:extLst>
+  </p:cSld>
+  <p:clrMapOvr>
+    <a:masterClrMapping/>
+  </p:clrMapOvr>
+  <p:transition spd="med"/>
+</p:sld>
+</file>
+
+<file path=ppt/slides/slide11.xml><?xml version="1.0" encoding="utf-8"?>
+<p:sld xmlns:a="http://schemas.openxmlformats.org/drawingml/2006/main" xmlns:r="http://schemas.openxmlformats.org/officeDocument/2006/relationships" xmlns:p="http://schemas.openxmlformats.org/presentationml/2006/main">
+  <p:cSld>
+    <p:spTree>
+      <p:nvGrpSpPr>
+        <p:cNvPr id="1" name=""/>
+        <p:cNvGrpSpPr/>
+        <p:nvPr/>
+      </p:nvGrpSpPr>
+      <p:grpSpPr>
+        <a:xfrm>
+          <a:off x="0" y="0"/>
+          <a:ext cx="0" cy="0"/>
+          <a:chOff x="0" y="0"/>
+          <a:chExt cx="0" cy="0"/>
+        </a:xfrm>
+      </p:grpSpPr>
+      <p:sp>
+        <p:nvSpPr>
+          <p:cNvPr id="122" name="Título 1"/>
+          <p:cNvSpPr txBox="1">
+            <a:spLocks noGrp="1"/>
+          </p:cNvSpPr>
+          <p:nvPr>
+            <p:ph type="title"/>
+          </p:nvPr>
+        </p:nvSpPr>
+        <p:spPr>
+          <a:xfrm>
+            <a:off x="1024128" y="585216"/>
+            <a:ext cx="9720072" cy="1499617"/>
+          </a:xfrm>
+          <a:prstGeom prst="rect">
+            <a:avLst/>
+          </a:prstGeom>
+        </p:spPr>
+        <p:txBody>
+          <a:bodyPr/>
+          <a:lstStyle/>
+          <a:p>
+            <a:pPr defTabSz="886968">
+              <a:defRPr sz="3783" spc="97">
+                <a:latin typeface="Arial"/>
+                <a:ea typeface="Arial"/>
+                <a:cs typeface="Arial"/>
+                <a:sym typeface="Arial"/>
+              </a:defRPr>
+            </a:pPr>
+            <a:r>
+              <a:rPr dirty="0" err="1"/>
+              <a:t>Demostración</a:t>
+            </a:r>
+            <a:r>
+              <a:rPr dirty="0"/>
+              <a:t> </a:t>
+            </a:r>
+            <a:r>
+              <a:rPr dirty="0" err="1"/>
+              <a:t>funcional</a:t>
+            </a:r>
+            <a:r>
+              <a:rPr dirty="0"/>
+              <a:t> del </a:t>
+            </a:r>
+            <a:r>
+              <a:rPr dirty="0" err="1"/>
+              <a:t>proyecto</a:t>
+            </a:r>
+            <a:r>
+              <a:rPr dirty="0"/>
+              <a:t>.</a:t>
+            </a:r>
+            <a:br>
+              <a:rPr dirty="0"/>
+            </a:br>
+            <a:endParaRPr dirty="0"/>
+          </a:p>
+        </p:txBody>
+      </p:sp>
+      <p:sp>
+        <p:nvSpPr>
+          <p:cNvPr id="123" name="Rectángulo 4"/>
+          <p:cNvSpPr txBox="1"/>
+          <p:nvPr/>
+        </p:nvSpPr>
+        <p:spPr>
+          <a:xfrm>
+            <a:off x="5113681" y="1900167"/>
+            <a:ext cx="1964638" cy="369332"/>
+          </a:xfrm>
+          <a:prstGeom prst="rect">
+            <a:avLst/>
+          </a:prstGeom>
+          <a:ln w="12700">
+            <a:miter lim="400000"/>
+          </a:ln>
+          <a:extLst>
+            <a:ext uri="{C572A759-6A51-4108-AA02-DFA0A04FC94B}">
+              <ma14:wrappingTextBoxFlag xmlns:ma14="http://schemas.microsoft.com/office/mac/drawingml/2011/main" xmlns:a14="http://schemas.microsoft.com/office/drawing/2010/main" xmlns:m="http://schemas.openxmlformats.org/officeDocument/2006/math" xmlns="" val="1"/>
+            </a:ext>
+          </a:extLst>
+        </p:spPr>
+        <p:txBody>
+          <a:bodyPr wrap="none" lIns="45719" rIns="45719">
+            <a:spAutoFit/>
+          </a:bodyPr>
+          <a:lstStyle>
+            <a:lvl1pPr>
+              <a:defRPr>
+                <a:latin typeface="Arial"/>
+                <a:ea typeface="Arial"/>
+                <a:cs typeface="Arial"/>
+                <a:sym typeface="Arial"/>
+              </a:defRPr>
+            </a:lvl1pPr>
+          </a:lstStyle>
+          <a:p>
+            <a:r>
+              <a:rPr lang="es-ES" dirty="0"/>
+              <a:t>Resultado compra</a:t>
+            </a:r>
+            <a:endParaRPr dirty="0"/>
+          </a:p>
+        </p:txBody>
+      </p:sp>
+      <p:pic>
+        <p:nvPicPr>
+          <p:cNvPr id="3" name="Imagen 2">
+            <a:extLst>
+              <a:ext uri="{FF2B5EF4-FFF2-40B4-BE49-F238E27FC236}">
+                <a16:creationId xmlns:a16="http://schemas.microsoft.com/office/drawing/2014/main" id="{7E46925E-EFB6-4EA9-B330-0A9CF6E8838D}"/>
+              </a:ext>
+            </a:extLst>
+          </p:cNvPr>
+          <p:cNvPicPr>
+            <a:picLocks noChangeAspect="1"/>
+          </p:cNvPicPr>
+          <p:nvPr/>
+        </p:nvPicPr>
+        <p:blipFill>
+          <a:blip r:embed="rId2">
+            <a:extLst>
+              <a:ext uri="{28A0092B-C50C-407E-A947-70E740481C1C}">
+                <a14:useLocalDpi xmlns:a14="http://schemas.microsoft.com/office/drawing/2010/main" val="0"/>
+              </a:ext>
+            </a:extLst>
+          </a:blip>
+          <a:stretch>
+            <a:fillRect/>
+          </a:stretch>
+        </p:blipFill>
+        <p:spPr>
+          <a:xfrm>
+            <a:off x="3336236" y="2510430"/>
+            <a:ext cx="5395239" cy="2262738"/>
+          </a:xfrm>
+          <a:prstGeom prst="rect">
+            <a:avLst/>
+          </a:prstGeom>
+        </p:spPr>
+      </p:pic>
+    </p:spTree>
+    <p:extLst>
+      <p:ext uri="{BB962C8B-B14F-4D97-AF65-F5344CB8AC3E}">
+        <p14:creationId xmlns:p14="http://schemas.microsoft.com/office/powerpoint/2010/main" val="955578192"/>
+      </p:ext>
+    </p:extLst>
+  </p:cSld>
+  <p:clrMapOvr>
+    <a:masterClrMapping/>
+  </p:clrMapOvr>
+  <p:transition spd="med"/>
+</p:sld>
+</file>
+
+<file path=ppt/slides/slide12.xml><?xml version="1.0" encoding="utf-8"?>
+<p:sld xmlns:a="http://schemas.openxmlformats.org/drawingml/2006/main" xmlns:r="http://schemas.openxmlformats.org/officeDocument/2006/relationships" xmlns:p="http://schemas.openxmlformats.org/presentationml/2006/main">
+  <p:cSld>
+    <p:spTree>
+      <p:nvGrpSpPr>
+        <p:cNvPr id="1" name=""/>
+        <p:cNvGrpSpPr/>
+        <p:nvPr/>
+      </p:nvGrpSpPr>
+      <p:grpSpPr>
+        <a:xfrm>
+          <a:off x="0" y="0"/>
+          <a:ext cx="0" cy="0"/>
+          <a:chOff x="0" y="0"/>
+          <a:chExt cx="0" cy="0"/>
+        </a:xfrm>
+      </p:grpSpPr>
+      <p:sp>
+        <p:nvSpPr>
+          <p:cNvPr id="122" name="Título 1"/>
+          <p:cNvSpPr txBox="1">
+            <a:spLocks noGrp="1"/>
+          </p:cNvSpPr>
+          <p:nvPr>
+            <p:ph type="title"/>
+          </p:nvPr>
+        </p:nvSpPr>
+        <p:spPr>
+          <a:xfrm>
+            <a:off x="1024128" y="585216"/>
+            <a:ext cx="9720072" cy="1499617"/>
+          </a:xfrm>
+          <a:prstGeom prst="rect">
+            <a:avLst/>
+          </a:prstGeom>
+        </p:spPr>
+        <p:txBody>
+          <a:bodyPr/>
+          <a:lstStyle/>
+          <a:p>
+            <a:pPr defTabSz="886968">
+              <a:defRPr sz="3783" spc="97">
+                <a:latin typeface="Arial"/>
+                <a:ea typeface="Arial"/>
+                <a:cs typeface="Arial"/>
+                <a:sym typeface="Arial"/>
+              </a:defRPr>
+            </a:pPr>
+            <a:r>
+              <a:rPr dirty="0" err="1"/>
+              <a:t>Demostración</a:t>
+            </a:r>
+            <a:r>
+              <a:rPr dirty="0"/>
+              <a:t> </a:t>
+            </a:r>
+            <a:r>
+              <a:rPr dirty="0" err="1"/>
+              <a:t>funcional</a:t>
+            </a:r>
+            <a:r>
+              <a:rPr dirty="0"/>
+              <a:t> del </a:t>
+            </a:r>
+            <a:r>
+              <a:rPr dirty="0" err="1"/>
+              <a:t>proyecto</a:t>
+            </a:r>
+            <a:r>
+              <a:rPr dirty="0"/>
+              <a:t>.</a:t>
+            </a:r>
+            <a:br>
+              <a:rPr dirty="0"/>
+            </a:br>
+            <a:endParaRPr dirty="0"/>
+          </a:p>
+        </p:txBody>
+      </p:sp>
+      <p:sp>
+        <p:nvSpPr>
+          <p:cNvPr id="123" name="Rectángulo 4"/>
+          <p:cNvSpPr txBox="1"/>
+          <p:nvPr/>
+        </p:nvSpPr>
+        <p:spPr>
+          <a:xfrm>
+            <a:off x="5564666" y="1483916"/>
+            <a:ext cx="1015661" cy="369332"/>
+          </a:xfrm>
+          <a:prstGeom prst="rect">
+            <a:avLst/>
+          </a:prstGeom>
+          <a:ln w="12700">
+            <a:miter lim="400000"/>
+          </a:ln>
+          <a:extLst>
+            <a:ext uri="{C572A759-6A51-4108-AA02-DFA0A04FC94B}">
+              <ma14:wrappingTextBoxFlag xmlns:ma14="http://schemas.microsoft.com/office/mac/drawingml/2011/main" xmlns:a14="http://schemas.microsoft.com/office/drawing/2010/main" xmlns:m="http://schemas.openxmlformats.org/officeDocument/2006/math" xmlns="" val="1"/>
+            </a:ext>
+          </a:extLst>
+        </p:spPr>
+        <p:txBody>
+          <a:bodyPr wrap="none" lIns="45719" rIns="45719">
+            <a:spAutoFit/>
+          </a:bodyPr>
+          <a:lstStyle>
+            <a:lvl1pPr>
+              <a:defRPr>
+                <a:latin typeface="Arial"/>
+                <a:ea typeface="Arial"/>
+                <a:cs typeface="Arial"/>
+                <a:sym typeface="Arial"/>
+              </a:defRPr>
+            </a:lvl1pPr>
+          </a:lstStyle>
+          <a:p>
+            <a:r>
+              <a:rPr lang="es-ES" dirty="0"/>
+              <a:t>Contacto</a:t>
+            </a:r>
+            <a:endParaRPr dirty="0"/>
+          </a:p>
+        </p:txBody>
+      </p:sp>
+      <p:pic>
+        <p:nvPicPr>
+          <p:cNvPr id="3" name="Imagen 2">
+            <a:extLst>
+              <a:ext uri="{FF2B5EF4-FFF2-40B4-BE49-F238E27FC236}">
+                <a16:creationId xmlns:a16="http://schemas.microsoft.com/office/drawing/2014/main" id="{D06672E2-9361-4AA2-8D31-17CCE77C1A31}"/>
+              </a:ext>
+            </a:extLst>
+          </p:cNvPr>
+          <p:cNvPicPr>
+            <a:picLocks noChangeAspect="1"/>
+          </p:cNvPicPr>
+          <p:nvPr/>
+        </p:nvPicPr>
+        <p:blipFill>
+          <a:blip r:embed="rId2">
+            <a:extLst>
+              <a:ext uri="{28A0092B-C50C-407E-A947-70E740481C1C}">
+                <a14:useLocalDpi xmlns:a14="http://schemas.microsoft.com/office/drawing/2010/main" val="0"/>
+              </a:ext>
+            </a:extLst>
+          </a:blip>
+          <a:stretch>
+            <a:fillRect/>
+          </a:stretch>
+        </p:blipFill>
+        <p:spPr>
+          <a:xfrm>
+            <a:off x="0" y="2569590"/>
+            <a:ext cx="12192000" cy="3519827"/>
+          </a:xfrm>
+          <a:prstGeom prst="rect">
+            <a:avLst/>
+          </a:prstGeom>
+        </p:spPr>
+      </p:pic>
+    </p:spTree>
+    <p:extLst>
+      <p:ext uri="{BB962C8B-B14F-4D97-AF65-F5344CB8AC3E}">
+        <p14:creationId xmlns:p14="http://schemas.microsoft.com/office/powerpoint/2010/main" val="592811907"/>
+      </p:ext>
+    </p:extLst>
+  </p:cSld>
+  <p:clrMapOvr>
+    <a:masterClrMapping/>
+  </p:clrMapOvr>
+  <p:transition spd="med"/>
+</p:sld>
+</file>
+
+<file path=ppt/slides/slide13.xml><?xml version="1.0" encoding="utf-8"?>
+<p:sld xmlns:a="http://schemas.openxmlformats.org/drawingml/2006/main" xmlns:r="http://schemas.openxmlformats.org/officeDocument/2006/relationships" xmlns:p="http://schemas.openxmlformats.org/presentationml/2006/main">
+  <p:cSld>
+    <p:spTree>
+      <p:nvGrpSpPr>
+        <p:cNvPr id="1" name=""/>
+        <p:cNvGrpSpPr/>
+        <p:nvPr/>
+      </p:nvGrpSpPr>
+      <p:grpSpPr>
+        <a:xfrm>
+          <a:off x="0" y="0"/>
+          <a:ext cx="0" cy="0"/>
+          <a:chOff x="0" y="0"/>
+          <a:chExt cx="0" cy="0"/>
+        </a:xfrm>
+      </p:grpSpPr>
+      <p:sp>
+        <p:nvSpPr>
+          <p:cNvPr id="122" name="Título 1"/>
+          <p:cNvSpPr txBox="1">
+            <a:spLocks noGrp="1"/>
+          </p:cNvSpPr>
+          <p:nvPr>
+            <p:ph type="title"/>
+          </p:nvPr>
+        </p:nvSpPr>
+        <p:spPr>
+          <a:xfrm>
+            <a:off x="1024128" y="585216"/>
+            <a:ext cx="9720072" cy="1499617"/>
+          </a:xfrm>
+          <a:prstGeom prst="rect">
+            <a:avLst/>
+          </a:prstGeom>
+        </p:spPr>
+        <p:txBody>
+          <a:bodyPr/>
+          <a:lstStyle/>
+          <a:p>
+            <a:pPr defTabSz="886968">
+              <a:defRPr sz="3783" spc="97">
+                <a:latin typeface="Arial"/>
+                <a:ea typeface="Arial"/>
+                <a:cs typeface="Arial"/>
+                <a:sym typeface="Arial"/>
+              </a:defRPr>
+            </a:pPr>
+            <a:r>
+              <a:rPr dirty="0" err="1"/>
+              <a:t>Demostración</a:t>
+            </a:r>
+            <a:r>
+              <a:rPr dirty="0"/>
+              <a:t> </a:t>
+            </a:r>
+            <a:r>
+              <a:rPr dirty="0" err="1"/>
+              <a:t>funcional</a:t>
+            </a:r>
+            <a:r>
+              <a:rPr dirty="0"/>
+              <a:t> del </a:t>
+            </a:r>
+            <a:r>
+              <a:rPr dirty="0" err="1"/>
+              <a:t>proyecto</a:t>
+            </a:r>
+            <a:r>
+              <a:rPr dirty="0"/>
+              <a:t>.</a:t>
+            </a:r>
+            <a:br>
+              <a:rPr dirty="0"/>
+            </a:br>
+            <a:endParaRPr dirty="0"/>
+          </a:p>
+        </p:txBody>
+      </p:sp>
+      <p:sp>
+        <p:nvSpPr>
+          <p:cNvPr id="123" name="Rectángulo 4"/>
+          <p:cNvSpPr txBox="1"/>
+          <p:nvPr/>
+        </p:nvSpPr>
+        <p:spPr>
+          <a:xfrm>
+            <a:off x="5564666" y="1483916"/>
+            <a:ext cx="1015661" cy="369332"/>
+          </a:xfrm>
+          <a:prstGeom prst="rect">
+            <a:avLst/>
+          </a:prstGeom>
+          <a:ln w="12700">
+            <a:miter lim="400000"/>
+          </a:ln>
+          <a:extLst>
+            <a:ext uri="{C572A759-6A51-4108-AA02-DFA0A04FC94B}">
+              <ma14:wrappingTextBoxFlag xmlns:ma14="http://schemas.microsoft.com/office/mac/drawingml/2011/main" xmlns:a14="http://schemas.microsoft.com/office/drawing/2010/main" xmlns:m="http://schemas.openxmlformats.org/officeDocument/2006/math" xmlns="" val="1"/>
+            </a:ext>
+          </a:extLst>
+        </p:spPr>
+        <p:txBody>
+          <a:bodyPr wrap="none" lIns="45719" rIns="45719">
+            <a:spAutoFit/>
+          </a:bodyPr>
+          <a:lstStyle>
+            <a:lvl1pPr>
+              <a:defRPr>
+                <a:latin typeface="Arial"/>
+                <a:ea typeface="Arial"/>
+                <a:cs typeface="Arial"/>
+                <a:sym typeface="Arial"/>
+              </a:defRPr>
+            </a:lvl1pPr>
+          </a:lstStyle>
+          <a:p>
+            <a:r>
+              <a:rPr lang="es-ES" dirty="0"/>
+              <a:t>Contacto</a:t>
+            </a:r>
+            <a:endParaRPr dirty="0"/>
+          </a:p>
+        </p:txBody>
+      </p:sp>
+      <p:pic>
+        <p:nvPicPr>
+          <p:cNvPr id="4" name="Imagen 3">
+            <a:extLst>
+              <a:ext uri="{FF2B5EF4-FFF2-40B4-BE49-F238E27FC236}">
+                <a16:creationId xmlns:a16="http://schemas.microsoft.com/office/drawing/2014/main" id="{419CB6A4-0D94-42DF-A2BD-08A9AD330532}"/>
+              </a:ext>
+            </a:extLst>
+          </p:cNvPr>
+          <p:cNvPicPr>
+            <a:picLocks noChangeAspect="1"/>
+          </p:cNvPicPr>
+          <p:nvPr/>
+        </p:nvPicPr>
+        <p:blipFill>
+          <a:blip r:embed="rId2">
+            <a:extLst>
+              <a:ext uri="{28A0092B-C50C-407E-A947-70E740481C1C}">
+                <a14:useLocalDpi xmlns:a14="http://schemas.microsoft.com/office/drawing/2010/main" val="0"/>
+              </a:ext>
+            </a:extLst>
+          </a:blip>
+          <a:stretch>
+            <a:fillRect/>
+          </a:stretch>
+        </p:blipFill>
+        <p:spPr>
+          <a:xfrm>
+            <a:off x="2560320" y="2084833"/>
+            <a:ext cx="8915400" cy="4106416"/>
+          </a:xfrm>
+          <a:prstGeom prst="rect">
+            <a:avLst/>
+          </a:prstGeom>
+        </p:spPr>
+      </p:pic>
+      <p:sp>
+        <p:nvSpPr>
+          <p:cNvPr id="7" name="CuadroTexto 5">
+            <a:extLst>
+              <a:ext uri="{FF2B5EF4-FFF2-40B4-BE49-F238E27FC236}">
+                <a16:creationId xmlns:a16="http://schemas.microsoft.com/office/drawing/2014/main" id="{5E7DFD3E-34AC-422B-8E40-12ADA37C2F1D}"/>
+              </a:ext>
+            </a:extLst>
+          </p:cNvPr>
+          <p:cNvSpPr txBox="1"/>
+          <p:nvPr/>
+        </p:nvSpPr>
+        <p:spPr>
+          <a:xfrm>
+            <a:off x="227331" y="2498332"/>
+            <a:ext cx="2054089" cy="1477328"/>
+          </a:xfrm>
+          <a:prstGeom prst="rect">
+            <a:avLst/>
+          </a:prstGeom>
+          <a:ln>
+            <a:solidFill>
+              <a:srgbClr val="2E2B21"/>
+            </a:solidFill>
+          </a:ln>
+          <a:extLst>
+            <a:ext uri="{C572A759-6A51-4108-AA02-DFA0A04FC94B}">
+              <ma14:wrappingTextBoxFlag xmlns:ma14="http://schemas.microsoft.com/office/mac/drawingml/2011/main" xmlns:a14="http://schemas.microsoft.com/office/drawing/2010/main" xmlns:m="http://schemas.openxmlformats.org/officeDocument/2006/math" xmlns="" val="1"/>
+            </a:ext>
+          </a:extLst>
+        </p:spPr>
+        <p:txBody>
+          <a:bodyPr lIns="45719" rIns="45719">
+            <a:spAutoFit/>
+          </a:bodyPr>
+          <a:lstStyle/>
+          <a:p>
+            <a:pPr marL="285750" indent="-285750">
+              <a:buSzPct val="100000"/>
+              <a:buChar char="❑"/>
+            </a:pPr>
+            <a:r>
+              <a:rPr lang="es-ES" dirty="0"/>
+              <a:t>UML</a:t>
+            </a:r>
+            <a:endParaRPr dirty="0"/>
+          </a:p>
+          <a:p>
+            <a:pPr marL="285750" indent="-285750">
+              <a:buSzPct val="100000"/>
+              <a:buChar char="❑"/>
+            </a:pPr>
+            <a:r>
+              <a:rPr dirty="0" err="1"/>
+              <a:t>Funcionalidades</a:t>
+            </a:r>
+            <a:endParaRPr dirty="0"/>
+          </a:p>
+          <a:p>
+            <a:pPr marL="285750" indent="-285750">
+              <a:buSzPct val="100000"/>
+              <a:buChar char="❑"/>
+              <a:defRPr b="1"/>
+            </a:pPr>
+            <a:r>
+              <a:rPr dirty="0" err="1"/>
+              <a:t>Demostración</a:t>
+            </a:r>
+            <a:endParaRPr dirty="0"/>
+          </a:p>
+          <a:p>
+            <a:pPr marL="285750" indent="-285750">
+              <a:buSzPct val="100000"/>
+              <a:buChar char="❑"/>
+            </a:pPr>
+            <a:r>
+              <a:rPr dirty="0" err="1"/>
+              <a:t>Aspectos</a:t>
+            </a:r>
+            <a:endParaRPr dirty="0"/>
+          </a:p>
+          <a:p>
+            <a:pPr marL="285750" indent="-285750">
+              <a:buSzPct val="100000"/>
+              <a:buChar char="❑"/>
+            </a:pPr>
+            <a:r>
+              <a:rPr dirty="0" err="1"/>
+              <a:t>Conclusiones</a:t>
+            </a:r>
+            <a:endParaRPr dirty="0"/>
+          </a:p>
+        </p:txBody>
+      </p:sp>
+    </p:spTree>
+    <p:extLst>
+      <p:ext uri="{BB962C8B-B14F-4D97-AF65-F5344CB8AC3E}">
+        <p14:creationId xmlns:p14="http://schemas.microsoft.com/office/powerpoint/2010/main" val="1422319079"/>
+      </p:ext>
+    </p:extLst>
+  </p:cSld>
+  <p:clrMapOvr>
+    <a:masterClrMapping/>
+  </p:clrMapOvr>
+  <p:transition spd="med"/>
+</p:sld>
+</file>
+
+<file path=ppt/slides/slide14.xml><?xml version="1.0" encoding="utf-8"?>
+<p:sld xmlns:a="http://schemas.openxmlformats.org/drawingml/2006/main" xmlns:r="http://schemas.openxmlformats.org/officeDocument/2006/relationships" xmlns:p="http://schemas.openxmlformats.org/presentationml/2006/main">
+  <p:cSld>
+    <p:spTree>
+      <p:nvGrpSpPr>
+        <p:cNvPr id="1" name=""/>
+        <p:cNvGrpSpPr/>
+        <p:nvPr/>
+      </p:nvGrpSpPr>
+      <p:grpSpPr>
+        <a:xfrm>
+          <a:off x="0" y="0"/>
+          <a:ext cx="0" cy="0"/>
+          <a:chOff x="0" y="0"/>
+          <a:chExt cx="0" cy="0"/>
+        </a:xfrm>
+      </p:grpSpPr>
+      <p:sp>
+        <p:nvSpPr>
+          <p:cNvPr id="122" name="Título 1"/>
+          <p:cNvSpPr txBox="1">
+            <a:spLocks noGrp="1"/>
+          </p:cNvSpPr>
+          <p:nvPr>
+            <p:ph type="title"/>
+          </p:nvPr>
+        </p:nvSpPr>
+        <p:spPr>
+          <a:xfrm>
+            <a:off x="1024128" y="585216"/>
+            <a:ext cx="9720072" cy="1499617"/>
+          </a:xfrm>
+          <a:prstGeom prst="rect">
+            <a:avLst/>
+          </a:prstGeom>
+        </p:spPr>
+        <p:txBody>
+          <a:bodyPr/>
+          <a:lstStyle/>
+          <a:p>
+            <a:pPr defTabSz="886968">
+              <a:defRPr sz="3783" spc="97">
+                <a:latin typeface="Arial"/>
+                <a:ea typeface="Arial"/>
+                <a:cs typeface="Arial"/>
+                <a:sym typeface="Arial"/>
+              </a:defRPr>
+            </a:pPr>
+            <a:r>
+              <a:rPr dirty="0" err="1"/>
+              <a:t>Demostración</a:t>
+            </a:r>
+            <a:r>
+              <a:rPr dirty="0"/>
+              <a:t> </a:t>
+            </a:r>
+            <a:r>
+              <a:rPr dirty="0" err="1"/>
+              <a:t>funcional</a:t>
+            </a:r>
+            <a:r>
+              <a:rPr dirty="0"/>
+              <a:t> del </a:t>
+            </a:r>
+            <a:r>
+              <a:rPr dirty="0" err="1"/>
+              <a:t>proyecto</a:t>
+            </a:r>
+            <a:r>
+              <a:rPr dirty="0"/>
+              <a:t>.</a:t>
+            </a:r>
+            <a:br>
+              <a:rPr dirty="0"/>
+            </a:br>
+            <a:endParaRPr dirty="0"/>
+          </a:p>
+        </p:txBody>
+      </p:sp>
+      <p:sp>
+        <p:nvSpPr>
+          <p:cNvPr id="123" name="Rectángulo 4"/>
+          <p:cNvSpPr txBox="1"/>
+          <p:nvPr/>
+        </p:nvSpPr>
+        <p:spPr>
+          <a:xfrm>
+            <a:off x="5564666" y="1483916"/>
+            <a:ext cx="900244" cy="369332"/>
+          </a:xfrm>
+          <a:prstGeom prst="rect">
+            <a:avLst/>
+          </a:prstGeom>
+          <a:ln w="12700">
+            <a:miter lim="400000"/>
+          </a:ln>
+          <a:extLst>
+            <a:ext uri="{C572A759-6A51-4108-AA02-DFA0A04FC94B}">
+              <ma14:wrappingTextBoxFlag xmlns:ma14="http://schemas.microsoft.com/office/mac/drawingml/2011/main" xmlns:a14="http://schemas.microsoft.com/office/drawing/2010/main" xmlns:m="http://schemas.openxmlformats.org/officeDocument/2006/math" xmlns="" val="1"/>
+            </a:ext>
+          </a:extLst>
+        </p:spPr>
+        <p:txBody>
+          <a:bodyPr wrap="none" lIns="45719" rIns="45719">
+            <a:spAutoFit/>
+          </a:bodyPr>
+          <a:lstStyle>
+            <a:lvl1pPr>
+              <a:defRPr>
+                <a:latin typeface="Arial"/>
+                <a:ea typeface="Arial"/>
+                <a:cs typeface="Arial"/>
+                <a:sym typeface="Arial"/>
+              </a:defRPr>
+            </a:lvl1pPr>
+          </a:lstStyle>
+          <a:p>
+            <a:r>
+              <a:rPr lang="es-ES" dirty="0"/>
+              <a:t>Mi perfil</a:t>
+            </a:r>
+            <a:endParaRPr dirty="0"/>
+          </a:p>
+        </p:txBody>
+      </p:sp>
+      <p:pic>
+        <p:nvPicPr>
+          <p:cNvPr id="3" name="Imagen 2">
+            <a:extLst>
+              <a:ext uri="{FF2B5EF4-FFF2-40B4-BE49-F238E27FC236}">
+                <a16:creationId xmlns:a16="http://schemas.microsoft.com/office/drawing/2014/main" id="{0AB50705-24B9-40EF-BA72-D81E290E0619}"/>
+              </a:ext>
+            </a:extLst>
+          </p:cNvPr>
+          <p:cNvPicPr>
+            <a:picLocks noChangeAspect="1"/>
+          </p:cNvPicPr>
+          <p:nvPr/>
+        </p:nvPicPr>
+        <p:blipFill>
+          <a:blip r:embed="rId2">
+            <a:extLst>
+              <a:ext uri="{28A0092B-C50C-407E-A947-70E740481C1C}">
+                <a14:useLocalDpi xmlns:a14="http://schemas.microsoft.com/office/drawing/2010/main" val="0"/>
+              </a:ext>
+            </a:extLst>
+          </a:blip>
+          <a:stretch>
+            <a:fillRect/>
+          </a:stretch>
+        </p:blipFill>
+        <p:spPr>
+          <a:xfrm>
+            <a:off x="2663409" y="2248852"/>
+            <a:ext cx="7934325" cy="3457575"/>
+          </a:xfrm>
+          <a:prstGeom prst="rect">
+            <a:avLst/>
+          </a:prstGeom>
+        </p:spPr>
+      </p:pic>
+      <p:sp>
+        <p:nvSpPr>
+          <p:cNvPr id="9" name="CuadroTexto 5">
+            <a:extLst>
+              <a:ext uri="{FF2B5EF4-FFF2-40B4-BE49-F238E27FC236}">
+                <a16:creationId xmlns:a16="http://schemas.microsoft.com/office/drawing/2014/main" id="{32E4E81B-0198-4264-983A-EFF3D96CCFE4}"/>
+              </a:ext>
+            </a:extLst>
+          </p:cNvPr>
+          <p:cNvSpPr txBox="1"/>
+          <p:nvPr/>
+        </p:nvSpPr>
+        <p:spPr>
+          <a:xfrm>
+            <a:off x="227331" y="2498332"/>
+            <a:ext cx="2054089" cy="1477328"/>
+          </a:xfrm>
+          <a:prstGeom prst="rect">
+            <a:avLst/>
+          </a:prstGeom>
+          <a:ln>
+            <a:solidFill>
+              <a:srgbClr val="2E2B21"/>
+            </a:solidFill>
+          </a:ln>
+          <a:extLst>
+            <a:ext uri="{C572A759-6A51-4108-AA02-DFA0A04FC94B}">
+              <ma14:wrappingTextBoxFlag xmlns:ma14="http://schemas.microsoft.com/office/mac/drawingml/2011/main" xmlns:a14="http://schemas.microsoft.com/office/drawing/2010/main" xmlns:m="http://schemas.openxmlformats.org/officeDocument/2006/math" xmlns="" val="1"/>
+            </a:ext>
+          </a:extLst>
+        </p:spPr>
+        <p:txBody>
+          <a:bodyPr lIns="45719" rIns="45719">
+            <a:spAutoFit/>
+          </a:bodyPr>
+          <a:lstStyle/>
+          <a:p>
+            <a:pPr marL="285750" indent="-285750">
+              <a:buSzPct val="100000"/>
+              <a:buChar char="❑"/>
+            </a:pPr>
+            <a:r>
+              <a:rPr lang="es-ES" dirty="0"/>
+              <a:t>UML</a:t>
+            </a:r>
+            <a:endParaRPr dirty="0"/>
+          </a:p>
+          <a:p>
+            <a:pPr marL="285750" indent="-285750">
+              <a:buSzPct val="100000"/>
+              <a:buChar char="❑"/>
+            </a:pPr>
+            <a:r>
+              <a:rPr dirty="0" err="1"/>
+              <a:t>Funcionalidades</a:t>
+            </a:r>
+            <a:endParaRPr dirty="0"/>
+          </a:p>
+          <a:p>
+            <a:pPr marL="285750" indent="-285750">
+              <a:buSzPct val="100000"/>
+              <a:buChar char="❑"/>
+              <a:defRPr b="1"/>
+            </a:pPr>
+            <a:r>
+              <a:rPr dirty="0" err="1"/>
+              <a:t>Demostración</a:t>
+            </a:r>
+            <a:endParaRPr dirty="0"/>
+          </a:p>
+          <a:p>
+            <a:pPr marL="285750" indent="-285750">
+              <a:buSzPct val="100000"/>
+              <a:buChar char="❑"/>
+            </a:pPr>
+            <a:r>
+              <a:rPr dirty="0" err="1"/>
+              <a:t>Aspectos</a:t>
+            </a:r>
+            <a:endParaRPr dirty="0"/>
+          </a:p>
+          <a:p>
+            <a:pPr marL="285750" indent="-285750">
+              <a:buSzPct val="100000"/>
+              <a:buChar char="❑"/>
+            </a:pPr>
+            <a:r>
+              <a:rPr dirty="0" err="1"/>
+              <a:t>Conclusiones</a:t>
+            </a:r>
+            <a:endParaRPr dirty="0"/>
+          </a:p>
+        </p:txBody>
+      </p:sp>
+    </p:spTree>
+    <p:extLst>
+      <p:ext uri="{BB962C8B-B14F-4D97-AF65-F5344CB8AC3E}">
+        <p14:creationId xmlns:p14="http://schemas.microsoft.com/office/powerpoint/2010/main" val="907569077"/>
+      </p:ext>
+    </p:extLst>
+  </p:cSld>
+  <p:clrMapOvr>
+    <a:masterClrMapping/>
+  </p:clrMapOvr>
+  <p:transition spd="med"/>
+</p:sld>
+</file>
+
+<file path=ppt/slides/slide15.xml><?xml version="1.0" encoding="utf-8"?>
+<p:sld xmlns:a="http://schemas.openxmlformats.org/drawingml/2006/main" xmlns:r="http://schemas.openxmlformats.org/officeDocument/2006/relationships" xmlns:p="http://schemas.openxmlformats.org/presentationml/2006/main">
+  <p:cSld>
+    <p:spTree>
+      <p:nvGrpSpPr>
+        <p:cNvPr id="1" name=""/>
+        <p:cNvGrpSpPr/>
+        <p:nvPr/>
+      </p:nvGrpSpPr>
+      <p:grpSpPr>
+        <a:xfrm>
+          <a:off x="0" y="0"/>
+          <a:ext cx="0" cy="0"/>
+          <a:chOff x="0" y="0"/>
+          <a:chExt cx="0" cy="0"/>
+        </a:xfrm>
+      </p:grpSpPr>
+      <p:sp>
+        <p:nvSpPr>
+          <p:cNvPr id="122" name="Título 1"/>
+          <p:cNvSpPr txBox="1">
+            <a:spLocks noGrp="1"/>
+          </p:cNvSpPr>
+          <p:nvPr>
+            <p:ph type="title"/>
+          </p:nvPr>
+        </p:nvSpPr>
+        <p:spPr>
+          <a:xfrm>
+            <a:off x="1024128" y="585216"/>
+            <a:ext cx="9720072" cy="1499617"/>
+          </a:xfrm>
+          <a:prstGeom prst="rect">
+            <a:avLst/>
+          </a:prstGeom>
+        </p:spPr>
+        <p:txBody>
+          <a:bodyPr/>
+          <a:lstStyle/>
+          <a:p>
+            <a:pPr defTabSz="886968">
+              <a:defRPr sz="3783" spc="97">
+                <a:latin typeface="Arial"/>
+                <a:ea typeface="Arial"/>
+                <a:cs typeface="Arial"/>
+                <a:sym typeface="Arial"/>
+              </a:defRPr>
+            </a:pPr>
+            <a:r>
+              <a:rPr dirty="0" err="1"/>
+              <a:t>Demostración</a:t>
+            </a:r>
+            <a:r>
+              <a:rPr dirty="0"/>
+              <a:t> </a:t>
+            </a:r>
+            <a:r>
+              <a:rPr dirty="0" err="1"/>
+              <a:t>funcional</a:t>
+            </a:r>
+            <a:r>
+              <a:rPr dirty="0"/>
+              <a:t> del </a:t>
+            </a:r>
+            <a:r>
+              <a:rPr dirty="0" err="1"/>
+              <a:t>proyecto</a:t>
+            </a:r>
+            <a:r>
+              <a:rPr dirty="0"/>
+              <a:t>.</a:t>
+            </a:r>
+            <a:br>
+              <a:rPr dirty="0"/>
+            </a:br>
+            <a:endParaRPr dirty="0"/>
+          </a:p>
+        </p:txBody>
+      </p:sp>
+      <p:sp>
+        <p:nvSpPr>
+          <p:cNvPr id="123" name="Rectángulo 4"/>
+          <p:cNvSpPr txBox="1"/>
+          <p:nvPr/>
+        </p:nvSpPr>
+        <p:spPr>
+          <a:xfrm>
             <a:off x="5564666" y="1483916"/>
             <a:ext cx="900244" cy="369332"/>
           </a:xfrm>
@@ -3859,7 +5274,7 @@
 </p:sld>
 </file>
 
-<file path=ppt/slides/slide11.xml><?xml version="1.0" encoding="utf-8"?>
+<file path=ppt/slides/slide16.xml><?xml version="1.0" encoding="utf-8"?>
 <p:sld xmlns:a="http://schemas.openxmlformats.org/drawingml/2006/main" xmlns:r="http://schemas.openxmlformats.org/officeDocument/2006/relationships" xmlns:p="http://schemas.openxmlformats.org/presentationml/2006/main">
   <p:cSld>
     <p:spTree>
@@ -4126,7 +5541,7 @@
 </p:sld>
 </file>
 
-<file path=ppt/slides/slide12.xml><?xml version="1.0" encoding="utf-8"?>
+<file path=ppt/slides/slide17.xml><?xml version="1.0" encoding="utf-8"?>
 <p:sld xmlns:a="http://schemas.openxmlformats.org/drawingml/2006/main" xmlns:r="http://schemas.openxmlformats.org/officeDocument/2006/relationships" xmlns:p="http://schemas.openxmlformats.org/presentationml/2006/main">
   <p:cSld>
     <p:spTree>
@@ -5588,7 +7003,7 @@
 </p:sld>
 </file>
 
-<file path=ppt/slides/slide13.xml><?xml version="1.0" encoding="utf-8"?>
+<file path=ppt/slides/slide18.xml><?xml version="1.0" encoding="utf-8"?>
 <p:sld xmlns:a="http://schemas.openxmlformats.org/drawingml/2006/main" xmlns:r="http://schemas.openxmlformats.org/officeDocument/2006/relationships" xmlns:p="http://schemas.openxmlformats.org/presentationml/2006/main">
   <p:cSld>
     <p:spTree>
@@ -6146,7 +7561,7 @@
 </p:sld>
 </file>
 
-<file path=ppt/slides/slide14.xml><?xml version="1.0" encoding="utf-8"?>
+<file path=ppt/slides/slide19.xml><?xml version="1.0" encoding="utf-8"?>
 <p:sld xmlns:a="http://schemas.openxmlformats.org/drawingml/2006/main" xmlns:r="http://schemas.openxmlformats.org/officeDocument/2006/relationships" xmlns:p="http://schemas.openxmlformats.org/presentationml/2006/main">
   <p:cSld>
     <p:spTree>
@@ -7427,7 +8842,172 @@
 </p:sld>
 </file>
 
-<file path=ppt/slides/slide15.xml><?xml version="1.0" encoding="utf-8"?>
+<file path=ppt/slides/slide2.xml><?xml version="1.0" encoding="utf-8"?>
+<p:sld xmlns:a="http://schemas.openxmlformats.org/drawingml/2006/main" xmlns:r="http://schemas.openxmlformats.org/officeDocument/2006/relationships" xmlns:p="http://schemas.openxmlformats.org/presentationml/2006/main">
+  <p:cSld>
+    <p:spTree>
+      <p:nvGrpSpPr>
+        <p:cNvPr id="1" name=""/>
+        <p:cNvGrpSpPr/>
+        <p:nvPr/>
+      </p:nvGrpSpPr>
+      <p:grpSpPr>
+        <a:xfrm>
+          <a:off x="0" y="0"/>
+          <a:ext cx="0" cy="0"/>
+          <a:chOff x="0" y="0"/>
+          <a:chExt cx="0" cy="0"/>
+        </a:xfrm>
+      </p:grpSpPr>
+      <p:sp>
+        <p:nvSpPr>
+          <p:cNvPr id="107" name="Título 1"/>
+          <p:cNvSpPr txBox="1">
+            <a:spLocks noGrp="1"/>
+          </p:cNvSpPr>
+          <p:nvPr>
+            <p:ph type="title"/>
+          </p:nvPr>
+        </p:nvSpPr>
+        <p:spPr>
+          <a:xfrm>
+            <a:off x="1024128" y="585216"/>
+            <a:ext cx="9720072" cy="1499617"/>
+          </a:xfrm>
+          <a:prstGeom prst="rect">
+            <a:avLst/>
+          </a:prstGeom>
+        </p:spPr>
+        <p:txBody>
+          <a:bodyPr/>
+          <a:lstStyle/>
+          <a:p>
+            <a:r>
+              <a:t>Índice</a:t>
+            </a:r>
+          </a:p>
+        </p:txBody>
+      </p:sp>
+      <p:sp>
+        <p:nvSpPr>
+          <p:cNvPr id="108" name="Marcador de contenido 2"/>
+          <p:cNvSpPr txBox="1">
+            <a:spLocks noGrp="1"/>
+          </p:cNvSpPr>
+          <p:nvPr>
+            <p:ph type="body" idx="1"/>
+          </p:nvPr>
+        </p:nvSpPr>
+        <p:spPr>
+          <a:xfrm>
+            <a:off x="1024127" y="2285999"/>
+            <a:ext cx="9720073" cy="4023361"/>
+          </a:xfrm>
+          <a:prstGeom prst="rect">
+            <a:avLst/>
+          </a:prstGeom>
+        </p:spPr>
+        <p:txBody>
+          <a:bodyPr/>
+          <a:lstStyle/>
+          <a:p>
+            <a:pPr marL="457200" indent="-457200">
+              <a:buFontTx/>
+              <a:buAutoNum type="arabicPeriod"/>
+            </a:pPr>
+            <a:r>
+              <a:rPr lang="es-ES" dirty="0"/>
+              <a:t>Diseño UML</a:t>
+            </a:r>
+          </a:p>
+          <a:p>
+            <a:pPr marL="457200" indent="-457200">
+              <a:buFontTx/>
+              <a:buAutoNum type="arabicPeriod"/>
+            </a:pPr>
+            <a:r>
+              <a:rPr lang="es-ES" dirty="0"/>
+              <a:t>Funcionalidades</a:t>
+            </a:r>
+          </a:p>
+          <a:p>
+            <a:pPr marL="457200" indent="-457200">
+              <a:buFontTx/>
+              <a:buAutoNum type="arabicPeriod"/>
+            </a:pPr>
+            <a:r>
+              <a:rPr dirty="0" err="1"/>
+              <a:t>Demostración</a:t>
+            </a:r>
+            <a:r>
+              <a:rPr dirty="0"/>
+              <a:t> </a:t>
+            </a:r>
+            <a:r>
+              <a:rPr dirty="0" err="1"/>
+              <a:t>funcional</a:t>
+            </a:r>
+            <a:r>
+              <a:rPr dirty="0"/>
+              <a:t> del </a:t>
+            </a:r>
+            <a:r>
+              <a:rPr dirty="0" err="1"/>
+              <a:t>proyecto</a:t>
+            </a:r>
+            <a:r>
+              <a:rPr dirty="0"/>
+              <a:t>.</a:t>
+            </a:r>
+          </a:p>
+          <a:p>
+            <a:pPr marL="457200" indent="-457200">
+              <a:buFontTx/>
+              <a:buAutoNum type="arabicPeriod"/>
+            </a:pPr>
+            <a:r>
+              <a:rPr dirty="0" err="1"/>
+              <a:t>Aspectos</a:t>
+            </a:r>
+            <a:r>
+              <a:rPr dirty="0"/>
+              <a:t> a </a:t>
+            </a:r>
+            <a:r>
+              <a:rPr dirty="0" err="1"/>
+              <a:t>resaltar</a:t>
+            </a:r>
+            <a:r>
+              <a:rPr dirty="0"/>
+              <a:t>.</a:t>
+            </a:r>
+          </a:p>
+          <a:p>
+            <a:pPr marL="457200" indent="-457200">
+              <a:buFontTx/>
+              <a:buAutoNum type="arabicPeriod"/>
+            </a:pPr>
+            <a:r>
+              <a:rPr dirty="0" err="1"/>
+              <a:t>Conclusiones</a:t>
+            </a:r>
+            <a:r>
+              <a:rPr dirty="0"/>
+              <a:t>.</a:t>
+            </a:r>
+          </a:p>
+        </p:txBody>
+      </p:sp>
+    </p:spTree>
+  </p:cSld>
+  <p:clrMapOvr>
+    <a:masterClrMapping/>
+  </p:clrMapOvr>
+  <p:transition spd="med"/>
+</p:sld>
+</file>
+
+<file path=ppt/slides/slide20.xml><?xml version="1.0" encoding="utf-8"?>
 <p:sld xmlns:a="http://schemas.openxmlformats.org/drawingml/2006/main" xmlns:r="http://schemas.openxmlformats.org/officeDocument/2006/relationships" xmlns:p="http://schemas.openxmlformats.org/presentationml/2006/main">
   <p:cSld>
     <p:spTree>
@@ -9333,7 +10913,7 @@
 </p:sld>
 </file>
 
-<file path=ppt/slides/slide16.xml><?xml version="1.0" encoding="utf-8"?>
+<file path=ppt/slides/slide21.xml><?xml version="1.0" encoding="utf-8"?>
 <p:sld xmlns:a="http://schemas.openxmlformats.org/drawingml/2006/main" xmlns:r="http://schemas.openxmlformats.org/officeDocument/2006/relationships" xmlns:p="http://schemas.openxmlformats.org/presentationml/2006/main">
   <p:cSld>
     <p:spTree>
@@ -10442,171 +12022,6 @@
 </p:sld>
 </file>
 
-<file path=ppt/slides/slide2.xml><?xml version="1.0" encoding="utf-8"?>
-<p:sld xmlns:a="http://schemas.openxmlformats.org/drawingml/2006/main" xmlns:r="http://schemas.openxmlformats.org/officeDocument/2006/relationships" xmlns:p="http://schemas.openxmlformats.org/presentationml/2006/main">
-  <p:cSld>
-    <p:spTree>
-      <p:nvGrpSpPr>
-        <p:cNvPr id="1" name=""/>
-        <p:cNvGrpSpPr/>
-        <p:nvPr/>
-      </p:nvGrpSpPr>
-      <p:grpSpPr>
-        <a:xfrm>
-          <a:off x="0" y="0"/>
-          <a:ext cx="0" cy="0"/>
-          <a:chOff x="0" y="0"/>
-          <a:chExt cx="0" cy="0"/>
-        </a:xfrm>
-      </p:grpSpPr>
-      <p:sp>
-        <p:nvSpPr>
-          <p:cNvPr id="107" name="Título 1"/>
-          <p:cNvSpPr txBox="1">
-            <a:spLocks noGrp="1"/>
-          </p:cNvSpPr>
-          <p:nvPr>
-            <p:ph type="title"/>
-          </p:nvPr>
-        </p:nvSpPr>
-        <p:spPr>
-          <a:xfrm>
-            <a:off x="1024128" y="585216"/>
-            <a:ext cx="9720072" cy="1499617"/>
-          </a:xfrm>
-          <a:prstGeom prst="rect">
-            <a:avLst/>
-          </a:prstGeom>
-        </p:spPr>
-        <p:txBody>
-          <a:bodyPr/>
-          <a:lstStyle/>
-          <a:p>
-            <a:r>
-              <a:t>Índice</a:t>
-            </a:r>
-          </a:p>
-        </p:txBody>
-      </p:sp>
-      <p:sp>
-        <p:nvSpPr>
-          <p:cNvPr id="108" name="Marcador de contenido 2"/>
-          <p:cNvSpPr txBox="1">
-            <a:spLocks noGrp="1"/>
-          </p:cNvSpPr>
-          <p:nvPr>
-            <p:ph type="body" idx="1"/>
-          </p:nvPr>
-        </p:nvSpPr>
-        <p:spPr>
-          <a:xfrm>
-            <a:off x="1024127" y="2285999"/>
-            <a:ext cx="9720073" cy="4023361"/>
-          </a:xfrm>
-          <a:prstGeom prst="rect">
-            <a:avLst/>
-          </a:prstGeom>
-        </p:spPr>
-        <p:txBody>
-          <a:bodyPr/>
-          <a:lstStyle/>
-          <a:p>
-            <a:pPr marL="457200" indent="-457200">
-              <a:buFontTx/>
-              <a:buAutoNum type="arabicPeriod"/>
-            </a:pPr>
-            <a:r>
-              <a:rPr lang="es-ES" dirty="0"/>
-              <a:t>Diseño UML</a:t>
-            </a:r>
-          </a:p>
-          <a:p>
-            <a:pPr marL="457200" indent="-457200">
-              <a:buFontTx/>
-              <a:buAutoNum type="arabicPeriod"/>
-            </a:pPr>
-            <a:r>
-              <a:rPr lang="es-ES" dirty="0"/>
-              <a:t>Funcionalidades</a:t>
-            </a:r>
-          </a:p>
-          <a:p>
-            <a:pPr marL="457200" indent="-457200">
-              <a:buFontTx/>
-              <a:buAutoNum type="arabicPeriod"/>
-            </a:pPr>
-            <a:r>
-              <a:rPr dirty="0" err="1"/>
-              <a:t>Demostración</a:t>
-            </a:r>
-            <a:r>
-              <a:rPr dirty="0"/>
-              <a:t> </a:t>
-            </a:r>
-            <a:r>
-              <a:rPr dirty="0" err="1"/>
-              <a:t>funcional</a:t>
-            </a:r>
-            <a:r>
-              <a:rPr dirty="0"/>
-              <a:t> del </a:t>
-            </a:r>
-            <a:r>
-              <a:rPr dirty="0" err="1"/>
-              <a:t>proyecto</a:t>
-            </a:r>
-            <a:r>
-              <a:rPr dirty="0"/>
-              <a:t>.</a:t>
-            </a:r>
-          </a:p>
-          <a:p>
-            <a:pPr marL="457200" indent="-457200">
-              <a:buFontTx/>
-              <a:buAutoNum type="arabicPeriod"/>
-            </a:pPr>
-            <a:r>
-              <a:rPr dirty="0" err="1"/>
-              <a:t>Aspectos</a:t>
-            </a:r>
-            <a:r>
-              <a:rPr dirty="0"/>
-              <a:t> a </a:t>
-            </a:r>
-            <a:r>
-              <a:rPr dirty="0" err="1"/>
-              <a:t>resaltar</a:t>
-            </a:r>
-            <a:r>
-              <a:rPr dirty="0"/>
-              <a:t>.</a:t>
-            </a:r>
-          </a:p>
-          <a:p>
-            <a:pPr marL="457200" indent="-457200">
-              <a:buFontTx/>
-              <a:buAutoNum type="arabicPeriod"/>
-            </a:pPr>
-            <a:r>
-              <a:rPr dirty="0" err="1"/>
-              <a:t>Conclusiones</a:t>
-            </a:r>
-            <a:r>
-              <a:rPr dirty="0"/>
-              <a:t>.</a:t>
-            </a:r>
-          </a:p>
-        </p:txBody>
-      </p:sp>
-    </p:spTree>
-  </p:cSld>
-  <p:clrMapOvr>
-    <a:masterClrMapping/>
-  </p:clrMapOvr>
-  <p:transition spd="med"/>
-</p:sld>
-</file>
-
 <file path=ppt/slides/slide3.xml><?xml version="1.0" encoding="utf-8"?>
 <p:sld xmlns:a="http://schemas.openxmlformats.org/drawingml/2006/main" xmlns:r="http://schemas.openxmlformats.org/officeDocument/2006/relationships" xmlns:p="http://schemas.openxmlformats.org/presentationml/2006/main">
   <p:cSld>
@@ -10679,37 +12094,6 @@
       </p:sp>
       <p:sp>
         <p:nvSpPr>
-          <p:cNvPr id="111" name="Marcador de contenido 2"/>
-          <p:cNvSpPr txBox="1">
-            <a:spLocks noGrp="1"/>
-          </p:cNvSpPr>
-          <p:nvPr>
-            <p:ph type="body" idx="1"/>
-          </p:nvPr>
-        </p:nvSpPr>
-        <p:spPr>
-          <a:xfrm>
-            <a:off x="2844331" y="2077302"/>
-            <a:ext cx="8946543" cy="4195483"/>
-          </a:xfrm>
-          <a:prstGeom prst="rect">
-            <a:avLst/>
-          </a:prstGeom>
-        </p:spPr>
-        <p:txBody>
-          <a:bodyPr/>
-          <a:lstStyle/>
-          <a:p>
-            <a:pPr>
-              <a:buFontTx/>
-              <a:buChar char="▪"/>
-            </a:pPr>
-            <a:endParaRPr dirty="0"/>
-          </a:p>
-        </p:txBody>
-      </p:sp>
-      <p:sp>
-        <p:nvSpPr>
           <p:cNvPr id="112" name="CuadroTexto 5"/>
           <p:cNvSpPr txBox="1"/>
           <p:nvPr/>
@@ -10794,6 +12178,42 @@
           </a:p>
         </p:txBody>
       </p:sp>
+      <p:pic>
+        <p:nvPicPr>
+          <p:cNvPr id="5" name="Imagen 4">
+            <a:extLst>
+              <a:ext uri="{FF2B5EF4-FFF2-40B4-BE49-F238E27FC236}">
+                <a16:creationId xmlns:a16="http://schemas.microsoft.com/office/drawing/2014/main" id="{60564AB2-B562-4086-ADC8-AD8B869F1FBF}"/>
+              </a:ext>
+            </a:extLst>
+          </p:cNvPr>
+          <p:cNvPicPr>
+            <a:picLocks noChangeAspect="1"/>
+          </p:cNvPicPr>
+          <p:nvPr/>
+        </p:nvPicPr>
+        <p:blipFill>
+          <a:blip r:embed="rId2">
+            <a:extLst>
+              <a:ext uri="{28A0092B-C50C-407E-A947-70E740481C1C}">
+                <a14:useLocalDpi xmlns:a14="http://schemas.microsoft.com/office/drawing/2010/main" val="0"/>
+              </a:ext>
+            </a:extLst>
+          </a:blip>
+          <a:stretch>
+            <a:fillRect/>
+          </a:stretch>
+        </p:blipFill>
+        <p:spPr>
+          <a:xfrm>
+            <a:off x="4810539" y="373530"/>
+            <a:ext cx="6838122" cy="6119832"/>
+          </a:xfrm>
+          <a:prstGeom prst="rect">
+            <a:avLst/>
+          </a:prstGeom>
+        </p:spPr>
+      </p:pic>
     </p:spTree>
     <p:extLst>
       <p:ext uri="{BB962C8B-B14F-4D97-AF65-F5344CB8AC3E}">
@@ -11595,7 +13015,7 @@
         <p:spPr>
           <a:xfrm>
             <a:off x="5564666" y="1483916"/>
-            <a:ext cx="1015661" cy="369332"/>
+            <a:ext cx="1720982" cy="369332"/>
           </a:xfrm>
           <a:prstGeom prst="rect">
             <a:avLst/>
@@ -11626,7 +13046,7 @@
           <a:p>
             <a:r>
               <a:rPr lang="es-ES" dirty="0"/>
-              <a:t>Contacto</a:t>
+              <a:t>Comprar vuelos</a:t>
             </a:r>
             <a:endParaRPr dirty="0"/>
           </a:p>
@@ -11637,7 +13057,7 @@
           <p:cNvPr id="3" name="Imagen 2">
             <a:extLst>
               <a:ext uri="{FF2B5EF4-FFF2-40B4-BE49-F238E27FC236}">
-                <a16:creationId xmlns:a16="http://schemas.microsoft.com/office/drawing/2014/main" id="{D06672E2-9361-4AA2-8D31-17CCE77C1A31}"/>
+                <a16:creationId xmlns:a16="http://schemas.microsoft.com/office/drawing/2014/main" id="{7E46925E-EFB6-4EA9-B330-0A9CF6E8838D}"/>
               </a:ext>
             </a:extLst>
           </p:cNvPr>
@@ -11660,8 +13080,8 @@
         </p:blipFill>
         <p:spPr>
           <a:xfrm>
-            <a:off x="0" y="2569590"/>
-            <a:ext cx="12192000" cy="3519827"/>
+            <a:off x="3223252" y="2084833"/>
+            <a:ext cx="5321824" cy="3871610"/>
           </a:xfrm>
           <a:prstGeom prst="rect">
             <a:avLst/>
@@ -11671,7 +13091,7 @@
     </p:spTree>
     <p:extLst>
       <p:ext uri="{BB962C8B-B14F-4D97-AF65-F5344CB8AC3E}">
-        <p14:creationId xmlns:p14="http://schemas.microsoft.com/office/powerpoint/2010/main" val="592811907"/>
+        <p14:creationId xmlns:p14="http://schemas.microsoft.com/office/powerpoint/2010/main" val="1888852912"/>
       </p:ext>
     </p:extLst>
   </p:cSld>
@@ -11770,7 +13190,7 @@
         <p:spPr>
           <a:xfrm>
             <a:off x="5564666" y="1483916"/>
-            <a:ext cx="1015661" cy="369332"/>
+            <a:ext cx="2503247" cy="369332"/>
           </a:xfrm>
           <a:prstGeom prst="rect">
             <a:avLst/>
@@ -11801,7 +13221,7 @@
           <a:p>
             <a:r>
               <a:rPr lang="es-ES" dirty="0"/>
-              <a:t>Contacto</a:t>
+              <a:t>Configuración del vuelo</a:t>
             </a:r>
             <a:endParaRPr dirty="0"/>
           </a:p>
@@ -11809,10 +13229,10 @@
       </p:sp>
       <p:pic>
         <p:nvPicPr>
-          <p:cNvPr id="4" name="Imagen 3">
+          <p:cNvPr id="3" name="Imagen 2">
             <a:extLst>
               <a:ext uri="{FF2B5EF4-FFF2-40B4-BE49-F238E27FC236}">
-                <a16:creationId xmlns:a16="http://schemas.microsoft.com/office/drawing/2014/main" id="{419CB6A4-0D94-42DF-A2BD-08A9AD330532}"/>
+                <a16:creationId xmlns:a16="http://schemas.microsoft.com/office/drawing/2014/main" id="{7E46925E-EFB6-4EA9-B330-0A9CF6E8838D}"/>
               </a:ext>
             </a:extLst>
           </p:cNvPr>
@@ -11835,112 +13255,18 @@
         </p:blipFill>
         <p:spPr>
           <a:xfrm>
-            <a:off x="2560320" y="2084833"/>
-            <a:ext cx="8915400" cy="4106416"/>
+            <a:off x="3742696" y="2084833"/>
+            <a:ext cx="4336202" cy="3871610"/>
           </a:xfrm>
           <a:prstGeom prst="rect">
             <a:avLst/>
           </a:prstGeom>
         </p:spPr>
       </p:pic>
-      <p:sp>
-        <p:nvSpPr>
-          <p:cNvPr id="7" name="CuadroTexto 5">
-            <a:extLst>
-              <a:ext uri="{FF2B5EF4-FFF2-40B4-BE49-F238E27FC236}">
-                <a16:creationId xmlns:a16="http://schemas.microsoft.com/office/drawing/2014/main" id="{5E7DFD3E-34AC-422B-8E40-12ADA37C2F1D}"/>
-              </a:ext>
-            </a:extLst>
-          </p:cNvPr>
-          <p:cNvSpPr txBox="1"/>
-          <p:nvPr/>
-        </p:nvSpPr>
-        <p:spPr>
-          <a:xfrm>
-            <a:off x="227331" y="2498332"/>
-            <a:ext cx="2054089" cy="1477328"/>
-          </a:xfrm>
-          <a:prstGeom prst="rect">
-            <a:avLst/>
-          </a:prstGeom>
-          <a:ln>
-            <a:solidFill>
-              <a:srgbClr val="2E2B21"/>
-            </a:solidFill>
-          </a:ln>
-          <a:extLst>
-            <a:ext uri="{C572A759-6A51-4108-AA02-DFA0A04FC94B}">
-              <ma14:wrappingTextBoxFlag xmlns:ma14="http://schemas.microsoft.com/office/mac/drawingml/2011/main" xmlns:a14="http://schemas.microsoft.com/office/drawing/2010/main" xmlns:m="http://schemas.openxmlformats.org/officeDocument/2006/math" xmlns="" val="1"/>
-            </a:ext>
-          </a:extLst>
-        </p:spPr>
-        <p:txBody>
-          <a:bodyPr lIns="45719" rIns="45719">
-            <a:spAutoFit/>
-          </a:bodyPr>
-          <a:lstStyle/>
-          <a:p>
-            <a:pPr marL="285750" indent="-285750">
-              <a:buSzPct val="100000"/>
-              <a:buChar char="❑"/>
-            </a:pPr>
-            <a:r>
-              <a:rPr lang="es-ES" dirty="0"/>
-              <a:t>UML</a:t>
-            </a:r>
-            <a:endParaRPr dirty="0"/>
-          </a:p>
-          <a:p>
-            <a:pPr marL="285750" indent="-285750">
-              <a:buSzPct val="100000"/>
-              <a:buChar char="❑"/>
-            </a:pPr>
-            <a:r>
-              <a:rPr dirty="0" err="1"/>
-              <a:t>Funcionalidades</a:t>
-            </a:r>
-            <a:endParaRPr dirty="0"/>
-          </a:p>
-          <a:p>
-            <a:pPr marL="285750" indent="-285750">
-              <a:buSzPct val="100000"/>
-              <a:buChar char="❑"/>
-              <a:defRPr b="1"/>
-            </a:pPr>
-            <a:r>
-              <a:rPr dirty="0" err="1"/>
-              <a:t>Demostración</a:t>
-            </a:r>
-            <a:endParaRPr dirty="0"/>
-          </a:p>
-          <a:p>
-            <a:pPr marL="285750" indent="-285750">
-              <a:buSzPct val="100000"/>
-              <a:buChar char="❑"/>
-            </a:pPr>
-            <a:r>
-              <a:rPr dirty="0" err="1"/>
-              <a:t>Aspectos</a:t>
-            </a:r>
-            <a:endParaRPr dirty="0"/>
-          </a:p>
-          <a:p>
-            <a:pPr marL="285750" indent="-285750">
-              <a:buSzPct val="100000"/>
-              <a:buChar char="❑"/>
-            </a:pPr>
-            <a:r>
-              <a:rPr dirty="0" err="1"/>
-              <a:t>Conclusiones</a:t>
-            </a:r>
-            <a:endParaRPr dirty="0"/>
-          </a:p>
-        </p:txBody>
-      </p:sp>
     </p:spTree>
     <p:extLst>
       <p:ext uri="{BB962C8B-B14F-4D97-AF65-F5344CB8AC3E}">
-        <p14:creationId xmlns:p14="http://schemas.microsoft.com/office/powerpoint/2010/main" val="1422319079"/>
+        <p14:creationId xmlns:p14="http://schemas.microsoft.com/office/powerpoint/2010/main" val="3705986620"/>
       </p:ext>
     </p:extLst>
   </p:cSld>
@@ -12039,7 +13365,7 @@
         <p:spPr>
           <a:xfrm>
             <a:off x="5564666" y="1483916"/>
-            <a:ext cx="900244" cy="369332"/>
+            <a:ext cx="1323437" cy="369332"/>
           </a:xfrm>
           <a:prstGeom prst="rect">
             <a:avLst/>
@@ -12070,7 +13396,7 @@
           <a:p>
             <a:r>
               <a:rPr lang="es-ES" dirty="0"/>
-              <a:t>Mi perfil</a:t>
+              <a:t>Pagar vuelo</a:t>
             </a:r>
             <a:endParaRPr dirty="0"/>
           </a:p>
@@ -12081,7 +13407,7 @@
           <p:cNvPr id="3" name="Imagen 2">
             <a:extLst>
               <a:ext uri="{FF2B5EF4-FFF2-40B4-BE49-F238E27FC236}">
-                <a16:creationId xmlns:a16="http://schemas.microsoft.com/office/drawing/2014/main" id="{0AB50705-24B9-40EF-BA72-D81E290E0619}"/>
+                <a16:creationId xmlns:a16="http://schemas.microsoft.com/office/drawing/2014/main" id="{7E46925E-EFB6-4EA9-B330-0A9CF6E8838D}"/>
               </a:ext>
             </a:extLst>
           </p:cNvPr>
@@ -12104,112 +13430,54 @@
         </p:blipFill>
         <p:spPr>
           <a:xfrm>
-            <a:off x="2663409" y="2248852"/>
-            <a:ext cx="7934325" cy="3457575"/>
+            <a:off x="3159868" y="2084832"/>
+            <a:ext cx="3265289" cy="3871610"/>
           </a:xfrm>
           <a:prstGeom prst="rect">
             <a:avLst/>
           </a:prstGeom>
         </p:spPr>
       </p:pic>
-      <p:sp>
-        <p:nvSpPr>
-          <p:cNvPr id="9" name="CuadroTexto 5">
+      <p:pic>
+        <p:nvPicPr>
+          <p:cNvPr id="4" name="Imagen 3">
             <a:extLst>
               <a:ext uri="{FF2B5EF4-FFF2-40B4-BE49-F238E27FC236}">
-                <a16:creationId xmlns:a16="http://schemas.microsoft.com/office/drawing/2014/main" id="{32E4E81B-0198-4264-983A-EFF3D96CCFE4}"/>
+                <a16:creationId xmlns:a16="http://schemas.microsoft.com/office/drawing/2014/main" id="{6F38AD6E-4B42-429E-9C12-29C5D8DD5366}"/>
               </a:ext>
             </a:extLst>
           </p:cNvPr>
-          <p:cNvSpPr txBox="1"/>
+          <p:cNvPicPr>
+            <a:picLocks noChangeAspect="1"/>
+          </p:cNvPicPr>
           <p:nvPr/>
-        </p:nvSpPr>
+        </p:nvPicPr>
+        <p:blipFill>
+          <a:blip r:embed="rId3">
+            <a:extLst>
+              <a:ext uri="{28A0092B-C50C-407E-A947-70E740481C1C}">
+                <a14:useLocalDpi xmlns:a14="http://schemas.microsoft.com/office/drawing/2010/main" val="0"/>
+              </a:ext>
+            </a:extLst>
+          </a:blip>
+          <a:stretch>
+            <a:fillRect/>
+          </a:stretch>
+        </p:blipFill>
         <p:spPr>
           <a:xfrm>
-            <a:off x="227331" y="2498332"/>
-            <a:ext cx="2054089" cy="1477328"/>
+            <a:off x="6529943" y="3806295"/>
+            <a:ext cx="3372321" cy="428685"/>
           </a:xfrm>
           <a:prstGeom prst="rect">
             <a:avLst/>
           </a:prstGeom>
-          <a:ln>
-            <a:solidFill>
-              <a:srgbClr val="2E2B21"/>
-            </a:solidFill>
-          </a:ln>
-          <a:extLst>
-            <a:ext uri="{C572A759-6A51-4108-AA02-DFA0A04FC94B}">
-              <ma14:wrappingTextBoxFlag xmlns:ma14="http://schemas.microsoft.com/office/mac/drawingml/2011/main" xmlns:a14="http://schemas.microsoft.com/office/drawing/2010/main" xmlns:m="http://schemas.openxmlformats.org/officeDocument/2006/math" xmlns="" val="1"/>
-            </a:ext>
-          </a:extLst>
         </p:spPr>
-        <p:txBody>
-          <a:bodyPr lIns="45719" rIns="45719">
-            <a:spAutoFit/>
-          </a:bodyPr>
-          <a:lstStyle/>
-          <a:p>
-            <a:pPr marL="285750" indent="-285750">
-              <a:buSzPct val="100000"/>
-              <a:buChar char="❑"/>
-            </a:pPr>
-            <a:r>
-              <a:rPr lang="es-ES" dirty="0"/>
-              <a:t>UML</a:t>
-            </a:r>
-            <a:endParaRPr dirty="0"/>
-          </a:p>
-          <a:p>
-            <a:pPr marL="285750" indent="-285750">
-              <a:buSzPct val="100000"/>
-              <a:buChar char="❑"/>
-            </a:pPr>
-            <a:r>
-              <a:rPr dirty="0" err="1"/>
-              <a:t>Funcionalidades</a:t>
-            </a:r>
-            <a:endParaRPr dirty="0"/>
-          </a:p>
-          <a:p>
-            <a:pPr marL="285750" indent="-285750">
-              <a:buSzPct val="100000"/>
-              <a:buChar char="❑"/>
-              <a:defRPr b="1"/>
-            </a:pPr>
-            <a:r>
-              <a:rPr dirty="0" err="1"/>
-              <a:t>Demostración</a:t>
-            </a:r>
-            <a:endParaRPr dirty="0"/>
-          </a:p>
-          <a:p>
-            <a:pPr marL="285750" indent="-285750">
-              <a:buSzPct val="100000"/>
-              <a:buChar char="❑"/>
-            </a:pPr>
-            <a:r>
-              <a:rPr dirty="0" err="1"/>
-              <a:t>Aspectos</a:t>
-            </a:r>
-            <a:endParaRPr dirty="0"/>
-          </a:p>
-          <a:p>
-            <a:pPr marL="285750" indent="-285750">
-              <a:buSzPct val="100000"/>
-              <a:buChar char="❑"/>
-            </a:pPr>
-            <a:r>
-              <a:rPr dirty="0" err="1"/>
-              <a:t>Conclusiones</a:t>
-            </a:r>
-            <a:endParaRPr dirty="0"/>
-          </a:p>
-        </p:txBody>
-      </p:sp>
+      </p:pic>
     </p:spTree>
     <p:extLst>
       <p:ext uri="{BB962C8B-B14F-4D97-AF65-F5344CB8AC3E}">
-        <p14:creationId xmlns:p14="http://schemas.microsoft.com/office/powerpoint/2010/main" val="907569077"/>
+        <p14:creationId xmlns:p14="http://schemas.microsoft.com/office/powerpoint/2010/main" val="2409828802"/>
       </p:ext>
     </p:extLst>
   </p:cSld>

</xml_diff>